<commit_message>
initial refactor of PPT tables - large WIP
</commit_message>
<xml_diff>
--- a/examples/example_report.pptx
+++ b/examples/example_report.pptx
@@ -125,502 +125,6 @@
 
 <file path=ppt/revisionInfo.xml><?xml version="1.0" encoding="utf-8"?>
 <p1510:revInfo xmlns:a="http://schemas.openxmlformats.org/drawingml/2006/main" xmlns:r="http://schemas.openxmlformats.org/officeDocument/2006/relationships" xmlns:p1510="http://schemas.microsoft.com/office/powerpoint/2015/10/main"/>
-</file>
-
-<file path=ppt/charts/chart1.xml><?xml version="1.0" encoding="utf-8"?>
-<c:chartSpace xmlns:c="http://schemas.openxmlformats.org/drawingml/2006/chart" xmlns:a="http://schemas.openxmlformats.org/drawingml/2006/main" xmlns:r="http://schemas.openxmlformats.org/officeDocument/2006/relationships">
-  <c:date1904 val="0"/>
-  <c:chart>
-    <c:title>
-      <c:tx>
-        <c:rich>
-          <a:bodyPr/>
-          <a:lstStyle/>
-          <a:p>
-            <a:r>
-              <a:rPr b="0" sz="1200">
-                <a:latin typeface="Calibri"/>
-              </a:rPr>
-              <a:t>Data by Series Over Time</a:t>
-            </a:r>
-          </a:p>
-        </c:rich>
-      </c:tx>
-      <c:layout/>
-      <c:overlay val="0"/>
-    </c:title>
-    <c:autoTitleDeleted val="0"/>
-    <c:plotArea>
-      <c:lineChart>
-        <c:grouping val="standard"/>
-        <c:varyColors val="0"/>
-        <c:ser>
-          <c:idx val="0"/>
-          <c:order val="0"/>
-          <c:tx>
-            <c:strRef>
-              <c:f>Sheet1!$B$1</c:f>
-              <c:strCache>
-                <c:ptCount val="1"/>
-                <c:pt idx="0">
-                  <c:v>a</c:v>
-                </c:pt>
-              </c:strCache>
-            </c:strRef>
-          </c:tx>
-          <c:spPr>
-            <a:ln w="30000">
-              <a:solidFill>
-                <a:srgbClr val="8DD3C7"/>
-              </a:solidFill>
-            </a:ln>
-          </c:spPr>
-          <c:marker>
-            <c:symbol val="none"/>
-          </c:marker>
-          <c:cat>
-            <c:numRef>
-              <c:f>Sheet1!$A$2:$A$7</c:f>
-              <c:numCache>
-                <c:formatCode>General</c:formatCode>
-                <c:ptCount val="6"/>
-                <c:pt idx="0">
-                  <c:v>2012</c:v>
-                </c:pt>
-                <c:pt idx="1">
-                  <c:v>2013</c:v>
-                </c:pt>
-                <c:pt idx="2">
-                  <c:v>2014</c:v>
-                </c:pt>
-                <c:pt idx="3">
-                  <c:v>2015</c:v>
-                </c:pt>
-                <c:pt idx="4">
-                  <c:v>2016</c:v>
-                </c:pt>
-                <c:pt idx="5">
-                  <c:v>2017</c:v>
-                </c:pt>
-              </c:numCache>
-            </c:numRef>
-          </c:cat>
-          <c:val>
-            <c:numRef>
-              <c:f>Sheet1!$B$2:$B$7</c:f>
-              <c:numCache>
-                <c:formatCode>General</c:formatCode>
-                <c:ptCount val="6"/>
-                <c:pt idx="0">
-                  <c:v>0.2561232029720044</c:v>
-                </c:pt>
-                <c:pt idx="1">
-                  <c:v>0.18938694651499566</c:v>
-                </c:pt>
-                <c:pt idx="2">
-                  <c:v>0.013800503786420948</c:v>
-                </c:pt>
-                <c:pt idx="3">
-                  <c:v>0.13103284069331533</c:v>
-                </c:pt>
-                <c:pt idx="4">
-                  <c:v>0.3658683194111273</c:v>
-                </c:pt>
-                <c:pt idx="5">
-                  <c:v>0.12738234995105824</c:v>
-                </c:pt>
-              </c:numCache>
-            </c:numRef>
-          </c:val>
-          <c:smooth val="0"/>
-        </c:ser>
-        <c:ser>
-          <c:idx val="1"/>
-          <c:order val="1"/>
-          <c:tx>
-            <c:strRef>
-              <c:f>Sheet1!$C$1</c:f>
-              <c:strCache>
-                <c:ptCount val="1"/>
-                <c:pt idx="0">
-                  <c:v>b</c:v>
-                </c:pt>
-              </c:strCache>
-            </c:strRef>
-          </c:tx>
-          <c:spPr>
-            <a:ln w="30000">
-              <a:solidFill>
-                <a:srgbClr val="FFFFB3"/>
-              </a:solidFill>
-            </a:ln>
-          </c:spPr>
-          <c:marker>
-            <c:symbol val="none"/>
-          </c:marker>
-          <c:cat>
-            <c:numRef>
-              <c:f>Sheet1!$A$2:$A$7</c:f>
-              <c:numCache>
-                <c:formatCode>General</c:formatCode>
-                <c:ptCount val="6"/>
-                <c:pt idx="0">
-                  <c:v>2012</c:v>
-                </c:pt>
-                <c:pt idx="1">
-                  <c:v>2013</c:v>
-                </c:pt>
-                <c:pt idx="2">
-                  <c:v>2014</c:v>
-                </c:pt>
-                <c:pt idx="3">
-                  <c:v>2015</c:v>
-                </c:pt>
-                <c:pt idx="4">
-                  <c:v>2016</c:v>
-                </c:pt>
-                <c:pt idx="5">
-                  <c:v>2017</c:v>
-                </c:pt>
-              </c:numCache>
-            </c:numRef>
-          </c:cat>
-          <c:val>
-            <c:numRef>
-              <c:f>Sheet1!$C$2:$C$7</c:f>
-              <c:numCache>
-                <c:formatCode>General</c:formatCode>
-                <c:ptCount val="6"/>
-                <c:pt idx="0">
-                  <c:v>0.5111471659277542</c:v>
-                </c:pt>
-                <c:pt idx="1">
-                  <c:v>0.8336371804113063</c:v>
-                </c:pt>
-                <c:pt idx="2">
-                  <c:v>0.8601818221633543</c:v>
-                </c:pt>
-                <c:pt idx="3">
-                  <c:v>0.06261825884805583</c:v>
-                </c:pt>
-                <c:pt idx="4">
-                  <c:v>0.7758278587737658</c:v>
-                </c:pt>
-                <c:pt idx="5">
-                  <c:v>0.4853458582728779</c:v>
-                </c:pt>
-              </c:numCache>
-            </c:numRef>
-          </c:val>
-          <c:smooth val="0"/>
-        </c:ser>
-        <c:ser>
-          <c:idx val="2"/>
-          <c:order val="2"/>
-          <c:tx>
-            <c:strRef>
-              <c:f>Sheet1!$D$1</c:f>
-              <c:strCache>
-                <c:ptCount val="1"/>
-                <c:pt idx="0">
-                  <c:v>c</c:v>
-                </c:pt>
-              </c:strCache>
-            </c:strRef>
-          </c:tx>
-          <c:spPr>
-            <a:ln w="30000">
-              <a:solidFill>
-                <a:srgbClr val="BEBADA"/>
-              </a:solidFill>
-            </a:ln>
-          </c:spPr>
-          <c:marker>
-            <c:symbol val="none"/>
-          </c:marker>
-          <c:cat>
-            <c:numRef>
-              <c:f>Sheet1!$A$2:$A$7</c:f>
-              <c:numCache>
-                <c:formatCode>General</c:formatCode>
-                <c:ptCount val="6"/>
-                <c:pt idx="0">
-                  <c:v>2012</c:v>
-                </c:pt>
-                <c:pt idx="1">
-                  <c:v>2013</c:v>
-                </c:pt>
-                <c:pt idx="2">
-                  <c:v>2014</c:v>
-                </c:pt>
-                <c:pt idx="3">
-                  <c:v>2015</c:v>
-                </c:pt>
-                <c:pt idx="4">
-                  <c:v>2016</c:v>
-                </c:pt>
-                <c:pt idx="5">
-                  <c:v>2017</c:v>
-                </c:pt>
-              </c:numCache>
-            </c:numRef>
-          </c:cat>
-          <c:val>
-            <c:numRef>
-              <c:f>Sheet1!$D$2:$D$7</c:f>
-              <c:numCache>
-                <c:formatCode>General</c:formatCode>
-                <c:ptCount val="6"/>
-                <c:pt idx="0">
-                  <c:v>0.13385215231805658</c:v>
-                </c:pt>
-                <c:pt idx="1">
-                  <c:v>0.5853142695316315</c:v>
-                </c:pt>
-                <c:pt idx="2">
-                  <c:v>0.7147306058027221</c:v>
-                </c:pt>
-                <c:pt idx="3">
-                  <c:v>0.6830381108250915</c:v>
-                </c:pt>
-                <c:pt idx="4">
-                  <c:v>0.4199820406703728</c:v>
-                </c:pt>
-                <c:pt idx="5">
-                  <c:v>0.3939509556531229</c:v>
-                </c:pt>
-              </c:numCache>
-            </c:numRef>
-          </c:val>
-          <c:smooth val="0"/>
-        </c:ser>
-        <c:ser>
-          <c:idx val="3"/>
-          <c:order val="3"/>
-          <c:tx>
-            <c:strRef>
-              <c:f>Sheet1!$E$1</c:f>
-              <c:strCache>
-                <c:ptCount val="1"/>
-                <c:pt idx="0">
-                  <c:v>d</c:v>
-                </c:pt>
-              </c:strCache>
-            </c:strRef>
-          </c:tx>
-          <c:spPr>
-            <a:ln w="30000">
-              <a:solidFill>
-                <a:srgbClr val="FB8072"/>
-              </a:solidFill>
-            </a:ln>
-          </c:spPr>
-          <c:marker>
-            <c:symbol val="none"/>
-          </c:marker>
-          <c:cat>
-            <c:numRef>
-              <c:f>Sheet1!$A$2:$A$7</c:f>
-              <c:numCache>
-                <c:formatCode>General</c:formatCode>
-                <c:ptCount val="6"/>
-                <c:pt idx="0">
-                  <c:v>2012</c:v>
-                </c:pt>
-                <c:pt idx="1">
-                  <c:v>2013</c:v>
-                </c:pt>
-                <c:pt idx="2">
-                  <c:v>2014</c:v>
-                </c:pt>
-                <c:pt idx="3">
-                  <c:v>2015</c:v>
-                </c:pt>
-                <c:pt idx="4">
-                  <c:v>2016</c:v>
-                </c:pt>
-                <c:pt idx="5">
-                  <c:v>2017</c:v>
-                </c:pt>
-              </c:numCache>
-            </c:numRef>
-          </c:cat>
-          <c:val>
-            <c:numRef>
-              <c:f>Sheet1!$E$2:$E$7</c:f>
-              <c:numCache>
-                <c:formatCode>General</c:formatCode>
-                <c:ptCount val="6"/>
-                <c:pt idx="0">
-                  <c:v>0.6334894245514457</c:v>
-                </c:pt>
-                <c:pt idx="1">
-                  <c:v>0.8702018099345752</c:v>
-                </c:pt>
-                <c:pt idx="2">
-                  <c:v>0.13136643228059253</c:v>
-                </c:pt>
-                <c:pt idx="3">
-                  <c:v>0.7770269321737269</c:v>
-                </c:pt>
-                <c:pt idx="4">
-                  <c:v>0.5932672098349081</c:v>
-                </c:pt>
-                <c:pt idx="5">
-                  <c:v>0.4962872955210711</c:v>
-                </c:pt>
-              </c:numCache>
-            </c:numRef>
-          </c:val>
-          <c:smooth val="0"/>
-        </c:ser>
-        <c:dLbls>
-          <c:numFmt formatCode="0.0" sourceLinked="0"/>
-          <c:txPr>
-            <a:bodyPr/>
-            <a:lstStyle/>
-            <a:p>
-              <a:pPr>
-                <a:defRPr sz="800" b="0">
-                  <a:latin typeface="Calibri"/>
-                </a:defRPr>
-              </a:pPr>
-            </a:p>
-          </c:txPr>
-          <c:showLegendKey val="0"/>
-          <c:showVal val="1"/>
-          <c:showCatName val="0"/>
-          <c:showSerName val="0"/>
-          <c:showPercent val="0"/>
-          <c:showBubbleSize val="0"/>
-        </c:dLbls>
-        <c:marker val="1"/>
-        <c:smooth val="0"/>
-        <c:axId val="2118791784"/>
-        <c:axId val="2140495176"/>
-      </c:lineChart>
-      <c:catAx>
-        <c:axId val="2118791784"/>
-        <c:scaling>
-          <c:orientation val="minMax"/>
-        </c:scaling>
-        <c:delete val="0"/>
-        <c:axPos val="b"/>
-        <c:title>
-          <c:tx>
-            <c:rich>
-              <a:bodyPr/>
-              <a:lstStyle/>
-              <a:p>
-                <a:r>
-                  <a:rPr b="0" sz="1000">
-                    <a:latin typeface="Calibri"/>
-                  </a:rPr>
-                  <a:t>Year</a:t>
-                </a:r>
-              </a:p>
-            </c:rich>
-          </c:tx>
-          <c:layout/>
-          <c:overlay val="0"/>
-        </c:title>
-        <c:majorTickMark val="out"/>
-        <c:minorTickMark val="none"/>
-        <c:tickLblPos val="nextTo"/>
-        <c:txPr>
-          <a:bodyPr/>
-          <a:lstStyle/>
-          <a:p>
-            <a:pPr>
-              <a:defRPr b="0" sz="1000">
-                <a:latin typeface="Calibri"/>
-              </a:defRPr>
-            </a:pPr>
-          </a:p>
-        </c:txPr>
-        <c:crossAx val="2140495176"/>
-        <c:crosses val="autoZero"/>
-        <c:auto val="1"/>
-        <c:lblAlgn val="ctr"/>
-        <c:lblOffset val="100"/>
-        <c:noMultiLvlLbl val="0"/>
-      </c:catAx>
-      <c:valAx>
-        <c:axId val="2140495176"/>
-        <c:scaling/>
-        <c:delete val="0"/>
-        <c:axPos val="l"/>
-        <c:title>
-          <c:tx>
-            <c:rich>
-              <a:bodyPr/>
-              <a:lstStyle/>
-              <a:p>
-                <a:r>
-                  <a:rPr b="0" sz="1000">
-                    <a:latin typeface="Calibri"/>
-                  </a:rPr>
-                  <a:t>Data</a:t>
-                </a:r>
-              </a:p>
-            </c:rich>
-          </c:tx>
-          <c:layout/>
-          <c:overlay val="0"/>
-        </c:title>
-        <c:numFmt formatCode="0.0" sourceLinked="0"/>
-        <c:majorTickMark val="out"/>
-        <c:minorTickMark val="none"/>
-        <c:tickLblPos val="nextTo"/>
-        <c:txPr>
-          <a:bodyPr/>
-          <a:lstStyle/>
-          <a:p>
-            <a:pPr>
-              <a:defRPr b="0" sz="1000">
-                <a:latin typeface="Calibri"/>
-              </a:defRPr>
-            </a:pPr>
-          </a:p>
-        </c:txPr>
-        <c:crossAx val="2118791784"/>
-        <c:crosses val="autoZero"/>
-      </c:valAx>
-    </c:plotArea>
-    <c:legend>
-      <c:legendPos val="b"/>
-      <c:layout/>
-      <c:overlay val="0"/>
-      <c:txPr>
-        <a:bodyPr/>
-        <a:lstStyle/>
-        <a:p>
-          <a:pPr>
-            <a:defRPr sz="1000" b="0">
-              <a:latin typeface="Calibri"/>
-            </a:defRPr>
-          </a:pPr>
-        </a:p>
-      </c:txPr>
-    </c:legend>
-    <c:plotVisOnly val="1"/>
-    <c:dispBlanksAs val="gap"/>
-    <c:showDLblsOverMax val="0"/>
-  </c:chart>
-  <c:txPr>
-    <a:bodyPr/>
-    <a:lstStyle/>
-    <a:p>
-      <a:pPr>
-        <a:defRPr sz="1800"/>
-      </a:pPr>
-      <a:endParaRPr lang="en-US"/>
-    </a:p>
-  </c:txPr>
-  <c:externalData r:id="rId1">
-    <c:autoUpdate val="0"/>
-  </c:externalData>
-</c:chartSpace>
 </file>
 
 <file path=ppt/slideLayouts/slideLayout1.xml><?xml version="1.0" encoding="utf-8"?>
@@ -4048,7 +3552,7 @@
           <a:lstStyle/>
           <a:p>
             <a:r>
-              <a:t>Lorem Ipsum </a:t>
+              <a:t>mspandas Demo</a:t>
             </a:r>
           </a:p>
         </p:txBody>
@@ -4065,982 +3569,992 @@
         </p:nvGraphicFramePr>
         <p:xfrm>
           <a:off x="838200" y="1847850"/>
-          <a:ext cx="5181600" cy="822960"/>
+          <a:ext cx="5181600" cy="3337560"/>
         </p:xfrm>
         <a:graphic>
           <a:graphicData uri="http://schemas.openxmlformats.org/drawingml/2006/table">
             <a:tbl>
-              <a:tblPr firstRow="1" bandRow="1">
+              <a:tblPr bandRow="1">
                 <a:tableStyleId>{5C22544A-7EE6-4342-B048-85BDC9FD1C3A}</a:tableStyleId>
               </a:tblPr>
               <a:tblGrid>
-                <a:gridCol w="647700"/>
-                <a:gridCol w="647700"/>
-                <a:gridCol w="647700"/>
-                <a:gridCol w="647700"/>
-                <a:gridCol w="647700"/>
-                <a:gridCol w="647700"/>
-                <a:gridCol w="647700"/>
-                <a:gridCol w="647700"/>
+                <a:gridCol w="740228"/>
+                <a:gridCol w="740228"/>
+                <a:gridCol w="740228"/>
+                <a:gridCol w="740228"/>
+                <a:gridCol w="740228"/>
+                <a:gridCol w="740228"/>
+                <a:gridCol w="740232"/>
               </a:tblGrid>
-              <a:tr h="137160">
-                <a:tc>
-                  <a:txBody>
-                    <a:bodyPr/>
-                    <a:lstStyle/>
-                    <a:p>
-                      <a:r>
-                        <a:rPr b="1" i="0" sz="900">
-                          <a:latin typeface="Calibri"/>
+              <a:tr h="370840">
+                <a:tc>
+                  <a:txBody>
+                    <a:bodyPr/>
+                    <a:lstStyle/>
+                    <a:p>
+                      <a:r>
+                        <a:rPr sz="900" b="1">
+                          <a:solidFill>
+                            <a:srgbClr val="FFFFFF"/>
+                          </a:solidFill>
+                        </a:rPr>
+                        <a:t>Year</a:t>
+                      </a:r>
+                    </a:p>
+                  </a:txBody>
+                  <a:tcPr>
+                    <a:solidFill>
+                      <a:schemeClr val="accent1"/>
+                    </a:solidFill>
+                  </a:tcPr>
+                </a:tc>
+                <a:tc>
+                  <a:txBody>
+                    <a:bodyPr/>
+                    <a:lstStyle/>
+                    <a:p>
+                      <a:r>
+                        <a:rPr sz="900" b="1">
+                          <a:solidFill>
+                            <a:srgbClr val="FFFFFF"/>
+                          </a:solidFill>
+                        </a:rPr>
+                        <a:t>Quarter End</a:t>
+                      </a:r>
+                    </a:p>
+                  </a:txBody>
+                  <a:tcPr>
+                    <a:solidFill>
+                      <a:schemeClr val="accent1"/>
+                    </a:solidFill>
+                  </a:tcPr>
+                </a:tc>
+                <a:tc gridSpan="2">
+                  <a:txBody>
+                    <a:bodyPr/>
+                    <a:lstStyle/>
+                    <a:p>
+                      <a:pPr algn="ctr"/>
+                      <a:r>
+                        <a:rPr sz="900" b="1">
+                          <a:solidFill>
+                            <a:srgbClr val="FFFFFF"/>
+                          </a:solidFill>
+                        </a:rPr>
+                        <a:t>Group1</a:t>
+                      </a:r>
+                    </a:p>
+                  </a:txBody>
+                  <a:tcPr>
+                    <a:solidFill>
+                      <a:schemeClr val="accent1"/>
+                    </a:solidFill>
+                  </a:tcPr>
+                </a:tc>
+                <a:tc hMerge="1">
+                  <a:txBody>
+                    <a:bodyPr/>
+                    <a:lstStyle/>
+                    <a:p>
+                      <a:r>
+                        <a:rPr sz="900" b="1">
+                          <a:solidFill>
+                            <a:srgbClr val="FFFFFF"/>
+                          </a:solidFill>
+                        </a:rPr>
+                        <a:t>Group1</a:t>
+                      </a:r>
+                    </a:p>
+                  </a:txBody>
+                  <a:tcPr>
+                    <a:solidFill>
+                      <a:schemeClr val="accent1"/>
+                    </a:solidFill>
+                  </a:tcPr>
+                </a:tc>
+                <a:tc gridSpan="2">
+                  <a:txBody>
+                    <a:bodyPr/>
+                    <a:lstStyle/>
+                    <a:p>
+                      <a:pPr algn="ctr"/>
+                      <a:r>
+                        <a:rPr sz="900" b="1">
+                          <a:solidFill>
+                            <a:srgbClr val="FFFFFF"/>
+                          </a:solidFill>
+                        </a:rPr>
+                        <a:t>Group1</a:t>
+                      </a:r>
+                    </a:p>
+                  </a:txBody>
+                  <a:tcPr>
+                    <a:solidFill>
+                      <a:schemeClr val="accent1"/>
+                    </a:solidFill>
+                  </a:tcPr>
+                </a:tc>
+                <a:tc hMerge="1">
+                  <a:txBody>
+                    <a:bodyPr/>
+                    <a:lstStyle/>
+                    <a:p>
+                      <a:r>
+                        <a:rPr sz="900" b="1">
+                          <a:solidFill>
+                            <a:srgbClr val="FFFFFF"/>
+                          </a:solidFill>
+                        </a:rPr>
+                        <a:t>Group1</a:t>
+                      </a:r>
+                    </a:p>
+                  </a:txBody>
+                  <a:tcPr>
+                    <a:solidFill>
+                      <a:schemeClr val="accent1"/>
+                    </a:solidFill>
+                  </a:tcPr>
+                </a:tc>
+                <a:tc>
+                  <a:txBody>
+                    <a:bodyPr/>
+                    <a:lstStyle/>
+                    <a:p>
+                      <a:r>
+                        <a:rPr sz="900" b="1">
+                          <a:solidFill>
+                            <a:srgbClr val="FFFFFF"/>
+                          </a:solidFill>
+                        </a:rPr>
+                        <a:t>Total</a:t>
+                      </a:r>
+                    </a:p>
+                  </a:txBody>
+                  <a:tcPr>
+                    <a:solidFill>
+                      <a:schemeClr val="accent1"/>
+                    </a:solidFill>
+                  </a:tcPr>
+                </a:tc>
+              </a:tr>
+              <a:tr h="370840">
+                <a:tc>
+                  <a:txBody>
+                    <a:bodyPr/>
+                    <a:lstStyle/>
+                    <a:p>
+                      <a:r>
+                        <a:rPr sz="900" b="1">
+                          <a:solidFill>
+                            <a:srgbClr val="FFFFFF"/>
+                          </a:solidFill>
+                        </a:rPr>
+                        <a:t/>
+                      </a:r>
+                    </a:p>
+                  </a:txBody>
+                  <a:tcPr>
+                    <a:solidFill>
+                      <a:schemeClr val="accent1"/>
+                    </a:solidFill>
+                  </a:tcPr>
+                </a:tc>
+                <a:tc>
+                  <a:txBody>
+                    <a:bodyPr/>
+                    <a:lstStyle/>
+                    <a:p>
+                      <a:r>
+                        <a:rPr sz="900" b="1">
+                          <a:solidFill>
+                            <a:srgbClr val="FFFFFF"/>
+                          </a:solidFill>
+                        </a:rPr>
+                        <a:t/>
+                      </a:r>
+                    </a:p>
+                  </a:txBody>
+                  <a:tcPr>
+                    <a:solidFill>
+                      <a:schemeClr val="accent1"/>
+                    </a:solidFill>
+                  </a:tcPr>
+                </a:tc>
+                <a:tc>
+                  <a:txBody>
+                    <a:bodyPr/>
+                    <a:lstStyle/>
+                    <a:p>
+                      <a:r>
+                        <a:rPr sz="900" b="1">
+                          <a:solidFill>
+                            <a:srgbClr val="FFFFFF"/>
+                          </a:solidFill>
+                        </a:rPr>
+                        <a:t>A</a:t>
+                      </a:r>
+                    </a:p>
+                  </a:txBody>
+                  <a:tcPr>
+                    <a:solidFill>
+                      <a:schemeClr val="accent1"/>
+                    </a:solidFill>
+                  </a:tcPr>
+                </a:tc>
+                <a:tc>
+                  <a:txBody>
+                    <a:bodyPr/>
+                    <a:lstStyle/>
+                    <a:p>
+                      <a:r>
+                        <a:rPr sz="900" b="1">
+                          <a:solidFill>
+                            <a:srgbClr val="FFFFFF"/>
+                          </a:solidFill>
+                        </a:rPr>
+                        <a:t>B</a:t>
+                      </a:r>
+                    </a:p>
+                  </a:txBody>
+                  <a:tcPr>
+                    <a:solidFill>
+                      <a:schemeClr val="accent1"/>
+                    </a:solidFill>
+                  </a:tcPr>
+                </a:tc>
+                <a:tc>
+                  <a:txBody>
+                    <a:bodyPr/>
+                    <a:lstStyle/>
+                    <a:p>
+                      <a:r>
+                        <a:rPr sz="900" b="1">
+                          <a:solidFill>
+                            <a:srgbClr val="FFFFFF"/>
+                          </a:solidFill>
+                        </a:rPr>
+                        <a:t>C</a:t>
+                      </a:r>
+                    </a:p>
+                  </a:txBody>
+                  <a:tcPr>
+                    <a:solidFill>
+                      <a:schemeClr val="accent1"/>
+                    </a:solidFill>
+                  </a:tcPr>
+                </a:tc>
+                <a:tc>
+                  <a:txBody>
+                    <a:bodyPr/>
+                    <a:lstStyle/>
+                    <a:p>
+                      <a:r>
+                        <a:rPr sz="900" b="1">
+                          <a:solidFill>
+                            <a:srgbClr val="FFFFFF"/>
+                          </a:solidFill>
+                        </a:rPr>
+                        <a:t>D</a:t>
+                      </a:r>
+                    </a:p>
+                  </a:txBody>
+                  <a:tcPr>
+                    <a:solidFill>
+                      <a:schemeClr val="accent1"/>
+                    </a:solidFill>
+                  </a:tcPr>
+                </a:tc>
+                <a:tc>
+                  <a:txBody>
+                    <a:bodyPr/>
+                    <a:lstStyle/>
+                    <a:p>
+                      <a:r>
+                        <a:rPr sz="900" b="1">
+                          <a:solidFill>
+                            <a:srgbClr val="FFFFFF"/>
+                          </a:solidFill>
                         </a:rPr>
                         <a:t> </a:t>
                       </a:r>
                     </a:p>
                   </a:txBody>
-                  <a:tcPr marT="22860" marB="22860" marL="22860" marR="22860"/>
-                </a:tc>
-                <a:tc>
-                  <a:txBody>
-                    <a:bodyPr/>
-                    <a:lstStyle/>
-                    <a:p>
-                      <a:pPr algn="ctr"/>
-                      <a:r>
-                        <a:rPr b="1" i="0" sz="900">
-                          <a:latin typeface="Calibri"/>
-                        </a:rPr>
-                        <a:t>2012</a:t>
-                      </a:r>
-                    </a:p>
-                  </a:txBody>
-                  <a:tcPr marT="22860" marB="22860" marL="22860" marR="22860"/>
-                </a:tc>
-                <a:tc>
-                  <a:txBody>
-                    <a:bodyPr/>
-                    <a:lstStyle/>
-                    <a:p>
-                      <a:pPr algn="ctr"/>
-                      <a:r>
-                        <a:rPr b="1" i="0" sz="900">
-                          <a:latin typeface="Calibri"/>
-                        </a:rPr>
-                        <a:t>2013</a:t>
-                      </a:r>
-                    </a:p>
-                  </a:txBody>
-                  <a:tcPr marT="22860" marB="22860" marL="22860" marR="22860"/>
-                </a:tc>
-                <a:tc>
-                  <a:txBody>
-                    <a:bodyPr/>
-                    <a:lstStyle/>
-                    <a:p>
-                      <a:pPr algn="ctr"/>
-                      <a:r>
-                        <a:rPr b="1" i="0" sz="900">
-                          <a:latin typeface="Calibri"/>
-                        </a:rPr>
-                        <a:t>2014</a:t>
-                      </a:r>
-                    </a:p>
-                  </a:txBody>
-                  <a:tcPr marT="22860" marB="22860" marL="22860" marR="22860"/>
-                </a:tc>
-                <a:tc>
-                  <a:txBody>
-                    <a:bodyPr/>
-                    <a:lstStyle/>
-                    <a:p>
-                      <a:pPr algn="ctr"/>
-                      <a:r>
-                        <a:rPr b="1" i="0" sz="900">
-                          <a:latin typeface="Calibri"/>
-                        </a:rPr>
-                        <a:t>2015</a:t>
-                      </a:r>
-                    </a:p>
-                  </a:txBody>
-                  <a:tcPr marT="22860" marB="22860" marL="22860" marR="22860"/>
-                </a:tc>
-                <a:tc>
-                  <a:txBody>
-                    <a:bodyPr/>
-                    <a:lstStyle/>
-                    <a:p>
-                      <a:pPr algn="ctr"/>
-                      <a:r>
-                        <a:rPr b="1" i="0" sz="900">
-                          <a:latin typeface="Calibri"/>
-                        </a:rPr>
-                        <a:t>2016</a:t>
-                      </a:r>
-                    </a:p>
-                  </a:txBody>
-                  <a:tcPr marT="22860" marB="22860" marL="22860" marR="22860"/>
-                </a:tc>
-                <a:tc>
-                  <a:txBody>
-                    <a:bodyPr/>
-                    <a:lstStyle/>
-                    <a:p>
-                      <a:pPr algn="ctr"/>
-                      <a:r>
-                        <a:rPr b="1" i="0" sz="900">
-                          <a:latin typeface="Calibri"/>
-                        </a:rPr>
-                        <a:t>2017</a:t>
-                      </a:r>
-                    </a:p>
-                  </a:txBody>
-                  <a:tcPr marT="22860" marB="22860" marL="22860" marR="22860"/>
-                </a:tc>
-                <a:tc>
-                  <a:txBody>
-                    <a:bodyPr/>
-                    <a:lstStyle/>
-                    <a:p>
-                      <a:pPr algn="ctr"/>
-                      <a:r>
-                        <a:rPr b="1" i="0" sz="900">
-                          <a:latin typeface="Calibri"/>
-                        </a:rPr>
-                        <a:t>Running Total</a:t>
-                      </a:r>
-                    </a:p>
-                  </a:txBody>
-                  <a:tcPr marT="22860" marB="22860" marL="22860" marR="22860"/>
-                </a:tc>
-              </a:tr>
-              <a:tr h="137160">
-                <a:tc>
-                  <a:txBody>
-                    <a:bodyPr/>
-                    <a:lstStyle/>
-                    <a:p>
-                      <a:r>
-                        <a:rPr b="0" i="0" sz="900">
-                          <a:latin typeface="Calibri"/>
-                        </a:rPr>
-                        <a:t>a</a:t>
-                      </a:r>
-                    </a:p>
-                  </a:txBody>
-                  <a:tcPr marT="22860" marB="22860" marL="22860" marR="22860">
+                  <a:tcPr>
                     <a:solidFill>
-                      <a:srgbClr val="F5F5F5"/>
+                      <a:schemeClr val="accent1"/>
                     </a:solidFill>
                   </a:tcPr>
                 </a:tc>
-                <a:tc>
+              </a:tr>
+              <a:tr h="370840">
+                <a:tc rowSpan="4">
                   <a:txBody>
                     <a:bodyPr/>
                     <a:lstStyle/>
                     <a:p>
                       <a:pPr algn="ctr"/>
                       <a:r>
-                        <a:rPr b="0" i="0" sz="900">
-                          <a:latin typeface="Calibri"/>
-                        </a:rPr>
-                        <a:t>0.26</a:t>
-                      </a:r>
-                    </a:p>
-                  </a:txBody>
-                  <a:tcPr marT="22860" marB="22860" marL="22860" marR="22860">
-                    <a:solidFill>
-                      <a:srgbClr val="F5F5F5"/>
-                    </a:solidFill>
-                  </a:tcPr>
-                </a:tc>
-                <a:tc>
+                        <a:rPr sz="900" b="1"/>
+                        <a:t>2017</a:t>
+                      </a:r>
+                    </a:p>
+                  </a:txBody>
+                  <a:tcPr/>
+                </a:tc>
+                <a:tc>
+                  <a:txBody>
+                    <a:bodyPr/>
+                    <a:lstStyle/>
+                    <a:p>
+                      <a:r>
+                        <a:rPr sz="900" b="1"/>
+                        <a:t>Mar 31, 2017</a:t>
+                      </a:r>
+                    </a:p>
+                  </a:txBody>
+                  <a:tcPr/>
+                </a:tc>
+                <a:tc>
+                  <a:txBody>
+                    <a:bodyPr/>
+                    <a:lstStyle/>
+                    <a:p>
+                      <a:r>
+                        <a:rPr sz="900"/>
+                        <a:t>0.28%</a:t>
+                      </a:r>
+                    </a:p>
+                  </a:txBody>
+                  <a:tcPr/>
+                </a:tc>
+                <a:tc>
+                  <a:txBody>
+                    <a:bodyPr/>
+                    <a:lstStyle/>
+                    <a:p>
+                      <a:r>
+                        <a:rPr sz="900"/>
+                        <a:t>0.12%</a:t>
+                      </a:r>
+                    </a:p>
+                  </a:txBody>
+                  <a:tcPr/>
+                </a:tc>
+                <a:tc>
+                  <a:txBody>
+                    <a:bodyPr/>
+                    <a:lstStyle/>
+                    <a:p>
+                      <a:r>
+                        <a:rPr sz="900"/>
+                        <a:t>0.69%</a:t>
+                      </a:r>
+                    </a:p>
+                  </a:txBody>
+                  <a:tcPr/>
+                </a:tc>
+                <a:tc>
+                  <a:txBody>
+                    <a:bodyPr/>
+                    <a:lstStyle/>
+                    <a:p>
+                      <a:r>
+                        <a:rPr sz="900"/>
+                        <a:t>0.81%</a:t>
+                      </a:r>
+                    </a:p>
+                  </a:txBody>
+                  <a:tcPr/>
+                </a:tc>
+                <a:tc>
+                  <a:txBody>
+                    <a:bodyPr/>
+                    <a:lstStyle/>
+                    <a:p>
+                      <a:r>
+                        <a:rPr sz="900"/>
+                        <a:t>1.90%</a:t>
+                      </a:r>
+                    </a:p>
+                  </a:txBody>
+                  <a:tcPr/>
+                </a:tc>
+              </a:tr>
+              <a:tr h="370840">
+                <a:tc>
+                  <a:txBody>
+                    <a:bodyPr/>
+                    <a:lstStyle/>
+                    <a:p>
+                      <a:r>
+                        <a:rPr sz="900" b="1"/>
+                        <a:t>2017</a:t>
+                      </a:r>
+                    </a:p>
+                  </a:txBody>
+                  <a:tcPr/>
+                </a:tc>
+                <a:tc>
+                  <a:txBody>
+                    <a:bodyPr/>
+                    <a:lstStyle/>
+                    <a:p>
+                      <a:r>
+                        <a:rPr sz="900" b="1"/>
+                        <a:t>Jun 30, 2017</a:t>
+                      </a:r>
+                    </a:p>
+                  </a:txBody>
+                  <a:tcPr/>
+                </a:tc>
+                <a:tc>
+                  <a:txBody>
+                    <a:bodyPr/>
+                    <a:lstStyle/>
+                    <a:p>
+                      <a:r>
+                        <a:rPr sz="900"/>
+                        <a:t>0.36%</a:t>
+                      </a:r>
+                    </a:p>
+                  </a:txBody>
+                  <a:tcPr/>
+                </a:tc>
+                <a:tc>
+                  <a:txBody>
+                    <a:bodyPr/>
+                    <a:lstStyle/>
+                    <a:p>
+                      <a:r>
+                        <a:rPr sz="900"/>
+                        <a:t>0.96%</a:t>
+                      </a:r>
+                    </a:p>
+                  </a:txBody>
+                  <a:tcPr/>
+                </a:tc>
+                <a:tc>
+                  <a:txBody>
+                    <a:bodyPr/>
+                    <a:lstStyle/>
+                    <a:p>
+                      <a:r>
+                        <a:rPr sz="900"/>
+                        <a:t>0.62%</a:t>
+                      </a:r>
+                    </a:p>
+                  </a:txBody>
+                  <a:tcPr/>
+                </a:tc>
+                <a:tc>
+                  <a:txBody>
+                    <a:bodyPr/>
+                    <a:lstStyle/>
+                    <a:p>
+                      <a:r>
+                        <a:rPr sz="900"/>
+                        <a:t>0.73%</a:t>
+                      </a:r>
+                    </a:p>
+                  </a:txBody>
+                  <a:tcPr/>
+                </a:tc>
+                <a:tc>
+                  <a:txBody>
+                    <a:bodyPr/>
+                    <a:lstStyle/>
+                    <a:p>
+                      <a:r>
+                        <a:rPr sz="900"/>
+                        <a:t>2.67%</a:t>
+                      </a:r>
+                    </a:p>
+                  </a:txBody>
+                  <a:tcPr/>
+                </a:tc>
+              </a:tr>
+              <a:tr h="370840">
+                <a:tc>
+                  <a:txBody>
+                    <a:bodyPr/>
+                    <a:lstStyle/>
+                    <a:p>
+                      <a:r>
+                        <a:rPr sz="900" b="1"/>
+                        <a:t>2017</a:t>
+                      </a:r>
+                    </a:p>
+                  </a:txBody>
+                  <a:tcPr/>
+                </a:tc>
+                <a:tc>
+                  <a:txBody>
+                    <a:bodyPr/>
+                    <a:lstStyle/>
+                    <a:p>
+                      <a:r>
+                        <a:rPr sz="900" b="1"/>
+                        <a:t>Sep 30, 2017</a:t>
+                      </a:r>
+                    </a:p>
+                  </a:txBody>
+                  <a:tcPr/>
+                </a:tc>
+                <a:tc>
+                  <a:txBody>
+                    <a:bodyPr/>
+                    <a:lstStyle/>
+                    <a:p>
+                      <a:r>
+                        <a:rPr sz="900"/>
+                        <a:t>0.28%</a:t>
+                      </a:r>
+                    </a:p>
+                  </a:txBody>
+                  <a:tcPr/>
+                </a:tc>
+                <a:tc>
+                  <a:txBody>
+                    <a:bodyPr/>
+                    <a:lstStyle/>
+                    <a:p>
+                      <a:r>
+                        <a:rPr sz="900"/>
+                        <a:t>0.21%</a:t>
+                      </a:r>
+                    </a:p>
+                  </a:txBody>
+                  <a:tcPr/>
+                </a:tc>
+                <a:tc>
+                  <a:txBody>
+                    <a:bodyPr/>
+                    <a:lstStyle/>
+                    <a:p>
+                      <a:r>
+                        <a:rPr sz="900"/>
+                        <a:t>0.41%</a:t>
+                      </a:r>
+                    </a:p>
+                  </a:txBody>
+                  <a:tcPr/>
+                </a:tc>
+                <a:tc>
+                  <a:txBody>
+                    <a:bodyPr/>
+                    <a:lstStyle/>
+                    <a:p>
+                      <a:r>
+                        <a:rPr sz="900"/>
+                        <a:t>0.03%</a:t>
+                      </a:r>
+                    </a:p>
+                  </a:txBody>
+                  <a:tcPr/>
+                </a:tc>
+                <a:tc>
+                  <a:txBody>
+                    <a:bodyPr/>
+                    <a:lstStyle/>
+                    <a:p>
+                      <a:r>
+                        <a:rPr sz="900"/>
+                        <a:t>0.92%</a:t>
+                      </a:r>
+                    </a:p>
+                  </a:txBody>
+                  <a:tcPr/>
+                </a:tc>
+              </a:tr>
+              <a:tr h="370840">
+                <a:tc vMerge="1">
+                  <a:txBody>
+                    <a:bodyPr/>
+                    <a:lstStyle/>
+                    <a:p>
+                      <a:r>
+                        <a:rPr sz="900" b="1"/>
+                        <a:t>2017</a:t>
+                      </a:r>
+                    </a:p>
+                  </a:txBody>
+                  <a:tcPr/>
+                </a:tc>
+                <a:tc>
+                  <a:txBody>
+                    <a:bodyPr/>
+                    <a:lstStyle/>
+                    <a:p>
+                      <a:r>
+                        <a:rPr sz="900" b="1"/>
+                        <a:t>Dec 31, 2017</a:t>
+                      </a:r>
+                    </a:p>
+                  </a:txBody>
+                  <a:tcPr/>
+                </a:tc>
+                <a:tc>
+                  <a:txBody>
+                    <a:bodyPr/>
+                    <a:lstStyle/>
+                    <a:p>
+                      <a:r>
+                        <a:rPr sz="900"/>
+                        <a:t>0.45%</a:t>
+                      </a:r>
+                    </a:p>
+                  </a:txBody>
+                  <a:tcPr/>
+                </a:tc>
+                <a:tc>
+                  <a:txBody>
+                    <a:bodyPr/>
+                    <a:lstStyle/>
+                    <a:p>
+                      <a:r>
+                        <a:rPr sz="900"/>
+                        <a:t>0.99%</a:t>
+                      </a:r>
+                    </a:p>
+                  </a:txBody>
+                  <a:tcPr/>
+                </a:tc>
+                <a:tc>
+                  <a:txBody>
+                    <a:bodyPr/>
+                    <a:lstStyle/>
+                    <a:p>
+                      <a:r>
+                        <a:rPr sz="900"/>
+                        <a:t>0.99%</a:t>
+                      </a:r>
+                    </a:p>
+                  </a:txBody>
+                  <a:tcPr/>
+                </a:tc>
+                <a:tc>
+                  <a:txBody>
+                    <a:bodyPr/>
+                    <a:lstStyle/>
+                    <a:p>
+                      <a:r>
+                        <a:rPr sz="900"/>
+                        <a:t>0.76%</a:t>
+                      </a:r>
+                    </a:p>
+                  </a:txBody>
+                  <a:tcPr/>
+                </a:tc>
+                <a:tc>
+                  <a:txBody>
+                    <a:bodyPr/>
+                    <a:lstStyle/>
+                    <a:p>
+                      <a:r>
+                        <a:rPr sz="900"/>
+                        <a:t>3.19%</a:t>
+                      </a:r>
+                    </a:p>
+                  </a:txBody>
+                  <a:tcPr/>
+                </a:tc>
+              </a:tr>
+              <a:tr h="370840">
+                <a:tc rowSpan="2">
                   <a:txBody>
                     <a:bodyPr/>
                     <a:lstStyle/>
                     <a:p>
                       <a:pPr algn="ctr"/>
                       <a:r>
-                        <a:rPr b="0" i="0" sz="900">
-                          <a:latin typeface="Calibri"/>
-                        </a:rPr>
-                        <a:t>0.19</a:t>
-                      </a:r>
-                    </a:p>
-                  </a:txBody>
-                  <a:tcPr marT="22860" marB="22860" marL="22860" marR="22860">
-                    <a:solidFill>
-                      <a:srgbClr val="F5F5F5"/>
-                    </a:solidFill>
-                  </a:tcPr>
-                </a:tc>
-                <a:tc>
-                  <a:txBody>
-                    <a:bodyPr/>
-                    <a:lstStyle/>
-                    <a:p>
-                      <a:pPr algn="ctr"/>
-                      <a:r>
-                        <a:rPr b="0" i="0" sz="900">
-                          <a:latin typeface="Calibri"/>
-                        </a:rPr>
-                        <a:t>0.01</a:t>
-                      </a:r>
-                    </a:p>
-                  </a:txBody>
-                  <a:tcPr marT="22860" marB="22860" marL="22860" marR="22860">
-                    <a:solidFill>
-                      <a:srgbClr val="F5F5F5"/>
-                    </a:solidFill>
-                  </a:tcPr>
-                </a:tc>
-                <a:tc>
-                  <a:txBody>
-                    <a:bodyPr/>
-                    <a:lstStyle/>
-                    <a:p>
-                      <a:pPr algn="ctr"/>
-                      <a:r>
-                        <a:rPr b="0" i="0" sz="900">
-                          <a:latin typeface="Calibri"/>
-                        </a:rPr>
-                        <a:t>0.13</a:t>
-                      </a:r>
-                    </a:p>
-                  </a:txBody>
-                  <a:tcPr marT="22860" marB="22860" marL="22860" marR="22860">
-                    <a:solidFill>
-                      <a:srgbClr val="F5F5F5"/>
-                    </a:solidFill>
-                  </a:tcPr>
-                </a:tc>
-                <a:tc>
-                  <a:txBody>
-                    <a:bodyPr/>
-                    <a:lstStyle/>
-                    <a:p>
-                      <a:pPr algn="ctr"/>
-                      <a:r>
-                        <a:rPr b="0" i="0" sz="900">
-                          <a:latin typeface="Calibri"/>
-                        </a:rPr>
-                        <a:t>0.37</a:t>
-                      </a:r>
-                    </a:p>
-                  </a:txBody>
-                  <a:tcPr marT="22860" marB="22860" marL="22860" marR="22860">
-                    <a:solidFill>
-                      <a:srgbClr val="F5F5F5"/>
-                    </a:solidFill>
-                  </a:tcPr>
-                </a:tc>
-                <a:tc>
-                  <a:txBody>
-                    <a:bodyPr/>
-                    <a:lstStyle/>
-                    <a:p>
-                      <a:pPr algn="ctr"/>
-                      <a:r>
-                        <a:rPr b="0" i="0" sz="900">
-                          <a:latin typeface="Calibri"/>
-                        </a:rPr>
-                        <a:t>0.13</a:t>
-                      </a:r>
-                    </a:p>
-                  </a:txBody>
-                  <a:tcPr marT="22860" marB="22860" marL="22860" marR="22860">
-                    <a:solidFill>
-                      <a:srgbClr val="F5F5F5"/>
-                    </a:solidFill>
-                  </a:tcPr>
-                </a:tc>
-                <a:tc>
-                  <a:txBody>
-                    <a:bodyPr/>
-                    <a:lstStyle/>
-                    <a:p>
-                      <a:pPr algn="ctr"/>
-                      <a:r>
-                        <a:rPr b="0" i="0" sz="900">
-                          <a:latin typeface="Calibri"/>
-                        </a:rPr>
-                        <a:t>1.08</a:t>
-                      </a:r>
-                    </a:p>
-                  </a:txBody>
-                  <a:tcPr marT="22860" marB="22860" marL="22860" marR="22860">
-                    <a:solidFill>
-                      <a:srgbClr val="F5F5F5"/>
-                    </a:solidFill>
-                  </a:tcPr>
+                        <a:rPr sz="900" b="1"/>
+                        <a:t>2017</a:t>
+                      </a:r>
+                    </a:p>
+                  </a:txBody>
+                  <a:tcPr/>
+                </a:tc>
+                <a:tc>
+                  <a:txBody>
+                    <a:bodyPr/>
+                    <a:lstStyle/>
+                    <a:p>
+                      <a:r>
+                        <a:rPr sz="900" b="1"/>
+                        <a:t>Mar 31, 2018</a:t>
+                      </a:r>
+                    </a:p>
+                  </a:txBody>
+                  <a:tcPr/>
+                </a:tc>
+                <a:tc>
+                  <a:txBody>
+                    <a:bodyPr/>
+                    <a:lstStyle/>
+                    <a:p>
+                      <a:r>
+                        <a:rPr sz="900"/>
+                        <a:t>0.80%</a:t>
+                      </a:r>
+                    </a:p>
+                  </a:txBody>
+                  <a:tcPr/>
+                </a:tc>
+                <a:tc>
+                  <a:txBody>
+                    <a:bodyPr/>
+                    <a:lstStyle/>
+                    <a:p>
+                      <a:r>
+                        <a:rPr sz="900"/>
+                        <a:t>0.42%</a:t>
+                      </a:r>
+                    </a:p>
+                  </a:txBody>
+                  <a:tcPr/>
+                </a:tc>
+                <a:tc>
+                  <a:txBody>
+                    <a:bodyPr/>
+                    <a:lstStyle/>
+                    <a:p>
+                      <a:r>
+                        <a:rPr sz="900"/>
+                        <a:t>0.87%</a:t>
+                      </a:r>
+                    </a:p>
+                  </a:txBody>
+                  <a:tcPr/>
+                </a:tc>
+                <a:tc>
+                  <a:txBody>
+                    <a:bodyPr/>
+                    <a:lstStyle/>
+                    <a:p>
+                      <a:r>
+                        <a:rPr sz="900"/>
+                        <a:t>0.64%</a:t>
+                      </a:r>
+                    </a:p>
+                  </a:txBody>
+                  <a:tcPr/>
+                </a:tc>
+                <a:tc>
+                  <a:txBody>
+                    <a:bodyPr/>
+                    <a:lstStyle/>
+                    <a:p>
+                      <a:r>
+                        <a:rPr sz="900"/>
+                        <a:t>2.72%</a:t>
+                      </a:r>
+                    </a:p>
+                  </a:txBody>
+                  <a:tcPr/>
                 </a:tc>
               </a:tr>
-              <a:tr h="137160">
-                <a:tc>
-                  <a:txBody>
-                    <a:bodyPr/>
-                    <a:lstStyle/>
-                    <a:p>
-                      <a:r>
-                        <a:rPr b="0" i="0" sz="900">
-                          <a:latin typeface="Calibri"/>
-                        </a:rPr>
-                        <a:t>b</a:t>
-                      </a:r>
-                    </a:p>
-                  </a:txBody>
-                  <a:tcPr marT="22860" marB="22860" marL="22860" marR="22860">
-                    <a:solidFill>
-                      <a:srgbClr val="EBEBEB"/>
-                    </a:solidFill>
-                  </a:tcPr>
-                </a:tc>
-                <a:tc>
-                  <a:txBody>
-                    <a:bodyPr/>
-                    <a:lstStyle/>
-                    <a:p>
-                      <a:pPr algn="ctr"/>
-                      <a:r>
-                        <a:rPr b="0" i="0" sz="900">
-                          <a:latin typeface="Calibri"/>
-                        </a:rPr>
-                        <a:t>0.51</a:t>
-                      </a:r>
-                    </a:p>
-                  </a:txBody>
-                  <a:tcPr marT="22860" marB="22860" marL="22860" marR="22860">
-                    <a:solidFill>
-                      <a:srgbClr val="EBEBEB"/>
-                    </a:solidFill>
-                  </a:tcPr>
-                </a:tc>
-                <a:tc>
-                  <a:txBody>
-                    <a:bodyPr/>
-                    <a:lstStyle/>
-                    <a:p>
-                      <a:pPr algn="ctr"/>
-                      <a:r>
-                        <a:rPr b="0" i="0" sz="900">
-                          <a:latin typeface="Calibri"/>
-                        </a:rPr>
-                        <a:t>0.83</a:t>
-                      </a:r>
-                    </a:p>
-                  </a:txBody>
-                  <a:tcPr marT="22860" marB="22860" marL="22860" marR="22860">
-                    <a:solidFill>
-                      <a:srgbClr val="EBEBEB"/>
-                    </a:solidFill>
-                  </a:tcPr>
-                </a:tc>
-                <a:tc>
-                  <a:txBody>
-                    <a:bodyPr/>
-                    <a:lstStyle/>
-                    <a:p>
-                      <a:pPr algn="ctr"/>
-                      <a:r>
-                        <a:rPr b="0" i="0" sz="900">
-                          <a:latin typeface="Calibri"/>
-                        </a:rPr>
-                        <a:t>0.86</a:t>
-                      </a:r>
-                    </a:p>
-                  </a:txBody>
-                  <a:tcPr marT="22860" marB="22860" marL="22860" marR="22860">
-                    <a:solidFill>
-                      <a:srgbClr val="EBEBEB"/>
-                    </a:solidFill>
-                  </a:tcPr>
-                </a:tc>
-                <a:tc>
-                  <a:txBody>
-                    <a:bodyPr/>
-                    <a:lstStyle/>
-                    <a:p>
-                      <a:pPr algn="ctr"/>
-                      <a:r>
-                        <a:rPr b="0" i="0" sz="900">
-                          <a:latin typeface="Calibri"/>
-                        </a:rPr>
-                        <a:t>0.06</a:t>
-                      </a:r>
-                    </a:p>
-                  </a:txBody>
-                  <a:tcPr marT="22860" marB="22860" marL="22860" marR="22860">
-                    <a:solidFill>
-                      <a:srgbClr val="EBEBEB"/>
-                    </a:solidFill>
-                  </a:tcPr>
-                </a:tc>
-                <a:tc>
-                  <a:txBody>
-                    <a:bodyPr/>
-                    <a:lstStyle/>
-                    <a:p>
-                      <a:pPr algn="ctr"/>
-                      <a:r>
-                        <a:rPr b="0" i="0" sz="900">
-                          <a:latin typeface="Calibri"/>
-                        </a:rPr>
-                        <a:t>0.78</a:t>
-                      </a:r>
-                    </a:p>
-                  </a:txBody>
-                  <a:tcPr marT="22860" marB="22860" marL="22860" marR="22860">
-                    <a:solidFill>
-                      <a:srgbClr val="EBEBEB"/>
-                    </a:solidFill>
-                  </a:tcPr>
-                </a:tc>
-                <a:tc>
-                  <a:txBody>
-                    <a:bodyPr/>
-                    <a:lstStyle/>
-                    <a:p>
-                      <a:pPr algn="ctr"/>
-                      <a:r>
-                        <a:rPr b="0" i="0" sz="900">
-                          <a:latin typeface="Calibri"/>
-                        </a:rPr>
-                        <a:t>0.49</a:t>
-                      </a:r>
-                    </a:p>
-                  </a:txBody>
-                  <a:tcPr marT="22860" marB="22860" marL="22860" marR="22860">
-                    <a:solidFill>
-                      <a:srgbClr val="EBEBEB"/>
-                    </a:solidFill>
-                  </a:tcPr>
-                </a:tc>
-                <a:tc>
-                  <a:txBody>
-                    <a:bodyPr/>
-                    <a:lstStyle/>
-                    <a:p>
-                      <a:pPr algn="ctr"/>
-                      <a:r>
-                        <a:rPr b="0" i="0" sz="900">
-                          <a:latin typeface="Calibri"/>
-                        </a:rPr>
-                        <a:t>3.53</a:t>
-                      </a:r>
-                    </a:p>
-                  </a:txBody>
-                  <a:tcPr marT="22860" marB="22860" marL="22860" marR="22860">
-                    <a:solidFill>
-                      <a:srgbClr val="EBEBEB"/>
-                    </a:solidFill>
-                  </a:tcPr>
+              <a:tr h="370840">
+                <a:tc vMerge="1">
+                  <a:txBody>
+                    <a:bodyPr/>
+                    <a:lstStyle/>
+                    <a:p>
+                      <a:r>
+                        <a:rPr sz="900" b="1"/>
+                        <a:t>2017</a:t>
+                      </a:r>
+                    </a:p>
+                  </a:txBody>
+                  <a:tcPr/>
+                </a:tc>
+                <a:tc>
+                  <a:txBody>
+                    <a:bodyPr/>
+                    <a:lstStyle/>
+                    <a:p>
+                      <a:r>
+                        <a:rPr sz="900" b="1"/>
+                        <a:t>Jun 30, 2018</a:t>
+                      </a:r>
+                    </a:p>
+                  </a:txBody>
+                  <a:tcPr/>
+                </a:tc>
+                <a:tc>
+                  <a:txBody>
+                    <a:bodyPr/>
+                    <a:lstStyle/>
+                    <a:p>
+                      <a:r>
+                        <a:rPr sz="900"/>
+                        <a:t>0.21%</a:t>
+                      </a:r>
+                    </a:p>
+                  </a:txBody>
+                  <a:tcPr/>
+                </a:tc>
+                <a:tc>
+                  <a:txBody>
+                    <a:bodyPr/>
+                    <a:lstStyle/>
+                    <a:p>
+                      <a:r>
+                        <a:rPr sz="900"/>
+                        <a:t>0.33%</a:t>
+                      </a:r>
+                    </a:p>
+                  </a:txBody>
+                  <a:tcPr/>
+                </a:tc>
+                <a:tc>
+                  <a:txBody>
+                    <a:bodyPr/>
+                    <a:lstStyle/>
+                    <a:p>
+                      <a:r>
+                        <a:rPr sz="900"/>
+                        <a:t>0.59%</a:t>
+                      </a:r>
+                    </a:p>
+                  </a:txBody>
+                  <a:tcPr/>
+                </a:tc>
+                <a:tc>
+                  <a:txBody>
+                    <a:bodyPr/>
+                    <a:lstStyle/>
+                    <a:p>
+                      <a:r>
+                        <a:rPr sz="900"/>
+                        <a:t>0.16%</a:t>
+                      </a:r>
+                    </a:p>
+                  </a:txBody>
+                  <a:tcPr/>
+                </a:tc>
+                <a:tc>
+                  <a:txBody>
+                    <a:bodyPr/>
+                    <a:lstStyle/>
+                    <a:p>
+                      <a:r>
+                        <a:rPr sz="900"/>
+                        <a:t>1.28%</a:t>
+                      </a:r>
+                    </a:p>
+                  </a:txBody>
+                  <a:tcPr/>
                 </a:tc>
               </a:tr>
-              <a:tr h="137160">
-                <a:tc>
-                  <a:txBody>
-                    <a:bodyPr/>
-                    <a:lstStyle/>
-                    <a:p>
-                      <a:r>
-                        <a:rPr b="0" i="0" sz="900">
-                          <a:latin typeface="Calibri"/>
-                        </a:rPr>
-                        <a:t>c</a:t>
-                      </a:r>
-                    </a:p>
-                  </a:txBody>
-                  <a:tcPr marT="22860" marB="22860" marL="22860" marR="22860">
-                    <a:solidFill>
-                      <a:srgbClr val="F5F5F5"/>
-                    </a:solidFill>
-                  </a:tcPr>
-                </a:tc>
-                <a:tc>
-                  <a:txBody>
-                    <a:bodyPr/>
-                    <a:lstStyle/>
-                    <a:p>
-                      <a:pPr algn="ctr"/>
-                      <a:r>
-                        <a:rPr b="0" i="0" sz="900">
-                          <a:latin typeface="Calibri"/>
-                        </a:rPr>
-                        <a:t>0.13</a:t>
-                      </a:r>
-                    </a:p>
-                  </a:txBody>
-                  <a:tcPr marT="22860" marB="22860" marL="22860" marR="22860">
-                    <a:solidFill>
-                      <a:srgbClr val="F5F5F5"/>
-                    </a:solidFill>
-                  </a:tcPr>
-                </a:tc>
-                <a:tc>
-                  <a:txBody>
-                    <a:bodyPr/>
-                    <a:lstStyle/>
-                    <a:p>
-                      <a:pPr algn="ctr"/>
-                      <a:r>
-                        <a:rPr b="0" i="0" sz="900">
-                          <a:latin typeface="Calibri"/>
-                        </a:rPr>
-                        <a:t>0.59</a:t>
-                      </a:r>
-                    </a:p>
-                  </a:txBody>
-                  <a:tcPr marT="22860" marB="22860" marL="22860" marR="22860">
-                    <a:solidFill>
-                      <a:srgbClr val="F5F5F5"/>
-                    </a:solidFill>
-                  </a:tcPr>
-                </a:tc>
-                <a:tc>
-                  <a:txBody>
-                    <a:bodyPr/>
-                    <a:lstStyle/>
-                    <a:p>
-                      <a:pPr algn="ctr"/>
-                      <a:r>
-                        <a:rPr b="0" i="0" sz="900">
-                          <a:latin typeface="Calibri"/>
-                        </a:rPr>
-                        <a:t>0.71</a:t>
-                      </a:r>
-                    </a:p>
-                  </a:txBody>
-                  <a:tcPr marT="22860" marB="22860" marL="22860" marR="22860">
-                    <a:solidFill>
-                      <a:srgbClr val="F5F5F5"/>
-                    </a:solidFill>
-                  </a:tcPr>
-                </a:tc>
-                <a:tc>
-                  <a:txBody>
-                    <a:bodyPr/>
-                    <a:lstStyle/>
-                    <a:p>
-                      <a:pPr algn="ctr"/>
-                      <a:r>
-                        <a:rPr b="0" i="0" sz="900">
-                          <a:latin typeface="Calibri"/>
-                        </a:rPr>
-                        <a:t>0.68</a:t>
-                      </a:r>
-                    </a:p>
-                  </a:txBody>
-                  <a:tcPr marT="22860" marB="22860" marL="22860" marR="22860">
-                    <a:solidFill>
-                      <a:srgbClr val="F5F5F5"/>
-                    </a:solidFill>
-                  </a:tcPr>
-                </a:tc>
-                <a:tc>
-                  <a:txBody>
-                    <a:bodyPr/>
-                    <a:lstStyle/>
-                    <a:p>
-                      <a:pPr algn="ctr"/>
-                      <a:r>
-                        <a:rPr b="0" i="0" sz="900">
-                          <a:latin typeface="Calibri"/>
-                        </a:rPr>
-                        <a:t>0.42</a:t>
-                      </a:r>
-                    </a:p>
-                  </a:txBody>
-                  <a:tcPr marT="22860" marB="22860" marL="22860" marR="22860">
-                    <a:solidFill>
-                      <a:srgbClr val="F5F5F5"/>
-                    </a:solidFill>
-                  </a:tcPr>
-                </a:tc>
-                <a:tc>
-                  <a:txBody>
-                    <a:bodyPr/>
-                    <a:lstStyle/>
-                    <a:p>
-                      <a:pPr algn="ctr"/>
-                      <a:r>
-                        <a:rPr b="0" i="0" sz="900">
-                          <a:latin typeface="Calibri"/>
-                        </a:rPr>
-                        <a:t>0.39</a:t>
-                      </a:r>
-                    </a:p>
-                  </a:txBody>
-                  <a:tcPr marT="22860" marB="22860" marL="22860" marR="22860">
-                    <a:solidFill>
-                      <a:srgbClr val="F5F5F5"/>
-                    </a:solidFill>
-                  </a:tcPr>
-                </a:tc>
-                <a:tc>
-                  <a:txBody>
-                    <a:bodyPr/>
-                    <a:lstStyle/>
-                    <a:p>
-                      <a:pPr algn="ctr"/>
-                      <a:r>
-                        <a:rPr b="0" i="0" sz="900">
-                          <a:latin typeface="Calibri"/>
-                        </a:rPr>
-                        <a:t>2.93</a:t>
-                      </a:r>
-                    </a:p>
-                  </a:txBody>
-                  <a:tcPr marT="22860" marB="22860" marL="22860" marR="22860">
-                    <a:solidFill>
-                      <a:srgbClr val="F5F5F5"/>
-                    </a:solidFill>
-                  </a:tcPr>
-                </a:tc>
-              </a:tr>
-              <a:tr h="137160">
-                <a:tc>
-                  <a:txBody>
-                    <a:bodyPr/>
-                    <a:lstStyle/>
-                    <a:p>
-                      <a:r>
-                        <a:rPr b="0" i="0" sz="900">
-                          <a:latin typeface="Calibri"/>
-                        </a:rPr>
-                        <a:t>d</a:t>
-                      </a:r>
-                    </a:p>
-                  </a:txBody>
-                  <a:tcPr marT="22860" marB="22860" marL="22860" marR="22860">
-                    <a:solidFill>
-                      <a:srgbClr val="EBEBEB"/>
-                    </a:solidFill>
-                  </a:tcPr>
-                </a:tc>
-                <a:tc>
-                  <a:txBody>
-                    <a:bodyPr/>
-                    <a:lstStyle/>
-                    <a:p>
-                      <a:pPr algn="ctr"/>
-                      <a:r>
-                        <a:rPr b="0" i="0" sz="900">
-                          <a:latin typeface="Calibri"/>
-                        </a:rPr>
-                        <a:t>0.63</a:t>
-                      </a:r>
-                    </a:p>
-                  </a:txBody>
-                  <a:tcPr marT="22860" marB="22860" marL="22860" marR="22860">
-                    <a:solidFill>
-                      <a:srgbClr val="EBEBEB"/>
-                    </a:solidFill>
-                  </a:tcPr>
-                </a:tc>
-                <a:tc>
-                  <a:txBody>
-                    <a:bodyPr/>
-                    <a:lstStyle/>
-                    <a:p>
-                      <a:pPr algn="ctr"/>
-                      <a:r>
-                        <a:rPr b="0" i="0" sz="900">
-                          <a:latin typeface="Calibri"/>
-                        </a:rPr>
-                        <a:t>0.87</a:t>
-                      </a:r>
-                    </a:p>
-                  </a:txBody>
-                  <a:tcPr marT="22860" marB="22860" marL="22860" marR="22860">
-                    <a:solidFill>
-                      <a:srgbClr val="EBEBEB"/>
-                    </a:solidFill>
-                  </a:tcPr>
-                </a:tc>
-                <a:tc>
-                  <a:txBody>
-                    <a:bodyPr/>
-                    <a:lstStyle/>
-                    <a:p>
-                      <a:pPr algn="ctr"/>
-                      <a:r>
-                        <a:rPr b="0" i="0" sz="900">
-                          <a:latin typeface="Calibri"/>
-                        </a:rPr>
-                        <a:t>0.13</a:t>
-                      </a:r>
-                    </a:p>
-                  </a:txBody>
-                  <a:tcPr marT="22860" marB="22860" marL="22860" marR="22860">
-                    <a:solidFill>
-                      <a:srgbClr val="EBEBEB"/>
-                    </a:solidFill>
-                  </a:tcPr>
-                </a:tc>
-                <a:tc>
-                  <a:txBody>
-                    <a:bodyPr/>
-                    <a:lstStyle/>
-                    <a:p>
-                      <a:pPr algn="ctr"/>
-                      <a:r>
-                        <a:rPr b="0" i="0" sz="900">
-                          <a:latin typeface="Calibri"/>
-                        </a:rPr>
-                        <a:t>0.78</a:t>
-                      </a:r>
-                    </a:p>
-                  </a:txBody>
-                  <a:tcPr marT="22860" marB="22860" marL="22860" marR="22860">
-                    <a:solidFill>
-                      <a:srgbClr val="EBEBEB"/>
-                    </a:solidFill>
-                  </a:tcPr>
-                </a:tc>
-                <a:tc>
-                  <a:txBody>
-                    <a:bodyPr/>
-                    <a:lstStyle/>
-                    <a:p>
-                      <a:pPr algn="ctr"/>
-                      <a:r>
-                        <a:rPr b="0" i="0" sz="900">
-                          <a:latin typeface="Calibri"/>
-                        </a:rPr>
-                        <a:t>0.59</a:t>
-                      </a:r>
-                    </a:p>
-                  </a:txBody>
-                  <a:tcPr marT="22860" marB="22860" marL="22860" marR="22860">
-                    <a:solidFill>
-                      <a:srgbClr val="EBEBEB"/>
-                    </a:solidFill>
-                  </a:tcPr>
-                </a:tc>
-                <a:tc>
-                  <a:txBody>
-                    <a:bodyPr/>
-                    <a:lstStyle/>
-                    <a:p>
-                      <a:pPr algn="ctr"/>
-                      <a:r>
-                        <a:rPr b="0" i="0" sz="900">
-                          <a:latin typeface="Calibri"/>
-                        </a:rPr>
-                        <a:t>0.50</a:t>
-                      </a:r>
-                    </a:p>
-                  </a:txBody>
-                  <a:tcPr marT="22860" marB="22860" marL="22860" marR="22860">
-                    <a:solidFill>
-                      <a:srgbClr val="EBEBEB"/>
-                    </a:solidFill>
-                  </a:tcPr>
-                </a:tc>
-                <a:tc>
-                  <a:txBody>
-                    <a:bodyPr/>
-                    <a:lstStyle/>
-                    <a:p>
-                      <a:pPr algn="ctr"/>
-                      <a:r>
-                        <a:rPr b="0" i="0" sz="900">
-                          <a:latin typeface="Calibri"/>
-                        </a:rPr>
-                        <a:t>3.50</a:t>
-                      </a:r>
-                    </a:p>
-                  </a:txBody>
-                  <a:tcPr marT="22860" marB="22860" marL="22860" marR="22860">
-                    <a:solidFill>
-                      <a:srgbClr val="EBEBEB"/>
-                    </a:solidFill>
-                  </a:tcPr>
-                </a:tc>
-              </a:tr>
-              <a:tr h="137160">
-                <a:tc>
-                  <a:txBody>
-                    <a:bodyPr/>
-                    <a:lstStyle/>
-                    <a:p>
-                      <a:r>
-                        <a:rPr b="0" i="0" sz="900">
-                          <a:latin typeface="Calibri"/>
-                        </a:rPr>
-                        <a:t>Annual Total</a:t>
-                      </a:r>
-                    </a:p>
-                  </a:txBody>
-                  <a:tcPr marT="22860" marB="22860" marL="22860" marR="22860">
-                    <a:solidFill>
-                      <a:srgbClr val="F5F5F5"/>
-                    </a:solidFill>
-                  </a:tcPr>
-                </a:tc>
-                <a:tc>
-                  <a:txBody>
-                    <a:bodyPr/>
-                    <a:lstStyle/>
-                    <a:p>
-                      <a:pPr algn="ctr"/>
-                      <a:r>
-                        <a:rPr b="0" i="0" sz="900">
-                          <a:latin typeface="Calibri"/>
-                        </a:rPr>
-                        <a:t>1.53</a:t>
-                      </a:r>
-                    </a:p>
-                  </a:txBody>
-                  <a:tcPr marT="22860" marB="22860" marL="22860" marR="22860">
-                    <a:solidFill>
-                      <a:srgbClr val="F5F5F5"/>
-                    </a:solidFill>
-                  </a:tcPr>
-                </a:tc>
-                <a:tc>
-                  <a:txBody>
-                    <a:bodyPr/>
-                    <a:lstStyle/>
-                    <a:p>
-                      <a:pPr algn="ctr"/>
-                      <a:r>
-                        <a:rPr b="0" i="0" sz="900">
-                          <a:latin typeface="Calibri"/>
-                        </a:rPr>
-                        <a:t>2.48</a:t>
-                      </a:r>
-                    </a:p>
-                  </a:txBody>
-                  <a:tcPr marT="22860" marB="22860" marL="22860" marR="22860">
-                    <a:solidFill>
-                      <a:srgbClr val="F5F5F5"/>
-                    </a:solidFill>
-                  </a:tcPr>
-                </a:tc>
-                <a:tc>
-                  <a:txBody>
-                    <a:bodyPr/>
-                    <a:lstStyle/>
-                    <a:p>
-                      <a:pPr algn="ctr"/>
-                      <a:r>
-                        <a:rPr b="0" i="0" sz="900">
-                          <a:latin typeface="Calibri"/>
-                        </a:rPr>
-                        <a:t>1.72</a:t>
-                      </a:r>
-                    </a:p>
-                  </a:txBody>
-                  <a:tcPr marT="22860" marB="22860" marL="22860" marR="22860">
-                    <a:solidFill>
-                      <a:srgbClr val="F5F5F5"/>
-                    </a:solidFill>
-                  </a:tcPr>
-                </a:tc>
-                <a:tc>
-                  <a:txBody>
-                    <a:bodyPr/>
-                    <a:lstStyle/>
-                    <a:p>
-                      <a:pPr algn="ctr"/>
-                      <a:r>
-                        <a:rPr b="0" i="0" sz="900">
-                          <a:latin typeface="Calibri"/>
-                        </a:rPr>
-                        <a:t>1.65</a:t>
-                      </a:r>
-                    </a:p>
-                  </a:txBody>
-                  <a:tcPr marT="22860" marB="22860" marL="22860" marR="22860">
-                    <a:solidFill>
-                      <a:srgbClr val="F5F5F5"/>
-                    </a:solidFill>
-                  </a:tcPr>
-                </a:tc>
-                <a:tc>
-                  <a:txBody>
-                    <a:bodyPr/>
-                    <a:lstStyle/>
-                    <a:p>
-                      <a:pPr algn="ctr"/>
-                      <a:r>
-                        <a:rPr b="0" i="0" sz="900">
-                          <a:latin typeface="Calibri"/>
-                        </a:rPr>
-                        <a:t>2.15</a:t>
-                      </a:r>
-                    </a:p>
-                  </a:txBody>
-                  <a:tcPr marT="22860" marB="22860" marL="22860" marR="22860">
-                    <a:solidFill>
-                      <a:srgbClr val="F5F5F5"/>
-                    </a:solidFill>
-                  </a:tcPr>
-                </a:tc>
-                <a:tc>
-                  <a:txBody>
-                    <a:bodyPr/>
-                    <a:lstStyle/>
-                    <a:p>
-                      <a:pPr algn="ctr"/>
-                      <a:r>
-                        <a:rPr b="0" i="0" sz="900">
-                          <a:latin typeface="Calibri"/>
-                        </a:rPr>
-                        <a:t>1.50</a:t>
-                      </a:r>
-                    </a:p>
-                  </a:txBody>
-                  <a:tcPr marT="22860" marB="22860" marL="22860" marR="22860">
-                    <a:solidFill>
-                      <a:srgbClr val="F5F5F5"/>
-                    </a:solidFill>
-                  </a:tcPr>
-                </a:tc>
-                <a:tc>
-                  <a:txBody>
-                    <a:bodyPr/>
-                    <a:lstStyle/>
-                    <a:p>
-                      <a:pPr algn="ctr"/>
-                      <a:r>
-                        <a:rPr b="0" i="0" sz="900">
-                          <a:latin typeface="Calibri"/>
-                        </a:rPr>
-                        <a:t>11.04</a:t>
-                      </a:r>
-                    </a:p>
-                  </a:txBody>
-                  <a:tcPr marT="22860" marB="22860" marL="22860" marR="22860">
-                    <a:solidFill>
-                      <a:srgbClr val="F5F5F5"/>
-                    </a:solidFill>
-                  </a:tcPr>
+              <a:tr h="370840">
+                <a:tc>
+                  <a:txBody>
+                    <a:bodyPr/>
+                    <a:lstStyle/>
+                    <a:p>
+                      <a:r>
+                        <a:rPr sz="900" b="1"/>
+                        <a:t>Total</a:t>
+                      </a:r>
+                    </a:p>
+                  </a:txBody>
+                  <a:tcPr/>
+                </a:tc>
+                <a:tc>
+                  <a:txBody>
+                    <a:bodyPr/>
+                    <a:lstStyle/>
+                    <a:p>
+                      <a:r>
+                        <a:rPr sz="900" b="1"/>
+                        <a:t> </a:t>
+                      </a:r>
+                    </a:p>
+                  </a:txBody>
+                  <a:tcPr/>
+                </a:tc>
+                <a:tc>
+                  <a:txBody>
+                    <a:bodyPr/>
+                    <a:lstStyle/>
+                    <a:p>
+                      <a:r>
+                        <a:rPr sz="900"/>
+                        <a:t>2.40%</a:t>
+                      </a:r>
+                    </a:p>
+                  </a:txBody>
+                  <a:tcPr/>
+                </a:tc>
+                <a:tc>
+                  <a:txBody>
+                    <a:bodyPr/>
+                    <a:lstStyle/>
+                    <a:p>
+                      <a:r>
+                        <a:rPr sz="900"/>
+                        <a:t>3.02%</a:t>
+                      </a:r>
+                    </a:p>
+                  </a:txBody>
+                  <a:tcPr/>
+                </a:tc>
+                <a:tc>
+                  <a:txBody>
+                    <a:bodyPr/>
+                    <a:lstStyle/>
+                    <a:p>
+                      <a:r>
+                        <a:rPr sz="900"/>
+                        <a:t>4.15%</a:t>
+                      </a:r>
+                    </a:p>
+                  </a:txBody>
+                  <a:tcPr/>
+                </a:tc>
+                <a:tc>
+                  <a:txBody>
+                    <a:bodyPr/>
+                    <a:lstStyle/>
+                    <a:p>
+                      <a:r>
+                        <a:rPr sz="900"/>
+                        <a:t>3.11%</a:t>
+                      </a:r>
+                    </a:p>
+                  </a:txBody>
+                  <a:tcPr/>
+                </a:tc>
+                <a:tc>
+                  <a:txBody>
+                    <a:bodyPr/>
+                    <a:lstStyle/>
+                    <a:p>
+                      <a:r>
+                        <a:rPr sz="900"/>
+                        <a:t>12.68%</a:t>
+                      </a:r>
+                    </a:p>
+                  </a:txBody>
+                  <a:tcPr/>
                 </a:tc>
               </a:tr>
             </a:tbl>
           </a:graphicData>
         </a:graphic>
       </p:graphicFrame>
-      <p:graphicFrame>
-        <p:nvGraphicFramePr>
+      <p:sp>
+        <p:nvSpPr>
           <p:cNvPr id="4" name="Chart Placeholder 3"/>
-          <p:cNvGraphicFramePr>
-            <a:graphicFrameLocks noGrp="1"/>
-          </p:cNvGraphicFramePr>
+          <p:cNvSpPr>
+            <a:spLocks noGrp="1"/>
+          </p:cNvSpPr>
           <p:nvPr>
             <p:ph type="chart" idx="14" sz="quarter"/>
           </p:nvPr>
-        </p:nvGraphicFramePr>
-        <p:xfrm>
-          <a:off x="6172202" y="1847850"/>
-          <a:ext cx="5181598" cy="4351338"/>
-        </p:xfrm>
-        <a:graphic>
-          <a:graphicData uri="http://schemas.openxmlformats.org/drawingml/2006/chart">
-            <c:chart xmlns:c="http://schemas.openxmlformats.org/drawingml/2006/chart" r:id="rId2"/>
-          </a:graphicData>
-        </a:graphic>
-      </p:graphicFrame>
+        </p:nvSpPr>
+        <p:spPr/>
+      </p:sp>
     </p:spTree>
   </p:cSld>
   <p:clrMapOvr>

</xml_diff>

<commit_message>
bug fix - broken immutable index when formatting, format index now always creates new index
</commit_message>
<xml_diff>
--- a/examples/example_report.pptx
+++ b/examples/example_report.pptx
@@ -3684,7 +3684,7 @@
                             <a:srgbClr val="FFFFFF"/>
                           </a:solidFill>
                         </a:rPr>
-                        <a:t>Group1</a:t>
+                        <a:t>Group2</a:t>
                       </a:r>
                     </a:p>
                   </a:txBody>
@@ -3705,7 +3705,7 @@
                             <a:srgbClr val="FFFFFF"/>
                           </a:solidFill>
                         </a:rPr>
-                        <a:t>Group1</a:t>
+                        <a:t>Group2</a:t>
                       </a:r>
                     </a:p>
                   </a:txBody>
@@ -3921,7 +3921,113 @@
                     <a:p>
                       <a:r>
                         <a:rPr sz="900"/>
-                        <a:t>0.28%</a:t>
+                        <a:t>0.45%</a:t>
+                      </a:r>
+                    </a:p>
+                  </a:txBody>
+                  <a:tcPr/>
+                </a:tc>
+                <a:tc>
+                  <a:txBody>
+                    <a:bodyPr/>
+                    <a:lstStyle/>
+                    <a:p>
+                      <a:r>
+                        <a:rPr sz="900"/>
+                        <a:t>0.04%</a:t>
+                      </a:r>
+                    </a:p>
+                  </a:txBody>
+                  <a:tcPr/>
+                </a:tc>
+                <a:tc>
+                  <a:txBody>
+                    <a:bodyPr/>
+                    <a:lstStyle/>
+                    <a:p>
+                      <a:r>
+                        <a:rPr sz="900"/>
+                        <a:t>0.96%</a:t>
+                      </a:r>
+                    </a:p>
+                  </a:txBody>
+                  <a:tcPr/>
+                </a:tc>
+                <a:tc>
+                  <a:txBody>
+                    <a:bodyPr/>
+                    <a:lstStyle/>
+                    <a:p>
+                      <a:r>
+                        <a:rPr sz="900"/>
+                        <a:t>0.93%</a:t>
+                      </a:r>
+                    </a:p>
+                  </a:txBody>
+                  <a:tcPr/>
+                </a:tc>
+                <a:tc>
+                  <a:txBody>
+                    <a:bodyPr/>
+                    <a:lstStyle/>
+                    <a:p>
+                      <a:r>
+                        <a:rPr sz="900"/>
+                        <a:t>2.37%</a:t>
+                      </a:r>
+                    </a:p>
+                  </a:txBody>
+                  <a:tcPr/>
+                </a:tc>
+              </a:tr>
+              <a:tr h="370840">
+                <a:tc>
+                  <a:txBody>
+                    <a:bodyPr/>
+                    <a:lstStyle/>
+                    <a:p>
+                      <a:r>
+                        <a:rPr sz="900" b="1"/>
+                        <a:t>2017</a:t>
+                      </a:r>
+                    </a:p>
+                  </a:txBody>
+                  <a:tcPr/>
+                </a:tc>
+                <a:tc>
+                  <a:txBody>
+                    <a:bodyPr/>
+                    <a:lstStyle/>
+                    <a:p>
+                      <a:r>
+                        <a:rPr sz="900" b="1"/>
+                        <a:t>Jun 30, 2017</a:t>
+                      </a:r>
+                    </a:p>
+                  </a:txBody>
+                  <a:tcPr/>
+                </a:tc>
+                <a:tc>
+                  <a:txBody>
+                    <a:bodyPr/>
+                    <a:lstStyle/>
+                    <a:p>
+                      <a:r>
+                        <a:rPr sz="900"/>
+                        <a:t>0.08%</a:t>
+                      </a:r>
+                    </a:p>
+                  </a:txBody>
+                  <a:tcPr/>
+                </a:tc>
+                <a:tc>
+                  <a:txBody>
+                    <a:bodyPr/>
+                    <a:lstStyle/>
+                    <a:p>
+                      <a:r>
+                        <a:rPr sz="900"/>
+                        <a:t>0.02%</a:t>
                       </a:r>
                     </a:p>
                   </a:txBody>
@@ -3947,7 +4053,7 @@
                     <a:p>
                       <a:r>
                         <a:rPr sz="900"/>
-                        <a:t>0.69%</a:t>
+                        <a:t>0.71%</a:t>
                       </a:r>
                     </a:p>
                   </a:txBody>
@@ -3960,20 +4066,7 @@
                     <a:p>
                       <a:r>
                         <a:rPr sz="900"/>
-                        <a:t>0.81%</a:t>
-                      </a:r>
-                    </a:p>
-                  </a:txBody>
-                  <a:tcPr/>
-                </a:tc>
-                <a:tc>
-                  <a:txBody>
-                    <a:bodyPr/>
-                    <a:lstStyle/>
-                    <a:p>
-                      <a:r>
-                        <a:rPr sz="900"/>
-                        <a:t>1.90%</a:t>
+                        <a:t>0.94%</a:t>
                       </a:r>
                     </a:p>
                   </a:txBody>
@@ -4001,7 +4094,7 @@
                     <a:p>
                       <a:r>
                         <a:rPr sz="900" b="1"/>
-                        <a:t>Jun 30, 2017</a:t>
+                        <a:t>Sep 30, 2017</a:t>
                       </a:r>
                     </a:p>
                   </a:txBody>
@@ -4014,7 +4107,7 @@
                     <a:p>
                       <a:r>
                         <a:rPr sz="900"/>
-                        <a:t>0.36%</a:t>
+                        <a:t>0.12%</a:t>
                       </a:r>
                     </a:p>
                   </a:txBody>
@@ -4027,7 +4120,7 @@
                     <a:p>
                       <a:r>
                         <a:rPr sz="900"/>
-                        <a:t>0.96%</a:t>
+                        <a:t>0.34%</a:t>
                       </a:r>
                     </a:p>
                   </a:txBody>
@@ -4040,7 +4133,7 @@
                     <a:p>
                       <a:r>
                         <a:rPr sz="900"/>
-                        <a:t>0.62%</a:t>
+                        <a:t>0.78%</a:t>
                       </a:r>
                     </a:p>
                   </a:txBody>
@@ -4053,7 +4146,7 @@
                     <a:p>
                       <a:r>
                         <a:rPr sz="900"/>
-                        <a:t>0.73%</a:t>
+                        <a:t>0.24%</a:t>
                       </a:r>
                     </a:p>
                   </a:txBody>
@@ -4066,100 +4159,7 @@
                     <a:p>
                       <a:r>
                         <a:rPr sz="900"/>
-                        <a:t>2.67%</a:t>
-                      </a:r>
-                    </a:p>
-                  </a:txBody>
-                  <a:tcPr/>
-                </a:tc>
-              </a:tr>
-              <a:tr h="370840">
-                <a:tc>
-                  <a:txBody>
-                    <a:bodyPr/>
-                    <a:lstStyle/>
-                    <a:p>
-                      <a:r>
-                        <a:rPr sz="900" b="1"/>
-                        <a:t>2017</a:t>
-                      </a:r>
-                    </a:p>
-                  </a:txBody>
-                  <a:tcPr/>
-                </a:tc>
-                <a:tc>
-                  <a:txBody>
-                    <a:bodyPr/>
-                    <a:lstStyle/>
-                    <a:p>
-                      <a:r>
-                        <a:rPr sz="900" b="1"/>
-                        <a:t>Sep 30, 2017</a:t>
-                      </a:r>
-                    </a:p>
-                  </a:txBody>
-                  <a:tcPr/>
-                </a:tc>
-                <a:tc>
-                  <a:txBody>
-                    <a:bodyPr/>
-                    <a:lstStyle/>
-                    <a:p>
-                      <a:r>
-                        <a:rPr sz="900"/>
-                        <a:t>0.28%</a:t>
-                      </a:r>
-                    </a:p>
-                  </a:txBody>
-                  <a:tcPr/>
-                </a:tc>
-                <a:tc>
-                  <a:txBody>
-                    <a:bodyPr/>
-                    <a:lstStyle/>
-                    <a:p>
-                      <a:r>
-                        <a:rPr sz="900"/>
-                        <a:t>0.21%</a:t>
-                      </a:r>
-                    </a:p>
-                  </a:txBody>
-                  <a:tcPr/>
-                </a:tc>
-                <a:tc>
-                  <a:txBody>
-                    <a:bodyPr/>
-                    <a:lstStyle/>
-                    <a:p>
-                      <a:r>
-                        <a:rPr sz="900"/>
-                        <a:t>0.41%</a:t>
-                      </a:r>
-                    </a:p>
-                  </a:txBody>
-                  <a:tcPr/>
-                </a:tc>
-                <a:tc>
-                  <a:txBody>
-                    <a:bodyPr/>
-                    <a:lstStyle/>
-                    <a:p>
-                      <a:r>
-                        <a:rPr sz="900"/>
-                        <a:t>0.03%</a:t>
-                      </a:r>
-                    </a:p>
-                  </a:txBody>
-                  <a:tcPr/>
-                </a:tc>
-                <a:tc>
-                  <a:txBody>
-                    <a:bodyPr/>
-                    <a:lstStyle/>
-                    <a:p>
-                      <a:r>
-                        <a:rPr sz="900"/>
-                        <a:t>0.92%</a:t>
+                        <a:t>1.48%</a:t>
                       </a:r>
                     </a:p>
                   </a:txBody>
@@ -4200,7 +4200,7 @@
                     <a:p>
                       <a:r>
                         <a:rPr sz="900"/>
-                        <a:t>0.45%</a:t>
+                        <a:t>0.66%</a:t>
                       </a:r>
                     </a:p>
                   </a:txBody>
@@ -4213,7 +4213,7 @@
                     <a:p>
                       <a:r>
                         <a:rPr sz="900"/>
-                        <a:t>0.99%</a:t>
+                        <a:t>0.51%</a:t>
                       </a:r>
                     </a:p>
                   </a:txBody>
@@ -4226,7 +4226,7 @@
                     <a:p>
                       <a:r>
                         <a:rPr sz="900"/>
-                        <a:t>0.99%</a:t>
+                        <a:t>0.37%</a:t>
                       </a:r>
                     </a:p>
                   </a:txBody>
@@ -4239,7 +4239,7 @@
                     <a:p>
                       <a:r>
                         <a:rPr sz="900"/>
-                        <a:t>0.76%</a:t>
+                        <a:t>0.27%</a:t>
                       </a:r>
                     </a:p>
                   </a:txBody>
@@ -4252,7 +4252,7 @@
                     <a:p>
                       <a:r>
                         <a:rPr sz="900"/>
-                        <a:t>3.19%</a:t>
+                        <a:t>1.82%</a:t>
                       </a:r>
                     </a:p>
                   </a:txBody>
@@ -4268,7 +4268,7 @@
                       <a:pPr algn="ctr"/>
                       <a:r>
                         <a:rPr sz="900" b="1"/>
-                        <a:t>2017</a:t>
+                        <a:t>2018</a:t>
                       </a:r>
                     </a:p>
                   </a:txBody>
@@ -4294,7 +4294,7 @@
                     <a:p>
                       <a:r>
                         <a:rPr sz="900"/>
-                        <a:t>0.80%</a:t>
+                        <a:t>0.76%</a:t>
                       </a:r>
                     </a:p>
                   </a:txBody>
@@ -4307,7 +4307,7 @@
                     <a:p>
                       <a:r>
                         <a:rPr sz="900"/>
-                        <a:t>0.42%</a:t>
+                        <a:t>0.93%</a:t>
                       </a:r>
                     </a:p>
                   </a:txBody>
@@ -4320,7 +4320,7 @@
                     <a:p>
                       <a:r>
                         <a:rPr sz="900"/>
-                        <a:t>0.87%</a:t>
+                        <a:t>0.17%</a:t>
                       </a:r>
                     </a:p>
                   </a:txBody>
@@ -4333,7 +4333,7 @@
                     <a:p>
                       <a:r>
                         <a:rPr sz="900"/>
-                        <a:t>0.64%</a:t>
+                        <a:t>0.95%</a:t>
                       </a:r>
                     </a:p>
                   </a:txBody>
@@ -4346,7 +4346,7 @@
                     <a:p>
                       <a:r>
                         <a:rPr sz="900"/>
-                        <a:t>2.72%</a:t>
+                        <a:t>2.80%</a:t>
                       </a:r>
                     </a:p>
                   </a:txBody>
@@ -4361,7 +4361,7 @@
                     <a:p>
                       <a:r>
                         <a:rPr sz="900" b="1"/>
-                        <a:t>2017</a:t>
+                        <a:t>2018</a:t>
                       </a:r>
                     </a:p>
                   </a:txBody>
@@ -4387,7 +4387,7 @@
                     <a:p>
                       <a:r>
                         <a:rPr sz="900"/>
-                        <a:t>0.21%</a:t>
+                        <a:t>0.01%</a:t>
                       </a:r>
                     </a:p>
                   </a:txBody>
@@ -4400,7 +4400,7 @@
                     <a:p>
                       <a:r>
                         <a:rPr sz="900"/>
-                        <a:t>0.33%</a:t>
+                        <a:t>0.18%</a:t>
                       </a:r>
                     </a:p>
                   </a:txBody>
@@ -4413,7 +4413,7 @@
                     <a:p>
                       <a:r>
                         <a:rPr sz="900"/>
-                        <a:t>0.59%</a:t>
+                        <a:t>0.66%</a:t>
                       </a:r>
                     </a:p>
                   </a:txBody>
@@ -4426,7 +4426,7 @@
                     <a:p>
                       <a:r>
                         <a:rPr sz="900"/>
-                        <a:t>0.16%</a:t>
+                        <a:t>0.84%</a:t>
                       </a:r>
                     </a:p>
                   </a:txBody>
@@ -4439,7 +4439,7 @@
                     <a:p>
                       <a:r>
                         <a:rPr sz="900"/>
-                        <a:t>1.28%</a:t>
+                        <a:t>1.70%</a:t>
                       </a:r>
                     </a:p>
                   </a:txBody>
@@ -4480,7 +4480,7 @@
                     <a:p>
                       <a:r>
                         <a:rPr sz="900"/>
-                        <a:t>2.40%</a:t>
+                        <a:t>2.08%</a:t>
                       </a:r>
                     </a:p>
                   </a:txBody>
@@ -4493,7 +4493,7 @@
                     <a:p>
                       <a:r>
                         <a:rPr sz="900"/>
-                        <a:t>3.02%</a:t>
+                        <a:t>2.02%</a:t>
                       </a:r>
                     </a:p>
                   </a:txBody>
@@ -4506,7 +4506,7 @@
                     <a:p>
                       <a:r>
                         <a:rPr sz="900"/>
-                        <a:t>4.15%</a:t>
+                        <a:t>3.05%</a:t>
                       </a:r>
                     </a:p>
                   </a:txBody>
@@ -4519,7 +4519,7 @@
                     <a:p>
                       <a:r>
                         <a:rPr sz="900"/>
-                        <a:t>3.11%</a:t>
+                        <a:t>3.95%</a:t>
                       </a:r>
                     </a:p>
                   </a:txBody>
@@ -4532,7 +4532,7 @@
                     <a:p>
                       <a:r>
                         <a:rPr sz="900"/>
-                        <a:t>12.68%</a:t>
+                        <a:t>11.09%</a:t>
                       </a:r>
                     </a:p>
                   </a:txBody>

</xml_diff>

<commit_message>
add features row height, cell margines, replace handler with util functions
</commit_message>
<xml_diff>
--- a/examples/example_report.pptx
+++ b/examples/example_report.pptx
@@ -5,7 +5,7 @@
     <p:sldMasterId id="2147483648" r:id="rId1"/>
   </p:sldMasterIdLst>
   <p:sldIdLst>
-    <p:sldId id="256" r:id="rId7"/>
+    <p:sldId id="256" r:id="rId2"/>
   </p:sldIdLst>
   <p:sldSz cx="12192000" cy="6858000"/>
   <p:notesSz cx="6858000" cy="9144000"/>
@@ -123,10 +123,6 @@
 </p:presentation>
 </file>
 
-<file path=ppt/revisionInfo.xml><?xml version="1.0" encoding="utf-8"?>
-<p1510:revInfo xmlns:a="http://schemas.openxmlformats.org/drawingml/2006/main" xmlns:r="http://schemas.openxmlformats.org/officeDocument/2006/relationships" xmlns:p1510="http://schemas.microsoft.com/office/powerpoint/2015/10/main"/>
-</file>
-
 <file path=ppt/slideLayouts/slideLayout1.xml><?xml version="1.0" encoding="utf-8"?>
 <p:sldLayout xmlns:a="http://schemas.openxmlformats.org/drawingml/2006/main" xmlns:r="http://schemas.openxmlformats.org/officeDocument/2006/relationships" xmlns:p="http://schemas.openxmlformats.org/presentationml/2006/main" type="title" preserve="1">
   <p:cSld name="Title Slide">
@@ -274,7 +270,7 @@
           <a:p>
             <a:fld id="{9301CAA1-A9D3-4148-AB22-2F35928D9E24}" type="datetimeFigureOut">
               <a:rPr lang="en-US" smtClean="0"/>
-              <a:t>12/29/2017</a:t>
+              <a:t>9/26/2018</a:t>
             </a:fld>
             <a:endParaRPr lang="en-US"/>
           </a:p>
@@ -562,7 +558,7 @@
           <a:p>
             <a:fld id="{9301CAA1-A9D3-4148-AB22-2F35928D9E24}" type="datetimeFigureOut">
               <a:rPr lang="en-US" smtClean="0"/>
-              <a:t>12/29/2017</a:t>
+              <a:t>9/26/2018</a:t>
             </a:fld>
             <a:endParaRPr lang="en-US"/>
           </a:p>
@@ -760,7 +756,7 @@
           <a:p>
             <a:fld id="{9301CAA1-A9D3-4148-AB22-2F35928D9E24}" type="datetimeFigureOut">
               <a:rPr lang="en-US" smtClean="0"/>
-              <a:t>12/29/2017</a:t>
+              <a:t>9/26/2018</a:t>
             </a:fld>
             <a:endParaRPr lang="en-US"/>
           </a:p>
@@ -968,7 +964,7 @@
           <a:p>
             <a:fld id="{9301CAA1-A9D3-4148-AB22-2F35928D9E24}" type="datetimeFigureOut">
               <a:rPr lang="en-US" smtClean="0"/>
-              <a:t>12/29/2017</a:t>
+              <a:t>9/26/2018</a:t>
             </a:fld>
             <a:endParaRPr lang="en-US"/>
           </a:p>
@@ -1166,7 +1162,7 @@
           <a:p>
             <a:fld id="{9301CAA1-A9D3-4148-AB22-2F35928D9E24}" type="datetimeFigureOut">
               <a:rPr lang="en-US" smtClean="0"/>
-              <a:t>12/29/2017</a:t>
+              <a:t>9/26/2018</a:t>
             </a:fld>
             <a:endParaRPr lang="en-US"/>
           </a:p>
@@ -1441,7 +1437,7 @@
           <a:p>
             <a:fld id="{9301CAA1-A9D3-4148-AB22-2F35928D9E24}" type="datetimeFigureOut">
               <a:rPr lang="en-US" smtClean="0"/>
-              <a:t>12/29/2017</a:t>
+              <a:t>9/26/2018</a:t>
             </a:fld>
             <a:endParaRPr lang="en-US"/>
           </a:p>
@@ -1706,7 +1702,7 @@
           <a:p>
             <a:fld id="{9301CAA1-A9D3-4148-AB22-2F35928D9E24}" type="datetimeFigureOut">
               <a:rPr lang="en-US" smtClean="0"/>
-              <a:t>12/29/2017</a:t>
+              <a:t>9/26/2018</a:t>
             </a:fld>
             <a:endParaRPr lang="en-US"/>
           </a:p>
@@ -1847,7 +1843,7 @@
           <a:p>
             <a:fld id="{9301CAA1-A9D3-4148-AB22-2F35928D9E24}" type="datetimeFigureOut">
               <a:rPr lang="en-US" smtClean="0"/>
-              <a:t>12/29/2017</a:t>
+              <a:t>9/26/2018</a:t>
             </a:fld>
             <a:endParaRPr lang="en-US"/>
           </a:p>
@@ -2319,7 +2315,7 @@
           <a:p>
             <a:fld id="{9301CAA1-A9D3-4148-AB22-2F35928D9E24}" type="datetimeFigureOut">
               <a:rPr lang="en-US" smtClean="0"/>
-              <a:t>12/29/2017</a:t>
+              <a:t>9/26/2018</a:t>
             </a:fld>
             <a:endParaRPr lang="en-US"/>
           </a:p>
@@ -2460,7 +2456,7 @@
           <a:p>
             <a:fld id="{9301CAA1-A9D3-4148-AB22-2F35928D9E24}" type="datetimeFigureOut">
               <a:rPr lang="en-US" smtClean="0"/>
-              <a:t>12/29/2017</a:t>
+              <a:t>9/26/2018</a:t>
             </a:fld>
             <a:endParaRPr lang="en-US"/>
           </a:p>
@@ -2573,7 +2569,7 @@
           <a:p>
             <a:fld id="{9301CAA1-A9D3-4148-AB22-2F35928D9E24}" type="datetimeFigureOut">
               <a:rPr lang="en-US" smtClean="0"/>
-              <a:t>12/29/2017</a:t>
+              <a:t>9/26/2018</a:t>
             </a:fld>
             <a:endParaRPr lang="en-US"/>
           </a:p>
@@ -2884,7 +2880,7 @@
           <a:p>
             <a:fld id="{9301CAA1-A9D3-4148-AB22-2F35928D9E24}" type="datetimeFigureOut">
               <a:rPr lang="en-US" smtClean="0"/>
-              <a:t>12/29/2017</a:t>
+              <a:t>9/26/2018</a:t>
             </a:fld>
             <a:endParaRPr lang="en-US"/>
           </a:p>
@@ -3125,7 +3121,7 @@
           <a:p>
             <a:fld id="{9301CAA1-A9D3-4148-AB22-2F35928D9E24}" type="datetimeFigureOut">
               <a:rPr lang="en-US" smtClean="0"/>
-              <a:t>12/29/2017</a:t>
+              <a:t>9/26/2018</a:t>
             </a:fld>
             <a:endParaRPr lang="en-US"/>
           </a:p>
@@ -3527,7 +3523,7 @@
 </file>
 
 <file path=ppt/slides/slide1.xml><?xml version="1.0" encoding="utf-8"?>
-<p:sld xmlns:a="http://schemas.openxmlformats.org/drawingml/2006/main" xmlns:p="http://schemas.openxmlformats.org/presentationml/2006/main" xmlns:r="http://schemas.openxmlformats.org/officeDocument/2006/relationships">
+<p:sld xmlns:a="http://schemas.openxmlformats.org/drawingml/2006/main" xmlns:r="http://schemas.openxmlformats.org/officeDocument/2006/relationships" xmlns:p="http://schemas.openxmlformats.org/presentationml/2006/main">
   <p:cSld>
     <p:spTree>
       <p:nvGrpSpPr>
@@ -3535,7 +3531,14 @@
         <p:cNvGrpSpPr/>
         <p:nvPr/>
       </p:nvGrpSpPr>
-      <p:grpSpPr/>
+      <p:grpSpPr>
+        <a:xfrm>
+          <a:off x="0" y="0"/>
+          <a:ext cx="0" cy="0"/>
+          <a:chOff x="0" y="0"/>
+          <a:chExt cx="0" cy="0"/>
+        </a:xfrm>
+      </p:grpSpPr>
       <p:sp>
         <p:nvSpPr>
           <p:cNvPr id="2" name="Title 1"/>
@@ -3564,12 +3567,17 @@
             <a:graphicFrameLocks noGrp="1"/>
           </p:cNvGraphicFramePr>
           <p:nvPr>
-            <p:ph type="tbl" idx="13" sz="quarter"/>
+            <p:ph type="tbl" sz="quarter" idx="13"/>
+            <p:extLst>
+              <p:ext uri="{D42A27DB-BD31-4B8C-83A1-F6EECF244321}">
+                <p14:modId xmlns:p14="http://schemas.microsoft.com/office/powerpoint/2010/main" val="4062412184"/>
+              </p:ext>
+            </p:extLst>
           </p:nvPr>
         </p:nvGraphicFramePr>
         <p:xfrm>
           <a:off x="838200" y="1847850"/>
-          <a:ext cx="5181600" cy="3337560"/>
+          <a:ext cx="5181600" cy="1783080"/>
         </p:xfrm>
         <a:graphic>
           <a:graphicData uri="http://schemas.openxmlformats.org/drawingml/2006/table">
@@ -3578,15 +3586,57 @@
                 <a:tableStyleId>{5C22544A-7EE6-4342-B048-85BDC9FD1C3A}</a:tableStyleId>
               </a:tblPr>
               <a:tblGrid>
-                <a:gridCol w="740228"/>
-                <a:gridCol w="740228"/>
-                <a:gridCol w="740228"/>
-                <a:gridCol w="740228"/>
-                <a:gridCol w="740228"/>
-                <a:gridCol w="740228"/>
-                <a:gridCol w="740232"/>
+                <a:gridCol w="740228">
+                  <a:extLst>
+                    <a:ext uri="{9D8B030D-6E8A-4147-A177-3AD203B41FA5}">
+                      <a16:colId xmlns:a16="http://schemas.microsoft.com/office/drawing/2014/main" val="20000"/>
+                    </a:ext>
+                  </a:extLst>
+                </a:gridCol>
+                <a:gridCol w="740228">
+                  <a:extLst>
+                    <a:ext uri="{9D8B030D-6E8A-4147-A177-3AD203B41FA5}">
+                      <a16:colId xmlns:a16="http://schemas.microsoft.com/office/drawing/2014/main" val="20001"/>
+                    </a:ext>
+                  </a:extLst>
+                </a:gridCol>
+                <a:gridCol w="740228">
+                  <a:extLst>
+                    <a:ext uri="{9D8B030D-6E8A-4147-A177-3AD203B41FA5}">
+                      <a16:colId xmlns:a16="http://schemas.microsoft.com/office/drawing/2014/main" val="20002"/>
+                    </a:ext>
+                  </a:extLst>
+                </a:gridCol>
+                <a:gridCol w="740228">
+                  <a:extLst>
+                    <a:ext uri="{9D8B030D-6E8A-4147-A177-3AD203B41FA5}">
+                      <a16:colId xmlns:a16="http://schemas.microsoft.com/office/drawing/2014/main" val="20003"/>
+                    </a:ext>
+                  </a:extLst>
+                </a:gridCol>
+                <a:gridCol w="740228">
+                  <a:extLst>
+                    <a:ext uri="{9D8B030D-6E8A-4147-A177-3AD203B41FA5}">
+                      <a16:colId xmlns:a16="http://schemas.microsoft.com/office/drawing/2014/main" val="20004"/>
+                    </a:ext>
+                  </a:extLst>
+                </a:gridCol>
+                <a:gridCol w="740228">
+                  <a:extLst>
+                    <a:ext uri="{9D8B030D-6E8A-4147-A177-3AD203B41FA5}">
+                      <a16:colId xmlns:a16="http://schemas.microsoft.com/office/drawing/2014/main" val="20005"/>
+                    </a:ext>
+                  </a:extLst>
+                </a:gridCol>
+                <a:gridCol w="740232">
+                  <a:extLst>
+                    <a:ext uri="{9D8B030D-6E8A-4147-A177-3AD203B41FA5}">
+                      <a16:colId xmlns:a16="http://schemas.microsoft.com/office/drawing/2014/main" val="20006"/>
+                    </a:ext>
+                  </a:extLst>
+                </a:gridCol>
               </a:tblGrid>
-              <a:tr h="370840">
+              <a:tr h="137160">
                 <a:tc>
                   <a:txBody>
                     <a:bodyPr/>
@@ -3602,7 +3652,7 @@
                       </a:r>
                     </a:p>
                   </a:txBody>
-                  <a:tcPr>
+                  <a:tcPr marL="22860" marR="22860" marT="22860" marB="22860">
                     <a:solidFill>
                       <a:schemeClr val="accent1"/>
                     </a:solidFill>
@@ -3623,7 +3673,7 @@
                       </a:r>
                     </a:p>
                   </a:txBody>
-                  <a:tcPr>
+                  <a:tcPr marL="22860" marR="22860" marT="22860" marB="22860">
                     <a:solidFill>
                       <a:schemeClr val="accent1"/>
                     </a:solidFill>
@@ -3635,6 +3685,27 @@
                     <a:lstStyle/>
                     <a:p>
                       <a:pPr algn="ctr"/>
+                      <a:r>
+                        <a:rPr sz="900" b="1" dirty="0">
+                          <a:solidFill>
+                            <a:srgbClr val="FFFFFF"/>
+                          </a:solidFill>
+                        </a:rPr>
+                        <a:t>Group1</a:t>
+                      </a:r>
+                    </a:p>
+                  </a:txBody>
+                  <a:tcPr marL="22860" marR="22860" marT="22860" marB="22860">
+                    <a:solidFill>
+                      <a:schemeClr val="accent1"/>
+                    </a:solidFill>
+                  </a:tcPr>
+                </a:tc>
+                <a:tc hMerge="1">
+                  <a:txBody>
+                    <a:bodyPr/>
+                    <a:lstStyle/>
+                    <a:p>
                       <a:r>
                         <a:rPr sz="900" b="1">
                           <a:solidFill>
@@ -3645,39 +3716,39 @@
                       </a:r>
                     </a:p>
                   </a:txBody>
-                  <a:tcPr>
+                  <a:tcPr marL="22860" marR="22860" marT="22860" marB="22860">
                     <a:solidFill>
                       <a:schemeClr val="accent1"/>
                     </a:solidFill>
                   </a:tcPr>
                 </a:tc>
-                <a:tc hMerge="1">
-                  <a:txBody>
-                    <a:bodyPr/>
-                    <a:lstStyle/>
-                    <a:p>
-                      <a:r>
-                        <a:rPr sz="900" b="1">
+                <a:tc gridSpan="2">
+                  <a:txBody>
+                    <a:bodyPr/>
+                    <a:lstStyle/>
+                    <a:p>
+                      <a:pPr algn="ctr"/>
+                      <a:r>
+                        <a:rPr sz="900" b="1" dirty="0">
                           <a:solidFill>
                             <a:srgbClr val="FFFFFF"/>
                           </a:solidFill>
                         </a:rPr>
-                        <a:t>Group1</a:t>
-                      </a:r>
-                    </a:p>
-                  </a:txBody>
-                  <a:tcPr>
+                        <a:t>Group2</a:t>
+                      </a:r>
+                    </a:p>
+                  </a:txBody>
+                  <a:tcPr marL="22860" marR="22860" marT="22860" marB="22860">
                     <a:solidFill>
                       <a:schemeClr val="accent1"/>
                     </a:solidFill>
                   </a:tcPr>
                 </a:tc>
-                <a:tc gridSpan="2">
-                  <a:txBody>
-                    <a:bodyPr/>
-                    <a:lstStyle/>
-                    <a:p>
-                      <a:pPr algn="ctr"/>
+                <a:tc hMerge="1">
+                  <a:txBody>
+                    <a:bodyPr/>
+                    <a:lstStyle/>
+                    <a:p>
                       <a:r>
                         <a:rPr sz="900" b="1">
                           <a:solidFill>
@@ -3688,28 +3759,7 @@
                       </a:r>
                     </a:p>
                   </a:txBody>
-                  <a:tcPr>
-                    <a:solidFill>
-                      <a:schemeClr val="accent1"/>
-                    </a:solidFill>
-                  </a:tcPr>
-                </a:tc>
-                <a:tc hMerge="1">
-                  <a:txBody>
-                    <a:bodyPr/>
-                    <a:lstStyle/>
-                    <a:p>
-                      <a:r>
-                        <a:rPr sz="900" b="1">
-                          <a:solidFill>
-                            <a:srgbClr val="FFFFFF"/>
-                          </a:solidFill>
-                        </a:rPr>
-                        <a:t>Group2</a:t>
-                      </a:r>
-                    </a:p>
-                  </a:txBody>
-                  <a:tcPr>
+                  <a:tcPr marL="22860" marR="22860" marT="22860" marB="22860">
                     <a:solidFill>
                       <a:schemeClr val="accent1"/>
                     </a:solidFill>
@@ -3730,30 +3780,28 @@
                       </a:r>
                     </a:p>
                   </a:txBody>
-                  <a:tcPr>
+                  <a:tcPr marL="22860" marR="22860" marT="22860" marB="22860">
                     <a:solidFill>
                       <a:schemeClr val="accent1"/>
                     </a:solidFill>
                   </a:tcPr>
                 </a:tc>
+                <a:extLst>
+                  <a:ext uri="{0D108BD9-81ED-4DB2-BD59-A6C34878D82A}">
+                    <a16:rowId xmlns:a16="http://schemas.microsoft.com/office/drawing/2014/main" val="10000"/>
+                  </a:ext>
+                </a:extLst>
               </a:tr>
-              <a:tr h="370840">
-                <a:tc>
-                  <a:txBody>
-                    <a:bodyPr/>
-                    <a:lstStyle/>
-                    <a:p>
-                      <a:r>
-                        <a:rPr sz="900" b="1">
-                          <a:solidFill>
-                            <a:srgbClr val="FFFFFF"/>
-                          </a:solidFill>
-                        </a:rPr>
-                        <a:t/>
-                      </a:r>
-                    </a:p>
-                  </a:txBody>
-                  <a:tcPr>
+              <a:tr h="137160">
+                <a:tc>
+                  <a:txBody>
+                    <a:bodyPr/>
+                    <a:lstStyle/>
+                    <a:p>
+                      <a:endParaRPr/>
+                    </a:p>
+                  </a:txBody>
+                  <a:tcPr marL="22860" marR="22860" marT="22860" marB="22860">
                     <a:solidFill>
                       <a:schemeClr val="accent1"/>
                     </a:solidFill>
@@ -3764,17 +3812,10 @@
                     <a:bodyPr/>
                     <a:lstStyle/>
                     <a:p>
-                      <a:r>
-                        <a:rPr sz="900" b="1">
-                          <a:solidFill>
-                            <a:srgbClr val="FFFFFF"/>
-                          </a:solidFill>
-                        </a:rPr>
-                        <a:t/>
-                      </a:r>
-                    </a:p>
-                  </a:txBody>
-                  <a:tcPr>
+                      <a:endParaRPr/>
+                    </a:p>
+                  </a:txBody>
+                  <a:tcPr marL="22860" marR="22860" marT="22860" marB="22860">
                     <a:solidFill>
                       <a:schemeClr val="accent1"/>
                     </a:solidFill>
@@ -3795,7 +3836,7 @@
                       </a:r>
                     </a:p>
                   </a:txBody>
-                  <a:tcPr>
+                  <a:tcPr marL="22860" marR="22860" marT="22860" marB="22860">
                     <a:solidFill>
                       <a:schemeClr val="accent1"/>
                     </a:solidFill>
@@ -3816,7 +3857,7 @@
                       </a:r>
                     </a:p>
                   </a:txBody>
-                  <a:tcPr>
+                  <a:tcPr marL="22860" marR="22860" marT="22860" marB="22860">
                     <a:solidFill>
                       <a:schemeClr val="accent1"/>
                     </a:solidFill>
@@ -3837,7 +3878,7 @@
                       </a:r>
                     </a:p>
                   </a:txBody>
-                  <a:tcPr>
+                  <a:tcPr marL="22860" marR="22860" marT="22860" marB="22860">
                     <a:solidFill>
                       <a:schemeClr val="accent1"/>
                     </a:solidFill>
@@ -3858,7 +3899,7 @@
                       </a:r>
                     </a:p>
                   </a:txBody>
-                  <a:tcPr>
+                  <a:tcPr marL="22860" marR="22860" marT="22860" marB="22860">
                     <a:solidFill>
                       <a:schemeClr val="accent1"/>
                     </a:solidFill>
@@ -3879,40 +3920,241 @@
                       </a:r>
                     </a:p>
                   </a:txBody>
-                  <a:tcPr>
+                  <a:tcPr marL="22860" marR="22860" marT="22860" marB="22860">
                     <a:solidFill>
                       <a:schemeClr val="accent1"/>
                     </a:solidFill>
                   </a:tcPr>
                 </a:tc>
+                <a:extLst>
+                  <a:ext uri="{0D108BD9-81ED-4DB2-BD59-A6C34878D82A}">
+                    <a16:rowId xmlns:a16="http://schemas.microsoft.com/office/drawing/2014/main" val="10001"/>
+                  </a:ext>
+                </a:extLst>
               </a:tr>
-              <a:tr h="370840">
+              <a:tr h="137160">
                 <a:tc rowSpan="4">
                   <a:txBody>
                     <a:bodyPr/>
                     <a:lstStyle/>
                     <a:p>
                       <a:pPr algn="ctr"/>
+                      <a:r>
+                        <a:rPr sz="900" b="1" dirty="0"/>
+                        <a:t>2017</a:t>
+                      </a:r>
+                    </a:p>
+                  </a:txBody>
+                  <a:tcPr marL="22860" marR="22860" marT="22860" marB="22860"/>
+                </a:tc>
+                <a:tc>
+                  <a:txBody>
+                    <a:bodyPr/>
+                    <a:lstStyle/>
+                    <a:p>
+                      <a:r>
+                        <a:rPr sz="900" b="1" dirty="0"/>
+                        <a:t>Mar 31, 2017</a:t>
+                      </a:r>
+                    </a:p>
+                  </a:txBody>
+                  <a:tcPr marL="22860" marR="22860" marT="22860" marB="22860"/>
+                </a:tc>
+                <a:tc>
+                  <a:txBody>
+                    <a:bodyPr/>
+                    <a:lstStyle/>
+                    <a:p>
+                      <a:r>
+                        <a:rPr sz="900"/>
+                        <a:t>0.51%</a:t>
+                      </a:r>
+                    </a:p>
+                  </a:txBody>
+                  <a:tcPr marL="22860" marR="22860" marT="22860" marB="22860"/>
+                </a:tc>
+                <a:tc>
+                  <a:txBody>
+                    <a:bodyPr/>
+                    <a:lstStyle/>
+                    <a:p>
+                      <a:r>
+                        <a:rPr sz="900"/>
+                        <a:t>0.89%</a:t>
+                      </a:r>
+                    </a:p>
+                  </a:txBody>
+                  <a:tcPr marL="22860" marR="22860" marT="22860" marB="22860"/>
+                </a:tc>
+                <a:tc>
+                  <a:txBody>
+                    <a:bodyPr/>
+                    <a:lstStyle/>
+                    <a:p>
+                      <a:r>
+                        <a:rPr sz="900"/>
+                        <a:t>0.74%</a:t>
+                      </a:r>
+                    </a:p>
+                  </a:txBody>
+                  <a:tcPr marL="22860" marR="22860" marT="22860" marB="22860"/>
+                </a:tc>
+                <a:tc>
+                  <a:txBody>
+                    <a:bodyPr/>
+                    <a:lstStyle/>
+                    <a:p>
+                      <a:r>
+                        <a:rPr sz="900"/>
+                        <a:t>0.29%</a:t>
+                      </a:r>
+                    </a:p>
+                  </a:txBody>
+                  <a:tcPr marL="22860" marR="22860" marT="22860" marB="22860"/>
+                </a:tc>
+                <a:tc>
+                  <a:txBody>
+                    <a:bodyPr/>
+                    <a:lstStyle/>
+                    <a:p>
+                      <a:r>
+                        <a:rPr sz="900" dirty="0"/>
+                        <a:t>2.43%</a:t>
+                      </a:r>
+                    </a:p>
+                  </a:txBody>
+                  <a:tcPr marL="22860" marR="22860" marT="22860" marB="22860"/>
+                </a:tc>
+                <a:extLst>
+                  <a:ext uri="{0D108BD9-81ED-4DB2-BD59-A6C34878D82A}">
+                    <a16:rowId xmlns:a16="http://schemas.microsoft.com/office/drawing/2014/main" val="10002"/>
+                  </a:ext>
+                </a:extLst>
+              </a:tr>
+              <a:tr h="137160">
+                <a:tc vMerge="1">
+                  <a:txBody>
+                    <a:bodyPr/>
+                    <a:lstStyle/>
+                    <a:p>
                       <a:r>
                         <a:rPr sz="900" b="1"/>
                         <a:t>2017</a:t>
                       </a:r>
                     </a:p>
                   </a:txBody>
-                  <a:tcPr/>
-                </a:tc>
-                <a:tc>
+                  <a:tcPr marL="22860" marR="22860" marT="22860" marB="22860"/>
+                </a:tc>
+                <a:tc>
+                  <a:txBody>
+                    <a:bodyPr/>
+                    <a:lstStyle/>
+                    <a:p>
+                      <a:r>
+                        <a:rPr sz="900" b="1" dirty="0"/>
+                        <a:t>Jun 30, 2017</a:t>
+                      </a:r>
+                    </a:p>
+                  </a:txBody>
+                  <a:tcPr marL="22860" marR="22860" marT="22860" marB="22860"/>
+                </a:tc>
+                <a:tc>
+                  <a:txBody>
+                    <a:bodyPr/>
+                    <a:lstStyle/>
+                    <a:p>
+                      <a:r>
+                        <a:rPr sz="900"/>
+                        <a:t>0.67%</a:t>
+                      </a:r>
+                    </a:p>
+                  </a:txBody>
+                  <a:tcPr marL="22860" marR="22860" marT="22860" marB="22860"/>
+                </a:tc>
+                <a:tc>
+                  <a:txBody>
+                    <a:bodyPr/>
+                    <a:lstStyle/>
+                    <a:p>
+                      <a:r>
+                        <a:rPr sz="900"/>
+                        <a:t>0.05%</a:t>
+                      </a:r>
+                    </a:p>
+                  </a:txBody>
+                  <a:tcPr marL="22860" marR="22860" marT="22860" marB="22860"/>
+                </a:tc>
+                <a:tc>
+                  <a:txBody>
+                    <a:bodyPr/>
+                    <a:lstStyle/>
+                    <a:p>
+                      <a:r>
+                        <a:rPr sz="900"/>
+                        <a:t>0.60%</a:t>
+                      </a:r>
+                    </a:p>
+                  </a:txBody>
+                  <a:tcPr marL="22860" marR="22860" marT="22860" marB="22860"/>
+                </a:tc>
+                <a:tc>
+                  <a:txBody>
+                    <a:bodyPr/>
+                    <a:lstStyle/>
+                    <a:p>
+                      <a:r>
+                        <a:rPr sz="900"/>
+                        <a:t>0.43%</a:t>
+                      </a:r>
+                    </a:p>
+                  </a:txBody>
+                  <a:tcPr marL="22860" marR="22860" marT="22860" marB="22860"/>
+                </a:tc>
+                <a:tc>
+                  <a:txBody>
+                    <a:bodyPr/>
+                    <a:lstStyle/>
+                    <a:p>
+                      <a:r>
+                        <a:rPr sz="900"/>
+                        <a:t>1.74%</a:t>
+                      </a:r>
+                    </a:p>
+                  </a:txBody>
+                  <a:tcPr marL="22860" marR="22860" marT="22860" marB="22860"/>
+                </a:tc>
+                <a:extLst>
+                  <a:ext uri="{0D108BD9-81ED-4DB2-BD59-A6C34878D82A}">
+                    <a16:rowId xmlns:a16="http://schemas.microsoft.com/office/drawing/2014/main" val="10003"/>
+                  </a:ext>
+                </a:extLst>
+              </a:tr>
+              <a:tr h="137160">
+                <a:tc vMerge="1">
                   <a:txBody>
                     <a:bodyPr/>
                     <a:lstStyle/>
                     <a:p>
                       <a:r>
                         <a:rPr sz="900" b="1"/>
-                        <a:t>Mar 31, 2017</a:t>
-                      </a:r>
-                    </a:p>
-                  </a:txBody>
-                  <a:tcPr/>
+                        <a:t>2017</a:t>
+                      </a:r>
+                    </a:p>
+                  </a:txBody>
+                  <a:tcPr marL="22860" marR="22860" marT="22860" marB="22860"/>
+                </a:tc>
+                <a:tc>
+                  <a:txBody>
+                    <a:bodyPr/>
+                    <a:lstStyle/>
+                    <a:p>
+                      <a:r>
+                        <a:rPr sz="900" b="1" dirty="0"/>
+                        <a:t>Sep 30, 2017</a:t>
+                      </a:r>
+                    </a:p>
+                  </a:txBody>
+                  <a:tcPr marL="22860" marR="22860" marT="22860" marB="22860"/>
                 </a:tc>
                 <a:tc>
                   <a:txBody>
@@ -3921,11 +4163,11 @@
                     <a:p>
                       <a:r>
                         <a:rPr sz="900"/>
-                        <a:t>0.45%</a:t>
-                      </a:r>
-                    </a:p>
-                  </a:txBody>
-                  <a:tcPr/>
+                        <a:t>0.73%</a:t>
+                      </a:r>
+                    </a:p>
+                  </a:txBody>
+                  <a:tcPr marL="22860" marR="22860" marT="22860" marB="22860"/>
                 </a:tc>
                 <a:tc>
                   <a:txBody>
@@ -3934,11 +4176,11 @@
                     <a:p>
                       <a:r>
                         <a:rPr sz="900"/>
-                        <a:t>0.04%</a:t>
-                      </a:r>
-                    </a:p>
-                  </a:txBody>
-                  <a:tcPr/>
+                        <a:t>0.83%</a:t>
+                      </a:r>
+                    </a:p>
+                  </a:txBody>
+                  <a:tcPr marL="22860" marR="22860" marT="22860" marB="22860"/>
                 </a:tc>
                 <a:tc>
                   <a:txBody>
@@ -3947,11 +4189,109 @@
                     <a:p>
                       <a:r>
                         <a:rPr sz="900"/>
-                        <a:t>0.96%</a:t>
-                      </a:r>
-                    </a:p>
-                  </a:txBody>
-                  <a:tcPr/>
+                        <a:t>0.42%</a:t>
+                      </a:r>
+                    </a:p>
+                  </a:txBody>
+                  <a:tcPr marL="22860" marR="22860" marT="22860" marB="22860"/>
+                </a:tc>
+                <a:tc>
+                  <a:txBody>
+                    <a:bodyPr/>
+                    <a:lstStyle/>
+                    <a:p>
+                      <a:r>
+                        <a:rPr sz="900"/>
+                        <a:t>0.55%</a:t>
+                      </a:r>
+                    </a:p>
+                  </a:txBody>
+                  <a:tcPr marL="22860" marR="22860" marT="22860" marB="22860"/>
+                </a:tc>
+                <a:tc>
+                  <a:txBody>
+                    <a:bodyPr/>
+                    <a:lstStyle/>
+                    <a:p>
+                      <a:r>
+                        <a:rPr sz="900"/>
+                        <a:t>2.53%</a:t>
+                      </a:r>
+                    </a:p>
+                  </a:txBody>
+                  <a:tcPr marL="22860" marR="22860" marT="22860" marB="22860"/>
+                </a:tc>
+                <a:extLst>
+                  <a:ext uri="{0D108BD9-81ED-4DB2-BD59-A6C34878D82A}">
+                    <a16:rowId xmlns:a16="http://schemas.microsoft.com/office/drawing/2014/main" val="10004"/>
+                  </a:ext>
+                </a:extLst>
+              </a:tr>
+              <a:tr h="137160">
+                <a:tc vMerge="1">
+                  <a:txBody>
+                    <a:bodyPr/>
+                    <a:lstStyle/>
+                    <a:p>
+                      <a:r>
+                        <a:rPr sz="900" b="1"/>
+                        <a:t>2017</a:t>
+                      </a:r>
+                    </a:p>
+                  </a:txBody>
+                  <a:tcPr marL="22860" marR="22860" marT="22860" marB="22860"/>
+                </a:tc>
+                <a:tc>
+                  <a:txBody>
+                    <a:bodyPr/>
+                    <a:lstStyle/>
+                    <a:p>
+                      <a:r>
+                        <a:rPr sz="900" b="1" dirty="0"/>
+                        <a:t>Dec 31, 2017</a:t>
+                      </a:r>
+                    </a:p>
+                  </a:txBody>
+                  <a:tcPr marL="22860" marR="22860" marT="22860" marB="22860"/>
+                </a:tc>
+                <a:tc>
+                  <a:txBody>
+                    <a:bodyPr/>
+                    <a:lstStyle/>
+                    <a:p>
+                      <a:r>
+                        <a:rPr sz="900"/>
+                        <a:t>0.53%</a:t>
+                      </a:r>
+                    </a:p>
+                  </a:txBody>
+                  <a:tcPr marL="22860" marR="22860" marT="22860" marB="22860"/>
+                </a:tc>
+                <a:tc>
+                  <a:txBody>
+                    <a:bodyPr/>
+                    <a:lstStyle/>
+                    <a:p>
+                      <a:r>
+                        <a:rPr sz="900"/>
+                        <a:t>0.77%</a:t>
+                      </a:r>
+                    </a:p>
+                  </a:txBody>
+                  <a:tcPr marL="22860" marR="22860" marT="22860" marB="22860"/>
+                </a:tc>
+                <a:tc>
+                  <a:txBody>
+                    <a:bodyPr/>
+                    <a:lstStyle/>
+                    <a:p>
+                      <a:r>
+                        <a:rPr sz="900"/>
+                        <a:t>0.88%</a:t>
+                      </a:r>
+                    </a:p>
+                  </a:txBody>
+                  <a:tcPr marL="22860" marR="22860" marT="22860" marB="22860"/>
                 </a:tc>
                 <a:tc>
                   <a:txBody>
@@ -3964,7 +4304,7 @@
                       </a:r>
                     </a:p>
                   </a:txBody>
-                  <a:tcPr/>
+                  <a:tcPr marL="22860" marR="22860" marT="22860" marB="22860"/>
                 </a:tc>
                 <a:tc>
                   <a:txBody>
@@ -3973,39 +4313,45 @@
                     <a:p>
                       <a:r>
                         <a:rPr sz="900"/>
-                        <a:t>2.37%</a:t>
-                      </a:r>
-                    </a:p>
-                  </a:txBody>
-                  <a:tcPr/>
-                </a:tc>
+                        <a:t>3.10%</a:t>
+                      </a:r>
+                    </a:p>
+                  </a:txBody>
+                  <a:tcPr marL="22860" marR="22860" marT="22860" marB="22860"/>
+                </a:tc>
+                <a:extLst>
+                  <a:ext uri="{0D108BD9-81ED-4DB2-BD59-A6C34878D82A}">
+                    <a16:rowId xmlns:a16="http://schemas.microsoft.com/office/drawing/2014/main" val="10005"/>
+                  </a:ext>
+                </a:extLst>
               </a:tr>
-              <a:tr h="370840">
-                <a:tc>
-                  <a:txBody>
-                    <a:bodyPr/>
-                    <a:lstStyle/>
-                    <a:p>
-                      <a:r>
-                        <a:rPr sz="900" b="1"/>
-                        <a:t>2017</a:t>
-                      </a:r>
-                    </a:p>
-                  </a:txBody>
-                  <a:tcPr/>
-                </a:tc>
-                <a:tc>
-                  <a:txBody>
-                    <a:bodyPr/>
-                    <a:lstStyle/>
-                    <a:p>
-                      <a:r>
-                        <a:rPr sz="900" b="1"/>
-                        <a:t>Jun 30, 2017</a:t>
-                      </a:r>
-                    </a:p>
-                  </a:txBody>
-                  <a:tcPr/>
+              <a:tr h="137160">
+                <a:tc rowSpan="2">
+                  <a:txBody>
+                    <a:bodyPr/>
+                    <a:lstStyle/>
+                    <a:p>
+                      <a:pPr algn="ctr"/>
+                      <a:r>
+                        <a:rPr sz="900" b="1" dirty="0"/>
+                        <a:t>2018</a:t>
+                      </a:r>
+                    </a:p>
+                  </a:txBody>
+                  <a:tcPr marL="22860" marR="22860" marT="22860" marB="22860"/>
+                </a:tc>
+                <a:tc>
+                  <a:txBody>
+                    <a:bodyPr/>
+                    <a:lstStyle/>
+                    <a:p>
+                      <a:r>
+                        <a:rPr sz="900" b="1" dirty="0"/>
+                        <a:t>Mar 31, 2018</a:t>
+                      </a:r>
+                    </a:p>
+                  </a:txBody>
+                  <a:tcPr marL="22860" marR="22860" marT="22860" marB="22860"/>
                 </a:tc>
                 <a:tc>
                   <a:txBody>
@@ -4014,11 +4360,11 @@
                     <a:p>
                       <a:r>
                         <a:rPr sz="900"/>
-                        <a:t>0.08%</a:t>
-                      </a:r>
-                    </a:p>
-                  </a:txBody>
-                  <a:tcPr/>
+                        <a:t>0.01%</a:t>
+                      </a:r>
+                    </a:p>
+                  </a:txBody>
+                  <a:tcPr marL="22860" marR="22860" marT="22860" marB="22860"/>
                 </a:tc>
                 <a:tc>
                   <a:txBody>
@@ -4027,11 +4373,11 @@
                     <a:p>
                       <a:r>
                         <a:rPr sz="900"/>
-                        <a:t>0.02%</a:t>
-                      </a:r>
-                    </a:p>
-                  </a:txBody>
-                  <a:tcPr/>
+                        <a:t>0.74%</a:t>
+                      </a:r>
+                    </a:p>
+                  </a:txBody>
+                  <a:tcPr marL="22860" marR="22860" marT="22860" marB="22860"/>
                 </a:tc>
                 <a:tc>
                   <a:txBody>
@@ -4040,11 +4386,11 @@
                     <a:p>
                       <a:r>
                         <a:rPr sz="900"/>
-                        <a:t>0.12%</a:t>
-                      </a:r>
-                    </a:p>
-                  </a:txBody>
-                  <a:tcPr/>
+                        <a:t>0.67%</a:t>
+                      </a:r>
+                    </a:p>
+                  </a:txBody>
+                  <a:tcPr marL="22860" marR="22860" marT="22860" marB="22860"/>
                 </a:tc>
                 <a:tc>
                   <a:txBody>
@@ -4053,11 +4399,11 @@
                     <a:p>
                       <a:r>
                         <a:rPr sz="900"/>
-                        <a:t>0.71%</a:t>
-                      </a:r>
-                    </a:p>
-                  </a:txBody>
-                  <a:tcPr/>
+                        <a:t>0.83%</a:t>
+                      </a:r>
+                    </a:p>
+                  </a:txBody>
+                  <a:tcPr marL="22860" marR="22860" marT="22860" marB="22860"/>
                 </a:tc>
                 <a:tc>
                   <a:txBody>
@@ -4066,226 +4412,44 @@
                     <a:p>
                       <a:r>
                         <a:rPr sz="900"/>
-                        <a:t>0.94%</a:t>
-                      </a:r>
-                    </a:p>
-                  </a:txBody>
-                  <a:tcPr/>
-                </a:tc>
+                        <a:t>2.26%</a:t>
+                      </a:r>
+                    </a:p>
+                  </a:txBody>
+                  <a:tcPr marL="22860" marR="22860" marT="22860" marB="22860"/>
+                </a:tc>
+                <a:extLst>
+                  <a:ext uri="{0D108BD9-81ED-4DB2-BD59-A6C34878D82A}">
+                    <a16:rowId xmlns:a16="http://schemas.microsoft.com/office/drawing/2014/main" val="10006"/>
+                  </a:ext>
+                </a:extLst>
               </a:tr>
-              <a:tr h="370840">
-                <a:tc>
-                  <a:txBody>
-                    <a:bodyPr/>
-                    <a:lstStyle/>
-                    <a:p>
-                      <a:r>
-                        <a:rPr sz="900" b="1"/>
-                        <a:t>2017</a:t>
-                      </a:r>
-                    </a:p>
-                  </a:txBody>
-                  <a:tcPr/>
-                </a:tc>
-                <a:tc>
-                  <a:txBody>
-                    <a:bodyPr/>
-                    <a:lstStyle/>
-                    <a:p>
-                      <a:r>
-                        <a:rPr sz="900" b="1"/>
-                        <a:t>Sep 30, 2017</a:t>
-                      </a:r>
-                    </a:p>
-                  </a:txBody>
-                  <a:tcPr/>
-                </a:tc>
-                <a:tc>
-                  <a:txBody>
-                    <a:bodyPr/>
-                    <a:lstStyle/>
-                    <a:p>
-                      <a:r>
-                        <a:rPr sz="900"/>
-                        <a:t>0.12%</a:t>
-                      </a:r>
-                    </a:p>
-                  </a:txBody>
-                  <a:tcPr/>
-                </a:tc>
-                <a:tc>
-                  <a:txBody>
-                    <a:bodyPr/>
-                    <a:lstStyle/>
-                    <a:p>
-                      <a:r>
-                        <a:rPr sz="900"/>
-                        <a:t>0.34%</a:t>
-                      </a:r>
-                    </a:p>
-                  </a:txBody>
-                  <a:tcPr/>
-                </a:tc>
-                <a:tc>
-                  <a:txBody>
-                    <a:bodyPr/>
-                    <a:lstStyle/>
-                    <a:p>
-                      <a:r>
-                        <a:rPr sz="900"/>
-                        <a:t>0.78%</a:t>
-                      </a:r>
-                    </a:p>
-                  </a:txBody>
-                  <a:tcPr/>
-                </a:tc>
-                <a:tc>
-                  <a:txBody>
-                    <a:bodyPr/>
-                    <a:lstStyle/>
-                    <a:p>
-                      <a:r>
-                        <a:rPr sz="900"/>
-                        <a:t>0.24%</a:t>
-                      </a:r>
-                    </a:p>
-                  </a:txBody>
-                  <a:tcPr/>
-                </a:tc>
-                <a:tc>
-                  <a:txBody>
-                    <a:bodyPr/>
-                    <a:lstStyle/>
-                    <a:p>
-                      <a:r>
-                        <a:rPr sz="900"/>
-                        <a:t>1.48%</a:t>
-                      </a:r>
-                    </a:p>
-                  </a:txBody>
-                  <a:tcPr/>
-                </a:tc>
-              </a:tr>
-              <a:tr h="370840">
+              <a:tr h="137160">
                 <a:tc vMerge="1">
                   <a:txBody>
                     <a:bodyPr/>
                     <a:lstStyle/>
                     <a:p>
-                      <a:r>
-                        <a:rPr sz="900" b="1"/>
-                        <a:t>2017</a:t>
-                      </a:r>
-                    </a:p>
-                  </a:txBody>
-                  <a:tcPr/>
-                </a:tc>
-                <a:tc>
-                  <a:txBody>
-                    <a:bodyPr/>
-                    <a:lstStyle/>
-                    <a:p>
-                      <a:r>
-                        <a:rPr sz="900" b="1"/>
-                        <a:t>Dec 31, 2017</a:t>
-                      </a:r>
-                    </a:p>
-                  </a:txBody>
-                  <a:tcPr/>
-                </a:tc>
-                <a:tc>
-                  <a:txBody>
-                    <a:bodyPr/>
-                    <a:lstStyle/>
-                    <a:p>
-                      <a:r>
-                        <a:rPr sz="900"/>
-                        <a:t>0.66%</a:t>
-                      </a:r>
-                    </a:p>
-                  </a:txBody>
-                  <a:tcPr/>
-                </a:tc>
-                <a:tc>
-                  <a:txBody>
-                    <a:bodyPr/>
-                    <a:lstStyle/>
-                    <a:p>
-                      <a:r>
-                        <a:rPr sz="900"/>
-                        <a:t>0.51%</a:t>
-                      </a:r>
-                    </a:p>
-                  </a:txBody>
-                  <a:tcPr/>
-                </a:tc>
-                <a:tc>
-                  <a:txBody>
-                    <a:bodyPr/>
-                    <a:lstStyle/>
-                    <a:p>
-                      <a:r>
-                        <a:rPr sz="900"/>
-                        <a:t>0.37%</a:t>
-                      </a:r>
-                    </a:p>
-                  </a:txBody>
-                  <a:tcPr/>
-                </a:tc>
-                <a:tc>
-                  <a:txBody>
-                    <a:bodyPr/>
-                    <a:lstStyle/>
-                    <a:p>
-                      <a:r>
-                        <a:rPr sz="900"/>
-                        <a:t>0.27%</a:t>
-                      </a:r>
-                    </a:p>
-                  </a:txBody>
-                  <a:tcPr/>
-                </a:tc>
-                <a:tc>
-                  <a:txBody>
-                    <a:bodyPr/>
-                    <a:lstStyle/>
-                    <a:p>
-                      <a:r>
-                        <a:rPr sz="900"/>
-                        <a:t>1.82%</a:t>
-                      </a:r>
-                    </a:p>
-                  </a:txBody>
-                  <a:tcPr/>
-                </a:tc>
-              </a:tr>
-              <a:tr h="370840">
-                <a:tc rowSpan="2">
-                  <a:txBody>
-                    <a:bodyPr/>
-                    <a:lstStyle/>
-                    <a:p>
-                      <a:pPr algn="ctr"/>
                       <a:r>
                         <a:rPr sz="900" b="1"/>
                         <a:t>2018</a:t>
                       </a:r>
                     </a:p>
                   </a:txBody>
-                  <a:tcPr/>
-                </a:tc>
-                <a:tc>
-                  <a:txBody>
-                    <a:bodyPr/>
-                    <a:lstStyle/>
-                    <a:p>
-                      <a:r>
-                        <a:rPr sz="900" b="1"/>
-                        <a:t>Mar 31, 2018</a:t>
-                      </a:r>
-                    </a:p>
-                  </a:txBody>
-                  <a:tcPr/>
+                  <a:tcPr marL="22860" marR="22860" marT="22860" marB="22860"/>
+                </a:tc>
+                <a:tc>
+                  <a:txBody>
+                    <a:bodyPr/>
+                    <a:lstStyle/>
+                    <a:p>
+                      <a:r>
+                        <a:rPr sz="900" b="1" dirty="0"/>
+                        <a:t>Jun 30, 2018</a:t>
+                      </a:r>
+                    </a:p>
+                  </a:txBody>
+                  <a:tcPr marL="22860" marR="22860" marT="22860" marB="22860"/>
                 </a:tc>
                 <a:tc>
                   <a:txBody>
@@ -4294,11 +4458,11 @@
                     <a:p>
                       <a:r>
                         <a:rPr sz="900"/>
-                        <a:t>0.76%</a:t>
-                      </a:r>
-                    </a:p>
-                  </a:txBody>
-                  <a:tcPr/>
+                        <a:t>0.89%</a:t>
+                      </a:r>
+                    </a:p>
+                  </a:txBody>
+                  <a:tcPr marL="22860" marR="22860" marT="22860" marB="22860"/>
                 </a:tc>
                 <a:tc>
                   <a:txBody>
@@ -4307,11 +4471,24 @@
                     <a:p>
                       <a:r>
                         <a:rPr sz="900"/>
-                        <a:t>0.93%</a:t>
-                      </a:r>
-                    </a:p>
-                  </a:txBody>
-                  <a:tcPr/>
+                        <a:t>0.23%</a:t>
+                      </a:r>
+                    </a:p>
+                  </a:txBody>
+                  <a:tcPr marL="22860" marR="22860" marT="22860" marB="22860"/>
+                </a:tc>
+                <a:tc>
+                  <a:txBody>
+                    <a:bodyPr/>
+                    <a:lstStyle/>
+                    <a:p>
+                      <a:r>
+                        <a:rPr sz="900"/>
+                        <a:t>0.61%</a:t>
+                      </a:r>
+                    </a:p>
+                  </a:txBody>
+                  <a:tcPr marL="22860" marR="22860" marT="22860" marB="22860"/>
                 </a:tc>
                 <a:tc>
                   <a:txBody>
@@ -4324,7 +4501,7 @@
                       </a:r>
                     </a:p>
                   </a:txBody>
-                  <a:tcPr/>
+                  <a:tcPr marL="22860" marR="22860" marT="22860" marB="22860"/>
                 </a:tc>
                 <a:tc>
                   <a:txBody>
@@ -4333,120 +4510,19 @@
                     <a:p>
                       <a:r>
                         <a:rPr sz="900"/>
-                        <a:t>0.95%</a:t>
-                      </a:r>
-                    </a:p>
-                  </a:txBody>
-                  <a:tcPr/>
-                </a:tc>
-                <a:tc>
-                  <a:txBody>
-                    <a:bodyPr/>
-                    <a:lstStyle/>
-                    <a:p>
-                      <a:r>
-                        <a:rPr sz="900"/>
-                        <a:t>2.80%</a:t>
-                      </a:r>
-                    </a:p>
-                  </a:txBody>
-                  <a:tcPr/>
-                </a:tc>
+                        <a:t>1.90%</a:t>
+                      </a:r>
+                    </a:p>
+                  </a:txBody>
+                  <a:tcPr marL="22860" marR="22860" marT="22860" marB="22860"/>
+                </a:tc>
+                <a:extLst>
+                  <a:ext uri="{0D108BD9-81ED-4DB2-BD59-A6C34878D82A}">
+                    <a16:rowId xmlns:a16="http://schemas.microsoft.com/office/drawing/2014/main" val="10007"/>
+                  </a:ext>
+                </a:extLst>
               </a:tr>
-              <a:tr h="370840">
-                <a:tc vMerge="1">
-                  <a:txBody>
-                    <a:bodyPr/>
-                    <a:lstStyle/>
-                    <a:p>
-                      <a:r>
-                        <a:rPr sz="900" b="1"/>
-                        <a:t>2018</a:t>
-                      </a:r>
-                    </a:p>
-                  </a:txBody>
-                  <a:tcPr/>
-                </a:tc>
-                <a:tc>
-                  <a:txBody>
-                    <a:bodyPr/>
-                    <a:lstStyle/>
-                    <a:p>
-                      <a:r>
-                        <a:rPr sz="900" b="1"/>
-                        <a:t>Jun 30, 2018</a:t>
-                      </a:r>
-                    </a:p>
-                  </a:txBody>
-                  <a:tcPr/>
-                </a:tc>
-                <a:tc>
-                  <a:txBody>
-                    <a:bodyPr/>
-                    <a:lstStyle/>
-                    <a:p>
-                      <a:r>
-                        <a:rPr sz="900"/>
-                        <a:t>0.01%</a:t>
-                      </a:r>
-                    </a:p>
-                  </a:txBody>
-                  <a:tcPr/>
-                </a:tc>
-                <a:tc>
-                  <a:txBody>
-                    <a:bodyPr/>
-                    <a:lstStyle/>
-                    <a:p>
-                      <a:r>
-                        <a:rPr sz="900"/>
-                        <a:t>0.18%</a:t>
-                      </a:r>
-                    </a:p>
-                  </a:txBody>
-                  <a:tcPr/>
-                </a:tc>
-                <a:tc>
-                  <a:txBody>
-                    <a:bodyPr/>
-                    <a:lstStyle/>
-                    <a:p>
-                      <a:r>
-                        <a:rPr sz="900"/>
-                        <a:t>0.66%</a:t>
-                      </a:r>
-                    </a:p>
-                  </a:txBody>
-                  <a:tcPr/>
-                </a:tc>
-                <a:tc>
-                  <a:txBody>
-                    <a:bodyPr/>
-                    <a:lstStyle/>
-                    <a:p>
-                      <a:r>
-                        <a:rPr sz="900"/>
-                        <a:t>0.84%</a:t>
-                      </a:r>
-                    </a:p>
-                  </a:txBody>
-                  <a:tcPr/>
-                </a:tc>
-                <a:tc>
-                  <a:txBody>
-                    <a:bodyPr/>
-                    <a:lstStyle/>
-                    <a:p>
-                      <a:r>
-                        <a:rPr sz="900"/>
-                        <a:t>1.70%</a:t>
-                      </a:r>
-                    </a:p>
-                  </a:txBody>
-                  <a:tcPr/>
-                </a:tc>
-              </a:tr>
-              <a:tr h="370840">
+              <a:tr h="137160">
                 <a:tc>
                   <a:txBody>
                     <a:bodyPr/>
@@ -4458,7 +4534,7 @@
                       </a:r>
                     </a:p>
                   </a:txBody>
-                  <a:tcPr/>
+                  <a:tcPr marL="22860" marR="22860" marT="22860" marB="22860"/>
                 </a:tc>
                 <a:tc>
                   <a:txBody>
@@ -4471,7 +4547,7 @@
                       </a:r>
                     </a:p>
                   </a:txBody>
-                  <a:tcPr/>
+                  <a:tcPr marL="22860" marR="22860" marT="22860" marB="22860"/>
                 </a:tc>
                 <a:tc>
                   <a:txBody>
@@ -4480,11 +4556,11 @@
                     <a:p>
                       <a:r>
                         <a:rPr sz="900"/>
-                        <a:t>2.08%</a:t>
-                      </a:r>
-                    </a:p>
-                  </a:txBody>
-                  <a:tcPr/>
+                        <a:t>3.34%</a:t>
+                      </a:r>
+                    </a:p>
+                  </a:txBody>
+                  <a:tcPr marL="22860" marR="22860" marT="22860" marB="22860"/>
                 </a:tc>
                 <a:tc>
                   <a:txBody>
@@ -4493,11 +4569,11 @@
                     <a:p>
                       <a:r>
                         <a:rPr sz="900"/>
-                        <a:t>2.02%</a:t>
-                      </a:r>
-                    </a:p>
-                  </a:txBody>
-                  <a:tcPr/>
+                        <a:t>3.51%</a:t>
+                      </a:r>
+                    </a:p>
+                  </a:txBody>
+                  <a:tcPr marL="22860" marR="22860" marT="22860" marB="22860"/>
                 </a:tc>
                 <a:tc>
                   <a:txBody>
@@ -4506,11 +4582,11 @@
                     <a:p>
                       <a:r>
                         <a:rPr sz="900"/>
-                        <a:t>3.05%</a:t>
-                      </a:r>
-                    </a:p>
-                  </a:txBody>
-                  <a:tcPr/>
+                        <a:t>3.93%</a:t>
+                      </a:r>
+                    </a:p>
+                  </a:txBody>
+                  <a:tcPr marL="22860" marR="22860" marT="22860" marB="22860"/>
                 </a:tc>
                 <a:tc>
                   <a:txBody>
@@ -4519,25 +4595,30 @@
                     <a:p>
                       <a:r>
                         <a:rPr sz="900"/>
-                        <a:t>3.95%</a:t>
-                      </a:r>
-                    </a:p>
-                  </a:txBody>
-                  <a:tcPr/>
-                </a:tc>
-                <a:tc>
-                  <a:txBody>
-                    <a:bodyPr/>
-                    <a:lstStyle/>
-                    <a:p>
-                      <a:r>
-                        <a:rPr sz="900"/>
-                        <a:t>11.09%</a:t>
-                      </a:r>
-                    </a:p>
-                  </a:txBody>
-                  <a:tcPr/>
-                </a:tc>
+                        <a:t>3.20%</a:t>
+                      </a:r>
+                    </a:p>
+                  </a:txBody>
+                  <a:tcPr marL="22860" marR="22860" marT="22860" marB="22860"/>
+                </a:tc>
+                <a:tc>
+                  <a:txBody>
+                    <a:bodyPr/>
+                    <a:lstStyle/>
+                    <a:p>
+                      <a:r>
+                        <a:rPr sz="900" dirty="0"/>
+                        <a:t>13.97%</a:t>
+                      </a:r>
+                    </a:p>
+                  </a:txBody>
+                  <a:tcPr marL="22860" marR="22860" marT="22860" marB="22860"/>
+                </a:tc>
+                <a:extLst>
+                  <a:ext uri="{0D108BD9-81ED-4DB2-BD59-A6C34878D82A}">
+                    <a16:rowId xmlns:a16="http://schemas.microsoft.com/office/drawing/2014/main" val="10008"/>
+                  </a:ext>
+                </a:extLst>
               </a:tr>
             </a:tbl>
           </a:graphicData>
@@ -4550,7 +4631,7 @@
             <a:spLocks noGrp="1"/>
           </p:cNvSpPr>
           <p:nvPr>
-            <p:ph type="chart" idx="14" sz="quarter"/>
+            <p:ph type="chart" sz="quarter" idx="14"/>
           </p:nvPr>
         </p:nvSpPr>
         <p:spPr/>

</xml_diff>

<commit_message>
reorg of utils, new feature align_columns, add requirements.txt
</commit_message>
<xml_diff>
--- a/examples/example_report.pptx
+++ b/examples/example_report.pptx
@@ -5,7 +5,7 @@
     <p:sldMasterId id="2147483648" r:id="rId1"/>
   </p:sldMasterIdLst>
   <p:sldIdLst>
-    <p:sldId id="256" r:id="rId2"/>
+    <p:sldId id="256" r:id="rId7"/>
   </p:sldIdLst>
   <p:sldSz cx="12192000" cy="6858000"/>
   <p:notesSz cx="6858000" cy="9144000"/>
@@ -123,6 +123,10 @@
 </p:presentation>
 </file>
 
+<file path=ppt/revisionInfo.xml><?xml version="1.0" encoding="utf-8"?>
+<p1510:revInfo xmlns:a="http://schemas.openxmlformats.org/drawingml/2006/main" xmlns:r="http://schemas.openxmlformats.org/officeDocument/2006/relationships" xmlns:p1510="http://schemas.microsoft.com/office/powerpoint/2015/10/main"/>
+</file>
+
 <file path=ppt/slideLayouts/slideLayout1.xml><?xml version="1.0" encoding="utf-8"?>
 <p:sldLayout xmlns:a="http://schemas.openxmlformats.org/drawingml/2006/main" xmlns:r="http://schemas.openxmlformats.org/officeDocument/2006/relationships" xmlns:p="http://schemas.openxmlformats.org/presentationml/2006/main" type="title" preserve="1">
   <p:cSld name="Title Slide">
@@ -270,7 +274,7 @@
           <a:p>
             <a:fld id="{9301CAA1-A9D3-4148-AB22-2F35928D9E24}" type="datetimeFigureOut">
               <a:rPr lang="en-US" smtClean="0"/>
-              <a:t>9/26/2018</a:t>
+              <a:t>12/29/2017</a:t>
             </a:fld>
             <a:endParaRPr lang="en-US"/>
           </a:p>
@@ -558,7 +562,7 @@
           <a:p>
             <a:fld id="{9301CAA1-A9D3-4148-AB22-2F35928D9E24}" type="datetimeFigureOut">
               <a:rPr lang="en-US" smtClean="0"/>
-              <a:t>9/26/2018</a:t>
+              <a:t>12/29/2017</a:t>
             </a:fld>
             <a:endParaRPr lang="en-US"/>
           </a:p>
@@ -756,7 +760,7 @@
           <a:p>
             <a:fld id="{9301CAA1-A9D3-4148-AB22-2F35928D9E24}" type="datetimeFigureOut">
               <a:rPr lang="en-US" smtClean="0"/>
-              <a:t>9/26/2018</a:t>
+              <a:t>12/29/2017</a:t>
             </a:fld>
             <a:endParaRPr lang="en-US"/>
           </a:p>
@@ -964,7 +968,7 @@
           <a:p>
             <a:fld id="{9301CAA1-A9D3-4148-AB22-2F35928D9E24}" type="datetimeFigureOut">
               <a:rPr lang="en-US" smtClean="0"/>
-              <a:t>9/26/2018</a:t>
+              <a:t>12/29/2017</a:t>
             </a:fld>
             <a:endParaRPr lang="en-US"/>
           </a:p>
@@ -1162,7 +1166,7 @@
           <a:p>
             <a:fld id="{9301CAA1-A9D3-4148-AB22-2F35928D9E24}" type="datetimeFigureOut">
               <a:rPr lang="en-US" smtClean="0"/>
-              <a:t>9/26/2018</a:t>
+              <a:t>12/29/2017</a:t>
             </a:fld>
             <a:endParaRPr lang="en-US"/>
           </a:p>
@@ -1437,7 +1441,7 @@
           <a:p>
             <a:fld id="{9301CAA1-A9D3-4148-AB22-2F35928D9E24}" type="datetimeFigureOut">
               <a:rPr lang="en-US" smtClean="0"/>
-              <a:t>9/26/2018</a:t>
+              <a:t>12/29/2017</a:t>
             </a:fld>
             <a:endParaRPr lang="en-US"/>
           </a:p>
@@ -1702,7 +1706,7 @@
           <a:p>
             <a:fld id="{9301CAA1-A9D3-4148-AB22-2F35928D9E24}" type="datetimeFigureOut">
               <a:rPr lang="en-US" smtClean="0"/>
-              <a:t>9/26/2018</a:t>
+              <a:t>12/29/2017</a:t>
             </a:fld>
             <a:endParaRPr lang="en-US"/>
           </a:p>
@@ -1843,7 +1847,7 @@
           <a:p>
             <a:fld id="{9301CAA1-A9D3-4148-AB22-2F35928D9E24}" type="datetimeFigureOut">
               <a:rPr lang="en-US" smtClean="0"/>
-              <a:t>9/26/2018</a:t>
+              <a:t>12/29/2017</a:t>
             </a:fld>
             <a:endParaRPr lang="en-US"/>
           </a:p>
@@ -2315,7 +2319,7 @@
           <a:p>
             <a:fld id="{9301CAA1-A9D3-4148-AB22-2F35928D9E24}" type="datetimeFigureOut">
               <a:rPr lang="en-US" smtClean="0"/>
-              <a:t>9/26/2018</a:t>
+              <a:t>12/29/2017</a:t>
             </a:fld>
             <a:endParaRPr lang="en-US"/>
           </a:p>
@@ -2456,7 +2460,7 @@
           <a:p>
             <a:fld id="{9301CAA1-A9D3-4148-AB22-2F35928D9E24}" type="datetimeFigureOut">
               <a:rPr lang="en-US" smtClean="0"/>
-              <a:t>9/26/2018</a:t>
+              <a:t>12/29/2017</a:t>
             </a:fld>
             <a:endParaRPr lang="en-US"/>
           </a:p>
@@ -2569,7 +2573,7 @@
           <a:p>
             <a:fld id="{9301CAA1-A9D3-4148-AB22-2F35928D9E24}" type="datetimeFigureOut">
               <a:rPr lang="en-US" smtClean="0"/>
-              <a:t>9/26/2018</a:t>
+              <a:t>12/29/2017</a:t>
             </a:fld>
             <a:endParaRPr lang="en-US"/>
           </a:p>
@@ -2880,7 +2884,7 @@
           <a:p>
             <a:fld id="{9301CAA1-A9D3-4148-AB22-2F35928D9E24}" type="datetimeFigureOut">
               <a:rPr lang="en-US" smtClean="0"/>
-              <a:t>9/26/2018</a:t>
+              <a:t>12/29/2017</a:t>
             </a:fld>
             <a:endParaRPr lang="en-US"/>
           </a:p>
@@ -3121,7 +3125,7 @@
           <a:p>
             <a:fld id="{9301CAA1-A9D3-4148-AB22-2F35928D9E24}" type="datetimeFigureOut">
               <a:rPr lang="en-US" smtClean="0"/>
-              <a:t>9/26/2018</a:t>
+              <a:t>12/29/2017</a:t>
             </a:fld>
             <a:endParaRPr lang="en-US"/>
           </a:p>
@@ -3523,7 +3527,7 @@
 </file>
 
 <file path=ppt/slides/slide1.xml><?xml version="1.0" encoding="utf-8"?>
-<p:sld xmlns:a="http://schemas.openxmlformats.org/drawingml/2006/main" xmlns:r="http://schemas.openxmlformats.org/officeDocument/2006/relationships" xmlns:p="http://schemas.openxmlformats.org/presentationml/2006/main">
+<p:sld xmlns:a="http://schemas.openxmlformats.org/drawingml/2006/main" xmlns:p="http://schemas.openxmlformats.org/presentationml/2006/main" xmlns:r="http://schemas.openxmlformats.org/officeDocument/2006/relationships">
   <p:cSld>
     <p:spTree>
       <p:nvGrpSpPr>
@@ -3531,14 +3535,7 @@
         <p:cNvGrpSpPr/>
         <p:nvPr/>
       </p:nvGrpSpPr>
-      <p:grpSpPr>
-        <a:xfrm>
-          <a:off x="0" y="0"/>
-          <a:ext cx="0" cy="0"/>
-          <a:chOff x="0" y="0"/>
-          <a:chExt cx="0" cy="0"/>
-        </a:xfrm>
-      </p:grpSpPr>
+      <p:grpSpPr/>
       <p:sp>
         <p:nvSpPr>
           <p:cNvPr id="2" name="Title 1"/>
@@ -3567,17 +3564,12 @@
             <a:graphicFrameLocks noGrp="1"/>
           </p:cNvGraphicFramePr>
           <p:nvPr>
-            <p:ph type="tbl" sz="quarter" idx="13"/>
-            <p:extLst>
-              <p:ext uri="{D42A27DB-BD31-4B8C-83A1-F6EECF244321}">
-                <p14:modId xmlns:p14="http://schemas.microsoft.com/office/powerpoint/2010/main" val="4062412184"/>
-              </p:ext>
-            </p:extLst>
+            <p:ph type="tbl" idx="13" sz="quarter"/>
           </p:nvPr>
         </p:nvGraphicFramePr>
         <p:xfrm>
           <a:off x="838200" y="1847850"/>
-          <a:ext cx="5181600" cy="1783080"/>
+          <a:ext cx="5181600" cy="1234440"/>
         </p:xfrm>
         <a:graphic>
           <a:graphicData uri="http://schemas.openxmlformats.org/drawingml/2006/table">
@@ -3586,55 +3578,13 @@
                 <a:tableStyleId>{5C22544A-7EE6-4342-B048-85BDC9FD1C3A}</a:tableStyleId>
               </a:tblPr>
               <a:tblGrid>
-                <a:gridCol w="740228">
-                  <a:extLst>
-                    <a:ext uri="{9D8B030D-6E8A-4147-A177-3AD203B41FA5}">
-                      <a16:colId xmlns:a16="http://schemas.microsoft.com/office/drawing/2014/main" val="20000"/>
-                    </a:ext>
-                  </a:extLst>
-                </a:gridCol>
-                <a:gridCol w="740228">
-                  <a:extLst>
-                    <a:ext uri="{9D8B030D-6E8A-4147-A177-3AD203B41FA5}">
-                      <a16:colId xmlns:a16="http://schemas.microsoft.com/office/drawing/2014/main" val="20001"/>
-                    </a:ext>
-                  </a:extLst>
-                </a:gridCol>
-                <a:gridCol w="740228">
-                  <a:extLst>
-                    <a:ext uri="{9D8B030D-6E8A-4147-A177-3AD203B41FA5}">
-                      <a16:colId xmlns:a16="http://schemas.microsoft.com/office/drawing/2014/main" val="20002"/>
-                    </a:ext>
-                  </a:extLst>
-                </a:gridCol>
-                <a:gridCol w="740228">
-                  <a:extLst>
-                    <a:ext uri="{9D8B030D-6E8A-4147-A177-3AD203B41FA5}">
-                      <a16:colId xmlns:a16="http://schemas.microsoft.com/office/drawing/2014/main" val="20003"/>
-                    </a:ext>
-                  </a:extLst>
-                </a:gridCol>
-                <a:gridCol w="740228">
-                  <a:extLst>
-                    <a:ext uri="{9D8B030D-6E8A-4147-A177-3AD203B41FA5}">
-                      <a16:colId xmlns:a16="http://schemas.microsoft.com/office/drawing/2014/main" val="20004"/>
-                    </a:ext>
-                  </a:extLst>
-                </a:gridCol>
-                <a:gridCol w="740228">
-                  <a:extLst>
-                    <a:ext uri="{9D8B030D-6E8A-4147-A177-3AD203B41FA5}">
-                      <a16:colId xmlns:a16="http://schemas.microsoft.com/office/drawing/2014/main" val="20005"/>
-                    </a:ext>
-                  </a:extLst>
-                </a:gridCol>
-                <a:gridCol w="740232">
-                  <a:extLst>
-                    <a:ext uri="{9D8B030D-6E8A-4147-A177-3AD203B41FA5}">
-                      <a16:colId xmlns:a16="http://schemas.microsoft.com/office/drawing/2014/main" val="20006"/>
-                    </a:ext>
-                  </a:extLst>
-                </a:gridCol>
+                <a:gridCol w="740228"/>
+                <a:gridCol w="740228"/>
+                <a:gridCol w="740228"/>
+                <a:gridCol w="740228"/>
+                <a:gridCol w="740228"/>
+                <a:gridCol w="740228"/>
+                <a:gridCol w="740232"/>
               </a:tblGrid>
               <a:tr h="137160">
                 <a:tc>
@@ -3652,7 +3602,7 @@
                       </a:r>
                     </a:p>
                   </a:txBody>
-                  <a:tcPr marL="22860" marR="22860" marT="22860" marB="22860">
+                  <a:tcPr marT="22860" marB="22860" marL="22860" marR="22860">
                     <a:solidFill>
                       <a:schemeClr val="accent1"/>
                     </a:solidFill>
@@ -3673,7 +3623,7 @@
                       </a:r>
                     </a:p>
                   </a:txBody>
-                  <a:tcPr marL="22860" marR="22860" marT="22860" marB="22860">
+                  <a:tcPr marT="22860" marB="22860" marL="22860" marR="22860">
                     <a:solidFill>
                       <a:schemeClr val="accent1"/>
                     </a:solidFill>
@@ -3685,27 +3635,6 @@
                     <a:lstStyle/>
                     <a:p>
                       <a:pPr algn="ctr"/>
-                      <a:r>
-                        <a:rPr sz="900" b="1" dirty="0">
-                          <a:solidFill>
-                            <a:srgbClr val="FFFFFF"/>
-                          </a:solidFill>
-                        </a:rPr>
-                        <a:t>Group1</a:t>
-                      </a:r>
-                    </a:p>
-                  </a:txBody>
-                  <a:tcPr marL="22860" marR="22860" marT="22860" marB="22860">
-                    <a:solidFill>
-                      <a:schemeClr val="accent1"/>
-                    </a:solidFill>
-                  </a:tcPr>
-                </a:tc>
-                <a:tc hMerge="1">
-                  <a:txBody>
-                    <a:bodyPr/>
-                    <a:lstStyle/>
-                    <a:p>
                       <a:r>
                         <a:rPr sz="900" b="1">
                           <a:solidFill>
@@ -3716,39 +3645,39 @@
                       </a:r>
                     </a:p>
                   </a:txBody>
-                  <a:tcPr marL="22860" marR="22860" marT="22860" marB="22860">
+                  <a:tcPr marT="22860" marB="22860" marL="22860" marR="22860">
                     <a:solidFill>
                       <a:schemeClr val="accent1"/>
                     </a:solidFill>
                   </a:tcPr>
                 </a:tc>
-                <a:tc gridSpan="2">
-                  <a:txBody>
-                    <a:bodyPr/>
-                    <a:lstStyle/>
-                    <a:p>
-                      <a:pPr algn="ctr"/>
-                      <a:r>
-                        <a:rPr sz="900" b="1" dirty="0">
+                <a:tc hMerge="1">
+                  <a:txBody>
+                    <a:bodyPr/>
+                    <a:lstStyle/>
+                    <a:p>
+                      <a:r>
+                        <a:rPr sz="900" b="1">
                           <a:solidFill>
                             <a:srgbClr val="FFFFFF"/>
                           </a:solidFill>
                         </a:rPr>
-                        <a:t>Group2</a:t>
-                      </a:r>
-                    </a:p>
-                  </a:txBody>
-                  <a:tcPr marL="22860" marR="22860" marT="22860" marB="22860">
+                        <a:t>Group1</a:t>
+                      </a:r>
+                    </a:p>
+                  </a:txBody>
+                  <a:tcPr marT="22860" marB="22860" marL="22860" marR="22860">
                     <a:solidFill>
                       <a:schemeClr val="accent1"/>
                     </a:solidFill>
                   </a:tcPr>
                 </a:tc>
-                <a:tc hMerge="1">
-                  <a:txBody>
-                    <a:bodyPr/>
-                    <a:lstStyle/>
-                    <a:p>
+                <a:tc gridSpan="2">
+                  <a:txBody>
+                    <a:bodyPr/>
+                    <a:lstStyle/>
+                    <a:p>
+                      <a:pPr algn="ctr"/>
                       <a:r>
                         <a:rPr sz="900" b="1">
                           <a:solidFill>
@@ -3759,7 +3688,28 @@
                       </a:r>
                     </a:p>
                   </a:txBody>
-                  <a:tcPr marL="22860" marR="22860" marT="22860" marB="22860">
+                  <a:tcPr marT="22860" marB="22860" marL="22860" marR="22860">
+                    <a:solidFill>
+                      <a:schemeClr val="accent1"/>
+                    </a:solidFill>
+                  </a:tcPr>
+                </a:tc>
+                <a:tc hMerge="1">
+                  <a:txBody>
+                    <a:bodyPr/>
+                    <a:lstStyle/>
+                    <a:p>
+                      <a:r>
+                        <a:rPr sz="900" b="1">
+                          <a:solidFill>
+                            <a:srgbClr val="FFFFFF"/>
+                          </a:solidFill>
+                        </a:rPr>
+                        <a:t>Group2</a:t>
+                      </a:r>
+                    </a:p>
+                  </a:txBody>
+                  <a:tcPr marT="22860" marB="22860" marL="22860" marR="22860">
                     <a:solidFill>
                       <a:schemeClr val="accent1"/>
                     </a:solidFill>
@@ -3780,17 +3730,12 @@
                       </a:r>
                     </a:p>
                   </a:txBody>
-                  <a:tcPr marL="22860" marR="22860" marT="22860" marB="22860">
+                  <a:tcPr marT="22860" marB="22860" marL="22860" marR="22860">
                     <a:solidFill>
                       <a:schemeClr val="accent1"/>
                     </a:solidFill>
                   </a:tcPr>
                 </a:tc>
-                <a:extLst>
-                  <a:ext uri="{0D108BD9-81ED-4DB2-BD59-A6C34878D82A}">
-                    <a16:rowId xmlns:a16="http://schemas.microsoft.com/office/drawing/2014/main" val="10000"/>
-                  </a:ext>
-                </a:extLst>
               </a:tr>
               <a:tr h="137160">
                 <a:tc>
@@ -3798,10 +3743,17 @@
                     <a:bodyPr/>
                     <a:lstStyle/>
                     <a:p>
-                      <a:endParaRPr/>
-                    </a:p>
-                  </a:txBody>
-                  <a:tcPr marL="22860" marR="22860" marT="22860" marB="22860">
+                      <a:r>
+                        <a:rPr sz="900" b="1">
+                          <a:solidFill>
+                            <a:srgbClr val="FFFFFF"/>
+                          </a:solidFill>
+                        </a:rPr>
+                        <a:t/>
+                      </a:r>
+                    </a:p>
+                  </a:txBody>
+                  <a:tcPr marT="22860" marB="22860" marL="22860" marR="22860">
                     <a:solidFill>
                       <a:schemeClr val="accent1"/>
                     </a:solidFill>
@@ -3812,10 +3764,17 @@
                     <a:bodyPr/>
                     <a:lstStyle/>
                     <a:p>
-                      <a:endParaRPr/>
-                    </a:p>
-                  </a:txBody>
-                  <a:tcPr marL="22860" marR="22860" marT="22860" marB="22860">
+                      <a:r>
+                        <a:rPr sz="900" b="1">
+                          <a:solidFill>
+                            <a:srgbClr val="FFFFFF"/>
+                          </a:solidFill>
+                        </a:rPr>
+                        <a:t/>
+                      </a:r>
+                    </a:p>
+                  </a:txBody>
+                  <a:tcPr marT="22860" marB="22860" marL="22860" marR="22860">
                     <a:solidFill>
                       <a:schemeClr val="accent1"/>
                     </a:solidFill>
@@ -3836,7 +3795,7 @@
                       </a:r>
                     </a:p>
                   </a:txBody>
-                  <a:tcPr marL="22860" marR="22860" marT="22860" marB="22860">
+                  <a:tcPr marT="22860" marB="22860" marL="22860" marR="22860">
                     <a:solidFill>
                       <a:schemeClr val="accent1"/>
                     </a:solidFill>
@@ -3857,7 +3816,7 @@
                       </a:r>
                     </a:p>
                   </a:txBody>
-                  <a:tcPr marL="22860" marR="22860" marT="22860" marB="22860">
+                  <a:tcPr marT="22860" marB="22860" marL="22860" marR="22860">
                     <a:solidFill>
                       <a:schemeClr val="accent1"/>
                     </a:solidFill>
@@ -3878,7 +3837,7 @@
                       </a:r>
                     </a:p>
                   </a:txBody>
-                  <a:tcPr marL="22860" marR="22860" marT="22860" marB="22860">
+                  <a:tcPr marT="22860" marB="22860" marL="22860" marR="22860">
                     <a:solidFill>
                       <a:schemeClr val="accent1"/>
                     </a:solidFill>
@@ -3899,7 +3858,7 @@
                       </a:r>
                     </a:p>
                   </a:txBody>
-                  <a:tcPr marL="22860" marR="22860" marT="22860" marB="22860">
+                  <a:tcPr marT="22860" marB="22860" marL="22860" marR="22860">
                     <a:solidFill>
                       <a:schemeClr val="accent1"/>
                     </a:solidFill>
@@ -3920,17 +3879,212 @@
                       </a:r>
                     </a:p>
                   </a:txBody>
-                  <a:tcPr marL="22860" marR="22860" marT="22860" marB="22860">
+                  <a:tcPr marT="22860" marB="22860" marL="22860" marR="22860">
                     <a:solidFill>
                       <a:schemeClr val="accent1"/>
                     </a:solidFill>
                   </a:tcPr>
                 </a:tc>
-                <a:extLst>
-                  <a:ext uri="{0D108BD9-81ED-4DB2-BD59-A6C34878D82A}">
-                    <a16:rowId xmlns:a16="http://schemas.microsoft.com/office/drawing/2014/main" val="10001"/>
-                  </a:ext>
-                </a:extLst>
+              </a:tr>
+              <a:tr h="137160">
+                <a:tc rowSpan="2">
+                  <a:txBody>
+                    <a:bodyPr/>
+                    <a:lstStyle/>
+                    <a:p>
+                      <a:pPr algn="l"/>
+                      <a:r>
+                        <a:rPr sz="900" b="1"/>
+                        <a:t>2017</a:t>
+                      </a:r>
+                    </a:p>
+                  </a:txBody>
+                  <a:tcPr marT="22860" marB="22860" marL="22860" marR="22860"/>
+                </a:tc>
+                <a:tc>
+                  <a:txBody>
+                    <a:bodyPr/>
+                    <a:lstStyle/>
+                    <a:p>
+                      <a:pPr algn="l"/>
+                      <a:r>
+                        <a:rPr sz="900" b="1"/>
+                        <a:t>Sep 30, 2017</a:t>
+                      </a:r>
+                    </a:p>
+                  </a:txBody>
+                  <a:tcPr marT="22860" marB="22860" marL="22860" marR="22860"/>
+                </a:tc>
+                <a:tc>
+                  <a:txBody>
+                    <a:bodyPr/>
+                    <a:lstStyle/>
+                    <a:p>
+                      <a:pPr algn="ctr"/>
+                      <a:r>
+                        <a:rPr sz="900"/>
+                        <a:t>0.72%</a:t>
+                      </a:r>
+                    </a:p>
+                  </a:txBody>
+                  <a:tcPr marT="22860" marB="22860" marL="22860" marR="22860"/>
+                </a:tc>
+                <a:tc>
+                  <a:txBody>
+                    <a:bodyPr/>
+                    <a:lstStyle/>
+                    <a:p>
+                      <a:pPr algn="ctr"/>
+                      <a:r>
+                        <a:rPr sz="900"/>
+                        <a:t>0.69%</a:t>
+                      </a:r>
+                    </a:p>
+                  </a:txBody>
+                  <a:tcPr marT="22860" marB="22860" marL="22860" marR="22860"/>
+                </a:tc>
+                <a:tc>
+                  <a:txBody>
+                    <a:bodyPr/>
+                    <a:lstStyle/>
+                    <a:p>
+                      <a:pPr algn="ctr"/>
+                      <a:r>
+                        <a:rPr sz="900"/>
+                        <a:t>0.91%</a:t>
+                      </a:r>
+                    </a:p>
+                  </a:txBody>
+                  <a:tcPr marT="22860" marB="22860" marL="22860" marR="22860"/>
+                </a:tc>
+                <a:tc>
+                  <a:txBody>
+                    <a:bodyPr/>
+                    <a:lstStyle/>
+                    <a:p>
+                      <a:pPr algn="ctr"/>
+                      <a:r>
+                        <a:rPr sz="900"/>
+                        <a:t>0.23%</a:t>
+                      </a:r>
+                    </a:p>
+                  </a:txBody>
+                  <a:tcPr marT="22860" marB="22860" marL="22860" marR="22860"/>
+                </a:tc>
+                <a:tc>
+                  <a:txBody>
+                    <a:bodyPr/>
+                    <a:lstStyle/>
+                    <a:p>
+                      <a:pPr algn="ctr"/>
+                      <a:r>
+                        <a:rPr sz="900"/>
+                        <a:t>2.54%</a:t>
+                      </a:r>
+                    </a:p>
+                  </a:txBody>
+                  <a:tcPr marT="22860" marB="22860" marL="22860" marR="22860"/>
+                </a:tc>
+              </a:tr>
+              <a:tr h="137160">
+                <a:tc vMerge="1">
+                  <a:txBody>
+                    <a:bodyPr/>
+                    <a:lstStyle/>
+                    <a:p>
+                      <a:pPr algn="l"/>
+                      <a:r>
+                        <a:rPr sz="900" b="1"/>
+                        <a:t>2017</a:t>
+                      </a:r>
+                    </a:p>
+                  </a:txBody>
+                  <a:tcPr marT="22860" marB="22860" marL="22860" marR="22860"/>
+                </a:tc>
+                <a:tc>
+                  <a:txBody>
+                    <a:bodyPr/>
+                    <a:lstStyle/>
+                    <a:p>
+                      <a:pPr algn="l"/>
+                      <a:r>
+                        <a:rPr sz="900" b="1"/>
+                        <a:t>Dec 31, 2017</a:t>
+                      </a:r>
+                    </a:p>
+                  </a:txBody>
+                  <a:tcPr marT="22860" marB="22860" marL="22860" marR="22860"/>
+                </a:tc>
+                <a:tc>
+                  <a:txBody>
+                    <a:bodyPr/>
+                    <a:lstStyle/>
+                    <a:p>
+                      <a:pPr algn="ctr"/>
+                      <a:r>
+                        <a:rPr sz="900"/>
+                        <a:t>0.98%</a:t>
+                      </a:r>
+                    </a:p>
+                  </a:txBody>
+                  <a:tcPr marT="22860" marB="22860" marL="22860" marR="22860"/>
+                </a:tc>
+                <a:tc>
+                  <a:txBody>
+                    <a:bodyPr/>
+                    <a:lstStyle/>
+                    <a:p>
+                      <a:pPr algn="ctr"/>
+                      <a:r>
+                        <a:rPr sz="900"/>
+                        <a:t>0.78%</a:t>
+                      </a:r>
+                    </a:p>
+                  </a:txBody>
+                  <a:tcPr marT="22860" marB="22860" marL="22860" marR="22860"/>
+                </a:tc>
+                <a:tc>
+                  <a:txBody>
+                    <a:bodyPr/>
+                    <a:lstStyle/>
+                    <a:p>
+                      <a:pPr algn="ctr"/>
+                      <a:r>
+                        <a:rPr sz="900"/>
+                        <a:t>0.91%</a:t>
+                      </a:r>
+                    </a:p>
+                  </a:txBody>
+                  <a:tcPr marT="22860" marB="22860" marL="22860" marR="22860"/>
+                </a:tc>
+                <a:tc>
+                  <a:txBody>
+                    <a:bodyPr/>
+                    <a:lstStyle/>
+                    <a:p>
+                      <a:pPr algn="ctr"/>
+                      <a:r>
+                        <a:rPr sz="900"/>
+                        <a:t>0.49%</a:t>
+                      </a:r>
+                    </a:p>
+                  </a:txBody>
+                  <a:tcPr marT="22860" marB="22860" marL="22860" marR="22860"/>
+                </a:tc>
+                <a:tc>
+                  <a:txBody>
+                    <a:bodyPr/>
+                    <a:lstStyle/>
+                    <a:p>
+                      <a:pPr algn="ctr"/>
+                      <a:r>
+                        <a:rPr sz="900"/>
+                        <a:t>3.17%</a:t>
+                      </a:r>
+                    </a:p>
+                  </a:txBody>
+                  <a:tcPr marT="22860" marB="22860" marL="22860" marR="22860"/>
+                </a:tc>
               </a:tr>
               <a:tr h="137160">
                 <a:tc rowSpan="4">
@@ -3938,98 +4092,299 @@
                     <a:bodyPr/>
                     <a:lstStyle/>
                     <a:p>
+                      <a:pPr algn="l"/>
+                      <a:r>
+                        <a:rPr sz="900" b="1"/>
+                        <a:t>2018</a:t>
+                      </a:r>
+                    </a:p>
+                  </a:txBody>
+                  <a:tcPr marT="22860" marB="22860" marL="22860" marR="22860"/>
+                </a:tc>
+                <a:tc>
+                  <a:txBody>
+                    <a:bodyPr/>
+                    <a:lstStyle/>
+                    <a:p>
+                      <a:pPr algn="l"/>
+                      <a:r>
+                        <a:rPr sz="900" b="1"/>
+                        <a:t>Mar 31, 2018</a:t>
+                      </a:r>
+                    </a:p>
+                  </a:txBody>
+                  <a:tcPr marT="22860" marB="22860" marL="22860" marR="22860"/>
+                </a:tc>
+                <a:tc>
+                  <a:txBody>
+                    <a:bodyPr/>
+                    <a:lstStyle/>
+                    <a:p>
                       <a:pPr algn="ctr"/>
                       <a:r>
-                        <a:rPr sz="900" b="1" dirty="0"/>
-                        <a:t>2017</a:t>
-                      </a:r>
-                    </a:p>
-                  </a:txBody>
-                  <a:tcPr marL="22860" marR="22860" marT="22860" marB="22860"/>
-                </a:tc>
-                <a:tc>
-                  <a:txBody>
-                    <a:bodyPr/>
-                    <a:lstStyle/>
-                    <a:p>
-                      <a:r>
-                        <a:rPr sz="900" b="1" dirty="0"/>
-                        <a:t>Mar 31, 2017</a:t>
-                      </a:r>
-                    </a:p>
-                  </a:txBody>
-                  <a:tcPr marL="22860" marR="22860" marT="22860" marB="22860"/>
-                </a:tc>
-                <a:tc>
-                  <a:txBody>
-                    <a:bodyPr/>
-                    <a:lstStyle/>
-                    <a:p>
-                      <a:r>
                         <a:rPr sz="900"/>
-                        <a:t>0.51%</a:t>
-                      </a:r>
-                    </a:p>
-                  </a:txBody>
-                  <a:tcPr marL="22860" marR="22860" marT="22860" marB="22860"/>
-                </a:tc>
-                <a:tc>
-                  <a:txBody>
-                    <a:bodyPr/>
-                    <a:lstStyle/>
-                    <a:p>
+                        <a:t>0.62%</a:t>
+                      </a:r>
+                    </a:p>
+                  </a:txBody>
+                  <a:tcPr marT="22860" marB="22860" marL="22860" marR="22860"/>
+                </a:tc>
+                <a:tc>
+                  <a:txBody>
+                    <a:bodyPr/>
+                    <a:lstStyle/>
+                    <a:p>
+                      <a:pPr algn="ctr"/>
                       <a:r>
                         <a:rPr sz="900"/>
-                        <a:t>0.89%</a:t>
-                      </a:r>
-                    </a:p>
-                  </a:txBody>
-                  <a:tcPr marL="22860" marR="22860" marT="22860" marB="22860"/>
-                </a:tc>
-                <a:tc>
-                  <a:txBody>
-                    <a:bodyPr/>
-                    <a:lstStyle/>
-                    <a:p>
+                        <a:t>0.50%</a:t>
+                      </a:r>
+                    </a:p>
+                  </a:txBody>
+                  <a:tcPr marT="22860" marB="22860" marL="22860" marR="22860"/>
+                </a:tc>
+                <a:tc>
+                  <a:txBody>
+                    <a:bodyPr/>
+                    <a:lstStyle/>
+                    <a:p>
+                      <a:pPr algn="ctr"/>
                       <a:r>
                         <a:rPr sz="900"/>
-                        <a:t>0.74%</a:t>
-                      </a:r>
-                    </a:p>
-                  </a:txBody>
-                  <a:tcPr marL="22860" marR="22860" marT="22860" marB="22860"/>
-                </a:tc>
-                <a:tc>
-                  <a:txBody>
-                    <a:bodyPr/>
-                    <a:lstStyle/>
-                    <a:p>
+                        <a:t>0.95%</a:t>
+                      </a:r>
+                    </a:p>
+                  </a:txBody>
+                  <a:tcPr marT="22860" marB="22860" marL="22860" marR="22860"/>
+                </a:tc>
+                <a:tc>
+                  <a:txBody>
+                    <a:bodyPr/>
+                    <a:lstStyle/>
+                    <a:p>
+                      <a:pPr algn="ctr"/>
                       <a:r>
                         <a:rPr sz="900"/>
-                        <a:t>0.29%</a:t>
-                      </a:r>
-                    </a:p>
-                  </a:txBody>
-                  <a:tcPr marL="22860" marR="22860" marT="22860" marB="22860"/>
-                </a:tc>
-                <a:tc>
-                  <a:txBody>
-                    <a:bodyPr/>
-                    <a:lstStyle/>
-                    <a:p>
-                      <a:r>
-                        <a:rPr sz="900" dirty="0"/>
-                        <a:t>2.43%</a:t>
-                      </a:r>
-                    </a:p>
-                  </a:txBody>
-                  <a:tcPr marL="22860" marR="22860" marT="22860" marB="22860"/>
-                </a:tc>
-                <a:extLst>
-                  <a:ext uri="{0D108BD9-81ED-4DB2-BD59-A6C34878D82A}">
-                    <a16:rowId xmlns:a16="http://schemas.microsoft.com/office/drawing/2014/main" val="10002"/>
-                  </a:ext>
-                </a:extLst>
+                        <a:t>0.87%</a:t>
+                      </a:r>
+                    </a:p>
+                  </a:txBody>
+                  <a:tcPr marT="22860" marB="22860" marL="22860" marR="22860"/>
+                </a:tc>
+                <a:tc>
+                  <a:txBody>
+                    <a:bodyPr/>
+                    <a:lstStyle/>
+                    <a:p>
+                      <a:pPr algn="ctr"/>
+                      <a:r>
+                        <a:rPr sz="900"/>
+                        <a:t>2.94%</a:t>
+                      </a:r>
+                    </a:p>
+                  </a:txBody>
+                  <a:tcPr marT="22860" marB="22860" marL="22860" marR="22860"/>
+                </a:tc>
+              </a:tr>
+              <a:tr h="137160">
+                <a:tc>
+                  <a:txBody>
+                    <a:bodyPr/>
+                    <a:lstStyle/>
+                    <a:p>
+                      <a:pPr algn="l"/>
+                      <a:r>
+                        <a:rPr sz="900" b="1"/>
+                        <a:t>2018</a:t>
+                      </a:r>
+                    </a:p>
+                  </a:txBody>
+                  <a:tcPr marT="22860" marB="22860" marL="22860" marR="22860"/>
+                </a:tc>
+                <a:tc>
+                  <a:txBody>
+                    <a:bodyPr/>
+                    <a:lstStyle/>
+                    <a:p>
+                      <a:pPr algn="l"/>
+                      <a:r>
+                        <a:rPr sz="900" b="1"/>
+                        <a:t>Jun 30, 2018</a:t>
+                      </a:r>
+                    </a:p>
+                  </a:txBody>
+                  <a:tcPr marT="22860" marB="22860" marL="22860" marR="22860"/>
+                </a:tc>
+                <a:tc>
+                  <a:txBody>
+                    <a:bodyPr/>
+                    <a:lstStyle/>
+                    <a:p>
+                      <a:pPr algn="ctr"/>
+                      <a:r>
+                        <a:rPr sz="900"/>
+                        <a:t>0.82%</a:t>
+                      </a:r>
+                    </a:p>
+                  </a:txBody>
+                  <a:tcPr marT="22860" marB="22860" marL="22860" marR="22860"/>
+                </a:tc>
+                <a:tc>
+                  <a:txBody>
+                    <a:bodyPr/>
+                    <a:lstStyle/>
+                    <a:p>
+                      <a:pPr algn="ctr"/>
+                      <a:r>
+                        <a:rPr sz="900"/>
+                        <a:t>0.78%</a:t>
+                      </a:r>
+                    </a:p>
+                  </a:txBody>
+                  <a:tcPr marT="22860" marB="22860" marL="22860" marR="22860"/>
+                </a:tc>
+                <a:tc>
+                  <a:txBody>
+                    <a:bodyPr/>
+                    <a:lstStyle/>
+                    <a:p>
+                      <a:pPr algn="ctr"/>
+                      <a:r>
+                        <a:rPr sz="900"/>
+                        <a:t>0.07%</a:t>
+                      </a:r>
+                    </a:p>
+                  </a:txBody>
+                  <a:tcPr marT="22860" marB="22860" marL="22860" marR="22860"/>
+                </a:tc>
+                <a:tc>
+                  <a:txBody>
+                    <a:bodyPr/>
+                    <a:lstStyle/>
+                    <a:p>
+                      <a:pPr algn="ctr"/>
+                      <a:r>
+                        <a:rPr sz="900"/>
+                        <a:t>0.62%</a:t>
+                      </a:r>
+                    </a:p>
+                  </a:txBody>
+                  <a:tcPr marT="22860" marB="22860" marL="22860" marR="22860"/>
+                </a:tc>
+                <a:tc>
+                  <a:txBody>
+                    <a:bodyPr/>
+                    <a:lstStyle/>
+                    <a:p>
+                      <a:pPr algn="ctr"/>
+                      <a:r>
+                        <a:rPr sz="900"/>
+                        <a:t>2.29%</a:t>
+                      </a:r>
+                    </a:p>
+                  </a:txBody>
+                  <a:tcPr marT="22860" marB="22860" marL="22860" marR="22860"/>
+                </a:tc>
+              </a:tr>
+              <a:tr h="137160">
+                <a:tc>
+                  <a:txBody>
+                    <a:bodyPr/>
+                    <a:lstStyle/>
+                    <a:p>
+                      <a:pPr algn="l"/>
+                      <a:r>
+                        <a:rPr sz="900" b="1"/>
+                        <a:t>2018</a:t>
+                      </a:r>
+                    </a:p>
+                  </a:txBody>
+                  <a:tcPr marT="22860" marB="22860" marL="22860" marR="22860"/>
+                </a:tc>
+                <a:tc>
+                  <a:txBody>
+                    <a:bodyPr/>
+                    <a:lstStyle/>
+                    <a:p>
+                      <a:pPr algn="l"/>
+                      <a:r>
+                        <a:rPr sz="900" b="1"/>
+                        <a:t>Sep 30, 2018</a:t>
+                      </a:r>
+                    </a:p>
+                  </a:txBody>
+                  <a:tcPr marT="22860" marB="22860" marL="22860" marR="22860"/>
+                </a:tc>
+                <a:tc>
+                  <a:txBody>
+                    <a:bodyPr/>
+                    <a:lstStyle/>
+                    <a:p>
+                      <a:pPr algn="ctr"/>
+                      <a:r>
+                        <a:rPr sz="900"/>
+                        <a:t>0.54%</a:t>
+                      </a:r>
+                    </a:p>
+                  </a:txBody>
+                  <a:tcPr marT="22860" marB="22860" marL="22860" marR="22860"/>
+                </a:tc>
+                <a:tc>
+                  <a:txBody>
+                    <a:bodyPr/>
+                    <a:lstStyle/>
+                    <a:p>
+                      <a:pPr algn="ctr"/>
+                      <a:r>
+                        <a:rPr sz="900"/>
+                        <a:t>0.84%</a:t>
+                      </a:r>
+                    </a:p>
+                  </a:txBody>
+                  <a:tcPr marT="22860" marB="22860" marL="22860" marR="22860"/>
+                </a:tc>
+                <a:tc>
+                  <a:txBody>
+                    <a:bodyPr/>
+                    <a:lstStyle/>
+                    <a:p>
+                      <a:pPr algn="ctr"/>
+                      <a:r>
+                        <a:rPr sz="900"/>
+                        <a:t>0.48%</a:t>
+                      </a:r>
+                    </a:p>
+                  </a:txBody>
+                  <a:tcPr marT="22860" marB="22860" marL="22860" marR="22860"/>
+                </a:tc>
+                <a:tc>
+                  <a:txBody>
+                    <a:bodyPr/>
+                    <a:lstStyle/>
+                    <a:p>
+                      <a:pPr algn="ctr"/>
+                      <a:r>
+                        <a:rPr sz="900"/>
+                        <a:t>0.54%</a:t>
+                      </a:r>
+                    </a:p>
+                  </a:txBody>
+                  <a:tcPr marT="22860" marB="22860" marL="22860" marR="22860"/>
+                </a:tc>
+                <a:tc>
+                  <a:txBody>
+                    <a:bodyPr/>
+                    <a:lstStyle/>
+                    <a:p>
+                      <a:pPr algn="ctr"/>
+                      <a:r>
+                        <a:rPr sz="900"/>
+                        <a:t>2.39%</a:t>
+                      </a:r>
+                    </a:p>
+                  </a:txBody>
+                  <a:tcPr marT="22860" marB="22860" marL="22860" marR="22860"/>
+                </a:tc>
               </a:tr>
               <a:tr h="137160">
                 <a:tc vMerge="1">
@@ -4037,588 +4392,199 @@
                     <a:bodyPr/>
                     <a:lstStyle/>
                     <a:p>
+                      <a:pPr algn="l"/>
                       <a:r>
                         <a:rPr sz="900" b="1"/>
-                        <a:t>2017</a:t>
-                      </a:r>
-                    </a:p>
-                  </a:txBody>
-                  <a:tcPr marL="22860" marR="22860" marT="22860" marB="22860"/>
-                </a:tc>
-                <a:tc>
-                  <a:txBody>
-                    <a:bodyPr/>
-                    <a:lstStyle/>
-                    <a:p>
-                      <a:r>
-                        <a:rPr sz="900" b="1" dirty="0"/>
-                        <a:t>Jun 30, 2017</a:t>
-                      </a:r>
-                    </a:p>
-                  </a:txBody>
-                  <a:tcPr marL="22860" marR="22860" marT="22860" marB="22860"/>
-                </a:tc>
-                <a:tc>
-                  <a:txBody>
-                    <a:bodyPr/>
-                    <a:lstStyle/>
-                    <a:p>
+                        <a:t>2018</a:t>
+                      </a:r>
+                    </a:p>
+                  </a:txBody>
+                  <a:tcPr marT="22860" marB="22860" marL="22860" marR="22860"/>
+                </a:tc>
+                <a:tc>
+                  <a:txBody>
+                    <a:bodyPr/>
+                    <a:lstStyle/>
+                    <a:p>
+                      <a:pPr algn="l"/>
+                      <a:r>
+                        <a:rPr sz="900" b="1"/>
+                        <a:t>Dec 31, 2018</a:t>
+                      </a:r>
+                    </a:p>
+                  </a:txBody>
+                  <a:tcPr marT="22860" marB="22860" marL="22860" marR="22860"/>
+                </a:tc>
+                <a:tc>
+                  <a:txBody>
+                    <a:bodyPr/>
+                    <a:lstStyle/>
+                    <a:p>
+                      <a:pPr algn="ctr"/>
                       <a:r>
                         <a:rPr sz="900"/>
-                        <a:t>0.67%</a:t>
-                      </a:r>
-                    </a:p>
-                  </a:txBody>
-                  <a:tcPr marL="22860" marR="22860" marT="22860" marB="22860"/>
-                </a:tc>
-                <a:tc>
-                  <a:txBody>
-                    <a:bodyPr/>
-                    <a:lstStyle/>
-                    <a:p>
+                        <a:t>0.42%</a:t>
+                      </a:r>
+                    </a:p>
+                  </a:txBody>
+                  <a:tcPr marT="22860" marB="22860" marL="22860" marR="22860"/>
+                </a:tc>
+                <a:tc>
+                  <a:txBody>
+                    <a:bodyPr/>
+                    <a:lstStyle/>
+                    <a:p>
+                      <a:pPr algn="ctr"/>
                       <a:r>
                         <a:rPr sz="900"/>
-                        <a:t>0.05%</a:t>
-                      </a:r>
-                    </a:p>
-                  </a:txBody>
-                  <a:tcPr marL="22860" marR="22860" marT="22860" marB="22860"/>
-                </a:tc>
-                <a:tc>
-                  <a:txBody>
-                    <a:bodyPr/>
-                    <a:lstStyle/>
-                    <a:p>
+                        <a:t>0.20%</a:t>
+                      </a:r>
+                    </a:p>
+                  </a:txBody>
+                  <a:tcPr marT="22860" marB="22860" marL="22860" marR="22860"/>
+                </a:tc>
+                <a:tc>
+                  <a:txBody>
+                    <a:bodyPr/>
+                    <a:lstStyle/>
+                    <a:p>
+                      <a:pPr algn="ctr"/>
                       <a:r>
                         <a:rPr sz="900"/>
-                        <a:t>0.60%</a:t>
-                      </a:r>
-                    </a:p>
-                  </a:txBody>
-                  <a:tcPr marL="22860" marR="22860" marT="22860" marB="22860"/>
-                </a:tc>
-                <a:tc>
-                  <a:txBody>
-                    <a:bodyPr/>
-                    <a:lstStyle/>
-                    <a:p>
+                        <a:t>0.23%</a:t>
+                      </a:r>
+                    </a:p>
+                  </a:txBody>
+                  <a:tcPr marT="22860" marB="22860" marL="22860" marR="22860"/>
+                </a:tc>
+                <a:tc>
+                  <a:txBody>
+                    <a:bodyPr/>
+                    <a:lstStyle/>
+                    <a:p>
+                      <a:pPr algn="ctr"/>
                       <a:r>
                         <a:rPr sz="900"/>
-                        <a:t>0.43%</a:t>
-                      </a:r>
-                    </a:p>
-                  </a:txBody>
-                  <a:tcPr marL="22860" marR="22860" marT="22860" marB="22860"/>
-                </a:tc>
-                <a:tc>
-                  <a:txBody>
-                    <a:bodyPr/>
-                    <a:lstStyle/>
-                    <a:p>
+                        <a:t>0.96%</a:t>
+                      </a:r>
+                    </a:p>
+                  </a:txBody>
+                  <a:tcPr marT="22860" marB="22860" marL="22860" marR="22860"/>
+                </a:tc>
+                <a:tc>
+                  <a:txBody>
+                    <a:bodyPr/>
+                    <a:lstStyle/>
+                    <a:p>
+                      <a:pPr algn="ctr"/>
                       <a:r>
                         <a:rPr sz="900"/>
-                        <a:t>1.74%</a:t>
-                      </a:r>
-                    </a:p>
-                  </a:txBody>
-                  <a:tcPr marL="22860" marR="22860" marT="22860" marB="22860"/>
-                </a:tc>
-                <a:extLst>
-                  <a:ext uri="{0D108BD9-81ED-4DB2-BD59-A6C34878D82A}">
-                    <a16:rowId xmlns:a16="http://schemas.microsoft.com/office/drawing/2014/main" val="10003"/>
-                  </a:ext>
-                </a:extLst>
+                        <a:t>1.81%</a:t>
+                      </a:r>
+                    </a:p>
+                  </a:txBody>
+                  <a:tcPr marT="22860" marB="22860" marL="22860" marR="22860"/>
+                </a:tc>
               </a:tr>
               <a:tr h="137160">
-                <a:tc vMerge="1">
-                  <a:txBody>
-                    <a:bodyPr/>
-                    <a:lstStyle/>
-                    <a:p>
-                      <a:r>
-                        <a:rPr sz="900" b="1"/>
-                        <a:t>2017</a:t>
-                      </a:r>
-                    </a:p>
-                  </a:txBody>
-                  <a:tcPr marL="22860" marR="22860" marT="22860" marB="22860"/>
-                </a:tc>
-                <a:tc>
-                  <a:txBody>
-                    <a:bodyPr/>
-                    <a:lstStyle/>
-                    <a:p>
-                      <a:r>
-                        <a:rPr sz="900" b="1" dirty="0"/>
-                        <a:t>Sep 30, 2017</a:t>
-                      </a:r>
-                    </a:p>
-                  </a:txBody>
-                  <a:tcPr marL="22860" marR="22860" marT="22860" marB="22860"/>
-                </a:tc>
-                <a:tc>
-                  <a:txBody>
-                    <a:bodyPr/>
-                    <a:lstStyle/>
-                    <a:p>
-                      <a:r>
-                        <a:rPr sz="900"/>
-                        <a:t>0.73%</a:t>
-                      </a:r>
-                    </a:p>
-                  </a:txBody>
-                  <a:tcPr marL="22860" marR="22860" marT="22860" marB="22860"/>
-                </a:tc>
-                <a:tc>
-                  <a:txBody>
-                    <a:bodyPr/>
-                    <a:lstStyle/>
-                    <a:p>
-                      <a:r>
-                        <a:rPr sz="900"/>
-                        <a:t>0.83%</a:t>
-                      </a:r>
-                    </a:p>
-                  </a:txBody>
-                  <a:tcPr marL="22860" marR="22860" marT="22860" marB="22860"/>
-                </a:tc>
-                <a:tc>
-                  <a:txBody>
-                    <a:bodyPr/>
-                    <a:lstStyle/>
-                    <a:p>
-                      <a:r>
-                        <a:rPr sz="900"/>
-                        <a:t>0.42%</a:t>
-                      </a:r>
-                    </a:p>
-                  </a:txBody>
-                  <a:tcPr marL="22860" marR="22860" marT="22860" marB="22860"/>
-                </a:tc>
-                <a:tc>
-                  <a:txBody>
-                    <a:bodyPr/>
-                    <a:lstStyle/>
-                    <a:p>
-                      <a:r>
-                        <a:rPr sz="900"/>
-                        <a:t>0.55%</a:t>
-                      </a:r>
-                    </a:p>
-                  </a:txBody>
-                  <a:tcPr marL="22860" marR="22860" marT="22860" marB="22860"/>
-                </a:tc>
-                <a:tc>
-                  <a:txBody>
-                    <a:bodyPr/>
-                    <a:lstStyle/>
-                    <a:p>
-                      <a:r>
-                        <a:rPr sz="900"/>
-                        <a:t>2.53%</a:t>
-                      </a:r>
-                    </a:p>
-                  </a:txBody>
-                  <a:tcPr marL="22860" marR="22860" marT="22860" marB="22860"/>
-                </a:tc>
-                <a:extLst>
-                  <a:ext uri="{0D108BD9-81ED-4DB2-BD59-A6C34878D82A}">
-                    <a16:rowId xmlns:a16="http://schemas.microsoft.com/office/drawing/2014/main" val="10004"/>
-                  </a:ext>
-                </a:extLst>
-              </a:tr>
-              <a:tr h="137160">
-                <a:tc vMerge="1">
-                  <a:txBody>
-                    <a:bodyPr/>
-                    <a:lstStyle/>
-                    <a:p>
-                      <a:r>
-                        <a:rPr sz="900" b="1"/>
-                        <a:t>2017</a:t>
-                      </a:r>
-                    </a:p>
-                  </a:txBody>
-                  <a:tcPr marL="22860" marR="22860" marT="22860" marB="22860"/>
-                </a:tc>
-                <a:tc>
-                  <a:txBody>
-                    <a:bodyPr/>
-                    <a:lstStyle/>
-                    <a:p>
-                      <a:r>
-                        <a:rPr sz="900" b="1" dirty="0"/>
-                        <a:t>Dec 31, 2017</a:t>
-                      </a:r>
-                    </a:p>
-                  </a:txBody>
-                  <a:tcPr marL="22860" marR="22860" marT="22860" marB="22860"/>
-                </a:tc>
-                <a:tc>
-                  <a:txBody>
-                    <a:bodyPr/>
-                    <a:lstStyle/>
-                    <a:p>
-                      <a:r>
-                        <a:rPr sz="900"/>
-                        <a:t>0.53%</a:t>
-                      </a:r>
-                    </a:p>
-                  </a:txBody>
-                  <a:tcPr marL="22860" marR="22860" marT="22860" marB="22860"/>
-                </a:tc>
-                <a:tc>
-                  <a:txBody>
-                    <a:bodyPr/>
-                    <a:lstStyle/>
-                    <a:p>
-                      <a:r>
-                        <a:rPr sz="900"/>
-                        <a:t>0.77%</a:t>
-                      </a:r>
-                    </a:p>
-                  </a:txBody>
-                  <a:tcPr marL="22860" marR="22860" marT="22860" marB="22860"/>
-                </a:tc>
-                <a:tc>
-                  <a:txBody>
-                    <a:bodyPr/>
-                    <a:lstStyle/>
-                    <a:p>
-                      <a:r>
-                        <a:rPr sz="900"/>
-                        <a:t>0.88%</a:t>
-                      </a:r>
-                    </a:p>
-                  </a:txBody>
-                  <a:tcPr marL="22860" marR="22860" marT="22860" marB="22860"/>
-                </a:tc>
-                <a:tc>
-                  <a:txBody>
-                    <a:bodyPr/>
-                    <a:lstStyle/>
-                    <a:p>
-                      <a:r>
-                        <a:rPr sz="900"/>
-                        <a:t>0.93%</a:t>
-                      </a:r>
-                    </a:p>
-                  </a:txBody>
-                  <a:tcPr marL="22860" marR="22860" marT="22860" marB="22860"/>
-                </a:tc>
-                <a:tc>
-                  <a:txBody>
-                    <a:bodyPr/>
-                    <a:lstStyle/>
-                    <a:p>
-                      <a:r>
-                        <a:rPr sz="900"/>
-                        <a:t>3.10%</a:t>
-                      </a:r>
-                    </a:p>
-                  </a:txBody>
-                  <a:tcPr marL="22860" marR="22860" marT="22860" marB="22860"/>
-                </a:tc>
-                <a:extLst>
-                  <a:ext uri="{0D108BD9-81ED-4DB2-BD59-A6C34878D82A}">
-                    <a16:rowId xmlns:a16="http://schemas.microsoft.com/office/drawing/2014/main" val="10005"/>
-                  </a:ext>
-                </a:extLst>
-              </a:tr>
-              <a:tr h="137160">
-                <a:tc rowSpan="2">
-                  <a:txBody>
-                    <a:bodyPr/>
-                    <a:lstStyle/>
-                    <a:p>
-                      <a:pPr algn="ctr"/>
-                      <a:r>
-                        <a:rPr sz="900" b="1" dirty="0"/>
-                        <a:t>2018</a:t>
-                      </a:r>
-                    </a:p>
-                  </a:txBody>
-                  <a:tcPr marL="22860" marR="22860" marT="22860" marB="22860"/>
-                </a:tc>
-                <a:tc>
-                  <a:txBody>
-                    <a:bodyPr/>
-                    <a:lstStyle/>
-                    <a:p>
-                      <a:r>
-                        <a:rPr sz="900" b="1" dirty="0"/>
-                        <a:t>Mar 31, 2018</a:t>
-                      </a:r>
-                    </a:p>
-                  </a:txBody>
-                  <a:tcPr marL="22860" marR="22860" marT="22860" marB="22860"/>
-                </a:tc>
-                <a:tc>
-                  <a:txBody>
-                    <a:bodyPr/>
-                    <a:lstStyle/>
-                    <a:p>
-                      <a:r>
-                        <a:rPr sz="900"/>
-                        <a:t>0.01%</a:t>
-                      </a:r>
-                    </a:p>
-                  </a:txBody>
-                  <a:tcPr marL="22860" marR="22860" marT="22860" marB="22860"/>
-                </a:tc>
-                <a:tc>
-                  <a:txBody>
-                    <a:bodyPr/>
-                    <a:lstStyle/>
-                    <a:p>
-                      <a:r>
-                        <a:rPr sz="900"/>
-                        <a:t>0.74%</a:t>
-                      </a:r>
-                    </a:p>
-                  </a:txBody>
-                  <a:tcPr marL="22860" marR="22860" marT="22860" marB="22860"/>
-                </a:tc>
-                <a:tc>
-                  <a:txBody>
-                    <a:bodyPr/>
-                    <a:lstStyle/>
-                    <a:p>
-                      <a:r>
-                        <a:rPr sz="900"/>
-                        <a:t>0.67%</a:t>
-                      </a:r>
-                    </a:p>
-                  </a:txBody>
-                  <a:tcPr marL="22860" marR="22860" marT="22860" marB="22860"/>
-                </a:tc>
-                <a:tc>
-                  <a:txBody>
-                    <a:bodyPr/>
-                    <a:lstStyle/>
-                    <a:p>
-                      <a:r>
-                        <a:rPr sz="900"/>
-                        <a:t>0.83%</a:t>
-                      </a:r>
-                    </a:p>
-                  </a:txBody>
-                  <a:tcPr marL="22860" marR="22860" marT="22860" marB="22860"/>
-                </a:tc>
-                <a:tc>
-                  <a:txBody>
-                    <a:bodyPr/>
-                    <a:lstStyle/>
-                    <a:p>
-                      <a:r>
-                        <a:rPr sz="900"/>
-                        <a:t>2.26%</a:t>
-                      </a:r>
-                    </a:p>
-                  </a:txBody>
-                  <a:tcPr marL="22860" marR="22860" marT="22860" marB="22860"/>
-                </a:tc>
-                <a:extLst>
-                  <a:ext uri="{0D108BD9-81ED-4DB2-BD59-A6C34878D82A}">
-                    <a16:rowId xmlns:a16="http://schemas.microsoft.com/office/drawing/2014/main" val="10006"/>
-                  </a:ext>
-                </a:extLst>
-              </a:tr>
-              <a:tr h="137160">
-                <a:tc vMerge="1">
-                  <a:txBody>
-                    <a:bodyPr/>
-                    <a:lstStyle/>
-                    <a:p>
-                      <a:r>
-                        <a:rPr sz="900" b="1"/>
-                        <a:t>2018</a:t>
-                      </a:r>
-                    </a:p>
-                  </a:txBody>
-                  <a:tcPr marL="22860" marR="22860" marT="22860" marB="22860"/>
-                </a:tc>
-                <a:tc>
-                  <a:txBody>
-                    <a:bodyPr/>
-                    <a:lstStyle/>
-                    <a:p>
-                      <a:r>
-                        <a:rPr sz="900" b="1" dirty="0"/>
-                        <a:t>Jun 30, 2018</a:t>
-                      </a:r>
-                    </a:p>
-                  </a:txBody>
-                  <a:tcPr marL="22860" marR="22860" marT="22860" marB="22860"/>
-                </a:tc>
-                <a:tc>
-                  <a:txBody>
-                    <a:bodyPr/>
-                    <a:lstStyle/>
-                    <a:p>
-                      <a:r>
-                        <a:rPr sz="900"/>
-                        <a:t>0.89%</a:t>
-                      </a:r>
-                    </a:p>
-                  </a:txBody>
-                  <a:tcPr marL="22860" marR="22860" marT="22860" marB="22860"/>
-                </a:tc>
-                <a:tc>
-                  <a:txBody>
-                    <a:bodyPr/>
-                    <a:lstStyle/>
-                    <a:p>
-                      <a:r>
-                        <a:rPr sz="900"/>
-                        <a:t>0.23%</a:t>
-                      </a:r>
-                    </a:p>
-                  </a:txBody>
-                  <a:tcPr marL="22860" marR="22860" marT="22860" marB="22860"/>
-                </a:tc>
-                <a:tc>
-                  <a:txBody>
-                    <a:bodyPr/>
-                    <a:lstStyle/>
-                    <a:p>
-                      <a:r>
-                        <a:rPr sz="900"/>
-                        <a:t>0.61%</a:t>
-                      </a:r>
-                    </a:p>
-                  </a:txBody>
-                  <a:tcPr marL="22860" marR="22860" marT="22860" marB="22860"/>
-                </a:tc>
-                <a:tc>
-                  <a:txBody>
-                    <a:bodyPr/>
-                    <a:lstStyle/>
-                    <a:p>
-                      <a:r>
-                        <a:rPr sz="900"/>
-                        <a:t>0.17%</a:t>
-                      </a:r>
-                    </a:p>
-                  </a:txBody>
-                  <a:tcPr marL="22860" marR="22860" marT="22860" marB="22860"/>
-                </a:tc>
-                <a:tc>
-                  <a:txBody>
-                    <a:bodyPr/>
-                    <a:lstStyle/>
-                    <a:p>
-                      <a:r>
-                        <a:rPr sz="900"/>
-                        <a:t>1.90%</a:t>
-                      </a:r>
-                    </a:p>
-                  </a:txBody>
-                  <a:tcPr marL="22860" marR="22860" marT="22860" marB="22860"/>
-                </a:tc>
-                <a:extLst>
-                  <a:ext uri="{0D108BD9-81ED-4DB2-BD59-A6C34878D82A}">
-                    <a16:rowId xmlns:a16="http://schemas.microsoft.com/office/drawing/2014/main" val="10007"/>
-                  </a:ext>
-                </a:extLst>
-              </a:tr>
-              <a:tr h="137160">
-                <a:tc>
-                  <a:txBody>
-                    <a:bodyPr/>
-                    <a:lstStyle/>
-                    <a:p>
+                <a:tc>
+                  <a:txBody>
+                    <a:bodyPr/>
+                    <a:lstStyle/>
+                    <a:p>
+                      <a:pPr algn="l"/>
                       <a:r>
                         <a:rPr sz="900" b="1"/>
                         <a:t>Total</a:t>
                       </a:r>
                     </a:p>
                   </a:txBody>
-                  <a:tcPr marL="22860" marR="22860" marT="22860" marB="22860"/>
-                </a:tc>
-                <a:tc>
-                  <a:txBody>
-                    <a:bodyPr/>
-                    <a:lstStyle/>
-                    <a:p>
+                  <a:tcPr marT="22860" marB="22860" marL="22860" marR="22860"/>
+                </a:tc>
+                <a:tc>
+                  <a:txBody>
+                    <a:bodyPr/>
+                    <a:lstStyle/>
+                    <a:p>
+                      <a:pPr algn="l"/>
                       <a:r>
                         <a:rPr sz="900" b="1"/>
                         <a:t> </a:t>
                       </a:r>
                     </a:p>
                   </a:txBody>
-                  <a:tcPr marL="22860" marR="22860" marT="22860" marB="22860"/>
-                </a:tc>
-                <a:tc>
-                  <a:txBody>
-                    <a:bodyPr/>
-                    <a:lstStyle/>
-                    <a:p>
+                  <a:tcPr marT="22860" marB="22860" marL="22860" marR="22860"/>
+                </a:tc>
+                <a:tc>
+                  <a:txBody>
+                    <a:bodyPr/>
+                    <a:lstStyle/>
+                    <a:p>
+                      <a:pPr algn="ctr"/>
                       <a:r>
                         <a:rPr sz="900"/>
-                        <a:t>3.34%</a:t>
-                      </a:r>
-                    </a:p>
-                  </a:txBody>
-                  <a:tcPr marL="22860" marR="22860" marT="22860" marB="22860"/>
-                </a:tc>
-                <a:tc>
-                  <a:txBody>
-                    <a:bodyPr/>
-                    <a:lstStyle/>
-                    <a:p>
+                        <a:t>4.10%</a:t>
+                      </a:r>
+                    </a:p>
+                  </a:txBody>
+                  <a:tcPr marT="22860" marB="22860" marL="22860" marR="22860"/>
+                </a:tc>
+                <a:tc>
+                  <a:txBody>
+                    <a:bodyPr/>
+                    <a:lstStyle/>
+                    <a:p>
+                      <a:pPr algn="ctr"/>
                       <a:r>
                         <a:rPr sz="900"/>
-                        <a:t>3.51%</a:t>
-                      </a:r>
-                    </a:p>
-                  </a:txBody>
-                  <a:tcPr marL="22860" marR="22860" marT="22860" marB="22860"/>
-                </a:tc>
-                <a:tc>
-                  <a:txBody>
-                    <a:bodyPr/>
-                    <a:lstStyle/>
-                    <a:p>
+                        <a:t>3.79%</a:t>
+                      </a:r>
+                    </a:p>
+                  </a:txBody>
+                  <a:tcPr marT="22860" marB="22860" marL="22860" marR="22860"/>
+                </a:tc>
+                <a:tc>
+                  <a:txBody>
+                    <a:bodyPr/>
+                    <a:lstStyle/>
+                    <a:p>
+                      <a:pPr algn="ctr"/>
                       <a:r>
                         <a:rPr sz="900"/>
-                        <a:t>3.93%</a:t>
-                      </a:r>
-                    </a:p>
-                  </a:txBody>
-                  <a:tcPr marL="22860" marR="22860" marT="22860" marB="22860"/>
-                </a:tc>
-                <a:tc>
-                  <a:txBody>
-                    <a:bodyPr/>
-                    <a:lstStyle/>
-                    <a:p>
+                        <a:t>3.54%</a:t>
+                      </a:r>
+                    </a:p>
+                  </a:txBody>
+                  <a:tcPr marT="22860" marB="22860" marL="22860" marR="22860"/>
+                </a:tc>
+                <a:tc>
+                  <a:txBody>
+                    <a:bodyPr/>
+                    <a:lstStyle/>
+                    <a:p>
+                      <a:pPr algn="ctr"/>
                       <a:r>
                         <a:rPr sz="900"/>
-                        <a:t>3.20%</a:t>
-                      </a:r>
-                    </a:p>
-                  </a:txBody>
-                  <a:tcPr marL="22860" marR="22860" marT="22860" marB="22860"/>
-                </a:tc>
-                <a:tc>
-                  <a:txBody>
-                    <a:bodyPr/>
-                    <a:lstStyle/>
-                    <a:p>
-                      <a:r>
-                        <a:rPr sz="900" dirty="0"/>
-                        <a:t>13.97%</a:t>
-                      </a:r>
-                    </a:p>
-                  </a:txBody>
-                  <a:tcPr marL="22860" marR="22860" marT="22860" marB="22860"/>
-                </a:tc>
-                <a:extLst>
-                  <a:ext uri="{0D108BD9-81ED-4DB2-BD59-A6C34878D82A}">
-                    <a16:rowId xmlns:a16="http://schemas.microsoft.com/office/drawing/2014/main" val="10008"/>
-                  </a:ext>
-                </a:extLst>
+                        <a:t>3.71%</a:t>
+                      </a:r>
+                    </a:p>
+                  </a:txBody>
+                  <a:tcPr marT="22860" marB="22860" marL="22860" marR="22860"/>
+                </a:tc>
+                <a:tc>
+                  <a:txBody>
+                    <a:bodyPr/>
+                    <a:lstStyle/>
+                    <a:p>
+                      <a:pPr algn="ctr"/>
+                      <a:r>
+                        <a:rPr sz="900"/>
+                        <a:t>15.14%</a:t>
+                      </a:r>
+                    </a:p>
+                  </a:txBody>
+                  <a:tcPr marT="22860" marB="22860" marL="22860" marR="22860"/>
+                </a:tc>
               </a:tr>
             </a:tbl>
           </a:graphicData>
@@ -4631,7 +4597,7 @@
             <a:spLocks noGrp="1"/>
           </p:cNvSpPr>
           <p:nvPr>
-            <p:ph type="chart" sz="quarter" idx="14"/>
+            <p:ph type="chart" idx="14" sz="quarter"/>
           </p:nvPr>
         </p:nvSpPr>
         <p:spPr/>

</xml_diff>